<commit_message>
local tests on fastapi code
</commit_message>
<xml_diff>
--- a/.github/MLOPS project overview.pptx
+++ b/.github/MLOPS project overview.pptx
@@ -261,7 +261,7 @@
           <a:p>
             <a:fld id="{AE4AF83A-EA3E-4332-8308-96A2DEFAAF7F}" type="datetimeFigureOut">
               <a:rPr lang="en-GB" smtClean="0"/>
-              <a:t>30/04/2022</a:t>
+              <a:t>02/05/2022</a:t>
             </a:fld>
             <a:endParaRPr lang="en-GB"/>
           </a:p>
@@ -461,7 +461,7 @@
           <a:p>
             <a:fld id="{AE4AF83A-EA3E-4332-8308-96A2DEFAAF7F}" type="datetimeFigureOut">
               <a:rPr lang="en-GB" smtClean="0"/>
-              <a:t>30/04/2022</a:t>
+              <a:t>02/05/2022</a:t>
             </a:fld>
             <a:endParaRPr lang="en-GB"/>
           </a:p>
@@ -671,7 +671,7 @@
           <a:p>
             <a:fld id="{AE4AF83A-EA3E-4332-8308-96A2DEFAAF7F}" type="datetimeFigureOut">
               <a:rPr lang="en-GB" smtClean="0"/>
-              <a:t>30/04/2022</a:t>
+              <a:t>02/05/2022</a:t>
             </a:fld>
             <a:endParaRPr lang="en-GB"/>
           </a:p>
@@ -871,7 +871,7 @@
           <a:p>
             <a:fld id="{AE4AF83A-EA3E-4332-8308-96A2DEFAAF7F}" type="datetimeFigureOut">
               <a:rPr lang="en-GB" smtClean="0"/>
-              <a:t>30/04/2022</a:t>
+              <a:t>02/05/2022</a:t>
             </a:fld>
             <a:endParaRPr lang="en-GB"/>
           </a:p>
@@ -1147,7 +1147,7 @@
           <a:p>
             <a:fld id="{AE4AF83A-EA3E-4332-8308-96A2DEFAAF7F}" type="datetimeFigureOut">
               <a:rPr lang="en-GB" smtClean="0"/>
-              <a:t>30/04/2022</a:t>
+              <a:t>02/05/2022</a:t>
             </a:fld>
             <a:endParaRPr lang="en-GB"/>
           </a:p>
@@ -1415,7 +1415,7 @@
           <a:p>
             <a:fld id="{AE4AF83A-EA3E-4332-8308-96A2DEFAAF7F}" type="datetimeFigureOut">
               <a:rPr lang="en-GB" smtClean="0"/>
-              <a:t>30/04/2022</a:t>
+              <a:t>02/05/2022</a:t>
             </a:fld>
             <a:endParaRPr lang="en-GB"/>
           </a:p>
@@ -1830,7 +1830,7 @@
           <a:p>
             <a:fld id="{AE4AF83A-EA3E-4332-8308-96A2DEFAAF7F}" type="datetimeFigureOut">
               <a:rPr lang="en-GB" smtClean="0"/>
-              <a:t>30/04/2022</a:t>
+              <a:t>02/05/2022</a:t>
             </a:fld>
             <a:endParaRPr lang="en-GB"/>
           </a:p>
@@ -1972,7 +1972,7 @@
           <a:p>
             <a:fld id="{AE4AF83A-EA3E-4332-8308-96A2DEFAAF7F}" type="datetimeFigureOut">
               <a:rPr lang="en-GB" smtClean="0"/>
-              <a:t>30/04/2022</a:t>
+              <a:t>02/05/2022</a:t>
             </a:fld>
             <a:endParaRPr lang="en-GB"/>
           </a:p>
@@ -2085,7 +2085,7 @@
           <a:p>
             <a:fld id="{AE4AF83A-EA3E-4332-8308-96A2DEFAAF7F}" type="datetimeFigureOut">
               <a:rPr lang="en-GB" smtClean="0"/>
-              <a:t>30/04/2022</a:t>
+              <a:t>02/05/2022</a:t>
             </a:fld>
             <a:endParaRPr lang="en-GB"/>
           </a:p>
@@ -2398,7 +2398,7 @@
           <a:p>
             <a:fld id="{AE4AF83A-EA3E-4332-8308-96A2DEFAAF7F}" type="datetimeFigureOut">
               <a:rPr lang="en-GB" smtClean="0"/>
-              <a:t>30/04/2022</a:t>
+              <a:t>02/05/2022</a:t>
             </a:fld>
             <a:endParaRPr lang="en-GB"/>
           </a:p>
@@ -2687,7 +2687,7 @@
           <a:p>
             <a:fld id="{AE4AF83A-EA3E-4332-8308-96A2DEFAAF7F}" type="datetimeFigureOut">
               <a:rPr lang="en-GB" smtClean="0"/>
-              <a:t>30/04/2022</a:t>
+              <a:t>02/05/2022</a:t>
             </a:fld>
             <a:endParaRPr lang="en-GB"/>
           </a:p>
@@ -2930,7 +2930,7 @@
           <a:p>
             <a:fld id="{AE4AF83A-EA3E-4332-8308-96A2DEFAAF7F}" type="datetimeFigureOut">
               <a:rPr lang="en-GB" smtClean="0"/>
-              <a:t>30/04/2022</a:t>
+              <a:t>02/05/2022</a:t>
             </a:fld>
             <a:endParaRPr lang="en-GB"/>
           </a:p>
@@ -3349,10 +3349,10 @@
       </p:grpSpPr>
       <p:grpSp>
         <p:nvGrpSpPr>
-          <p:cNvPr id="21" name="Group 20">
-            <a:extLst>
-              <a:ext uri="{FF2B5EF4-FFF2-40B4-BE49-F238E27FC236}">
-                <a16:creationId xmlns:a16="http://schemas.microsoft.com/office/drawing/2014/main" id="{8886BEB6-794C-4EFA-B728-B210963FB472}"/>
+          <p:cNvPr id="37" name="Group 36">
+            <a:extLst>
+              <a:ext uri="{FF2B5EF4-FFF2-40B4-BE49-F238E27FC236}">
+                <a16:creationId xmlns:a16="http://schemas.microsoft.com/office/drawing/2014/main" id="{5C738D8B-1C32-4B64-8A24-F553CE314B2F}"/>
               </a:ext>
             </a:extLst>
           </p:cNvPr>
@@ -3361,18 +3361,18 @@
         </p:nvGrpSpPr>
         <p:grpSpPr>
           <a:xfrm>
-            <a:off x="978795" y="1145858"/>
-            <a:ext cx="4288664" cy="2283646"/>
-            <a:chOff x="978795" y="1145858"/>
-            <a:chExt cx="4288664" cy="2283646"/>
+            <a:off x="232738" y="1543690"/>
+            <a:ext cx="11442265" cy="3142695"/>
+            <a:chOff x="232738" y="1543690"/>
+            <a:chExt cx="11442265" cy="3142695"/>
           </a:xfrm>
         </p:grpSpPr>
         <p:grpSp>
           <p:nvGrpSpPr>
-            <p:cNvPr id="19" name="Group 18">
+            <p:cNvPr id="50" name="Group 49">
               <a:extLst>
                 <a:ext uri="{FF2B5EF4-FFF2-40B4-BE49-F238E27FC236}">
-                  <a16:creationId xmlns:a16="http://schemas.microsoft.com/office/drawing/2014/main" id="{B480DC62-708E-460F-BBA7-0C24381EBD89}"/>
+                  <a16:creationId xmlns:a16="http://schemas.microsoft.com/office/drawing/2014/main" id="{0215EDFD-9E11-40A3-A02F-508A3B91E5FD}"/>
                 </a:ext>
               </a:extLst>
             </p:cNvPr>
@@ -3381,18 +3381,18 @@
           </p:nvGrpSpPr>
           <p:grpSpPr>
             <a:xfrm>
-              <a:off x="978795" y="1519707"/>
-              <a:ext cx="4288664" cy="1909797"/>
-              <a:chOff x="978795" y="1519707"/>
-              <a:chExt cx="4288664" cy="1909797"/>
+              <a:off x="232738" y="1543690"/>
+              <a:ext cx="11442265" cy="3142695"/>
+              <a:chOff x="181222" y="307318"/>
+              <a:chExt cx="11442265" cy="3142695"/>
             </a:xfrm>
           </p:grpSpPr>
           <p:grpSp>
             <p:nvGrpSpPr>
-              <p:cNvPr id="15" name="Group 14">
+              <p:cNvPr id="21" name="Group 20">
                 <a:extLst>
                   <a:ext uri="{FF2B5EF4-FFF2-40B4-BE49-F238E27FC236}">
-                    <a16:creationId xmlns:a16="http://schemas.microsoft.com/office/drawing/2014/main" id="{A89A81EE-F0C2-4944-8FC4-BA1AE7C08669}"/>
+                    <a16:creationId xmlns:a16="http://schemas.microsoft.com/office/drawing/2014/main" id="{8886BEB6-794C-4EFA-B728-B210963FB472}"/>
                   </a:ext>
                 </a:extLst>
               </p:cNvPr>
@@ -3401,200 +3401,585 @@
             </p:nvGrpSpPr>
             <p:grpSpPr>
               <a:xfrm>
-                <a:off x="978795" y="1519707"/>
-                <a:ext cx="4288664" cy="1022016"/>
-                <a:chOff x="978795" y="1519707"/>
-                <a:chExt cx="4288664" cy="1022016"/>
+                <a:off x="181222" y="1166367"/>
+                <a:ext cx="4288664" cy="2283646"/>
+                <a:chOff x="978795" y="1145858"/>
+                <a:chExt cx="4288664" cy="2283646"/>
               </a:xfrm>
             </p:grpSpPr>
-            <p:pic>
-              <p:nvPicPr>
-                <p:cNvPr id="3" name="Graphic 2" descr="Database with solid fill">
+            <p:grpSp>
+              <p:nvGrpSpPr>
+                <p:cNvPr id="19" name="Group 18">
                   <a:extLst>
                     <a:ext uri="{FF2B5EF4-FFF2-40B4-BE49-F238E27FC236}">
-                      <a16:creationId xmlns:a16="http://schemas.microsoft.com/office/drawing/2014/main" id="{15BA35E9-6818-4796-9089-FC2A1552DA28}"/>
+                      <a16:creationId xmlns:a16="http://schemas.microsoft.com/office/drawing/2014/main" id="{B480DC62-708E-460F-BBA7-0C24381EBD89}"/>
                     </a:ext>
                   </a:extLst>
                 </p:cNvPr>
-                <p:cNvPicPr>
-                  <a:picLocks noChangeAspect="1"/>
-                </p:cNvPicPr>
+                <p:cNvGrpSpPr/>
                 <p:nvPr/>
-              </p:nvPicPr>
-              <p:blipFill>
-                <a:blip r:embed="rId2">
+              </p:nvGrpSpPr>
+              <p:grpSpPr>
+                <a:xfrm>
+                  <a:off x="978795" y="1519707"/>
+                  <a:ext cx="4288664" cy="1909797"/>
+                  <a:chOff x="978795" y="1519707"/>
+                  <a:chExt cx="4288664" cy="1909797"/>
+                </a:xfrm>
+              </p:grpSpPr>
+              <p:grpSp>
+                <p:nvGrpSpPr>
+                  <p:cNvPr id="15" name="Group 14">
+                    <a:extLst>
+                      <a:ext uri="{FF2B5EF4-FFF2-40B4-BE49-F238E27FC236}">
+                        <a16:creationId xmlns:a16="http://schemas.microsoft.com/office/drawing/2014/main" id="{A89A81EE-F0C2-4944-8FC4-BA1AE7C08669}"/>
+                      </a:ext>
+                    </a:extLst>
+                  </p:cNvPr>
+                  <p:cNvGrpSpPr/>
+                  <p:nvPr/>
+                </p:nvGrpSpPr>
+                <p:grpSpPr>
+                  <a:xfrm>
+                    <a:off x="978795" y="1519707"/>
+                    <a:ext cx="4288664" cy="1022016"/>
+                    <a:chOff x="978795" y="1519707"/>
+                    <a:chExt cx="4288664" cy="1022016"/>
+                  </a:xfrm>
+                </p:grpSpPr>
+                <p:pic>
+                  <p:nvPicPr>
+                    <p:cNvPr id="3" name="Graphic 2" descr="Database with solid fill">
+                      <a:extLst>
+                        <a:ext uri="{FF2B5EF4-FFF2-40B4-BE49-F238E27FC236}">
+                          <a16:creationId xmlns:a16="http://schemas.microsoft.com/office/drawing/2014/main" id="{15BA35E9-6818-4796-9089-FC2A1552DA28}"/>
+                        </a:ext>
+                      </a:extLst>
+                    </p:cNvPr>
+                    <p:cNvPicPr>
+                      <a:picLocks noChangeAspect="1"/>
+                    </p:cNvPicPr>
+                    <p:nvPr/>
+                  </p:nvPicPr>
+                  <p:blipFill>
+                    <a:blip r:embed="rId2">
+                      <a:extLst>
+                        <a:ext uri="{28A0092B-C50C-407E-A947-70E740481C1C}">
+                          <a14:useLocalDpi xmlns:a14="http://schemas.microsoft.com/office/drawing/2010/main" val="0"/>
+                        </a:ext>
+                        <a:ext uri="{96DAC541-7B7A-43D3-8B79-37D633B846F1}">
+                          <asvg:svgBlip xmlns:asvg="http://schemas.microsoft.com/office/drawing/2016/SVG/main" r:embed="rId3"/>
+                        </a:ext>
+                      </a:extLst>
+                    </a:blip>
+                    <a:stretch>
+                      <a:fillRect/>
+                    </a:stretch>
+                  </p:blipFill>
+                  <p:spPr>
+                    <a:xfrm>
+                      <a:off x="1315428" y="1775811"/>
+                      <a:ext cx="765911" cy="765911"/>
+                    </a:xfrm>
+                    <a:prstGeom prst="rect">
+                      <a:avLst/>
+                    </a:prstGeom>
+                  </p:spPr>
+                </p:pic>
+                <p:pic>
+                  <p:nvPicPr>
+                    <p:cNvPr id="5" name="Picture 4">
+                      <a:extLst>
+                        <a:ext uri="{FF2B5EF4-FFF2-40B4-BE49-F238E27FC236}">
+                          <a16:creationId xmlns:a16="http://schemas.microsoft.com/office/drawing/2014/main" id="{BA314474-F19C-4F09-A29F-E2458BC2805C}"/>
+                        </a:ext>
+                      </a:extLst>
+                    </p:cNvPr>
+                    <p:cNvPicPr>
+                      <a:picLocks noChangeAspect="1"/>
+                    </p:cNvPicPr>
+                    <p:nvPr/>
+                  </p:nvPicPr>
+                  <p:blipFill>
+                    <a:blip r:embed="rId4"/>
+                    <a:stretch>
+                      <a:fillRect/>
+                    </a:stretch>
+                  </p:blipFill>
+                  <p:spPr>
+                    <a:xfrm>
+                      <a:off x="2586683" y="1809583"/>
+                      <a:ext cx="695325" cy="714375"/>
+                    </a:xfrm>
+                    <a:prstGeom prst="rect">
+                      <a:avLst/>
+                    </a:prstGeom>
+                  </p:spPr>
+                </p:pic>
+                <p:pic>
+                  <p:nvPicPr>
+                    <p:cNvPr id="7" name="Picture 6">
+                      <a:extLst>
+                        <a:ext uri="{FF2B5EF4-FFF2-40B4-BE49-F238E27FC236}">
+                          <a16:creationId xmlns:a16="http://schemas.microsoft.com/office/drawing/2014/main" id="{3E7D4FDE-7F9D-4562-87D3-CD0463A0201C}"/>
+                        </a:ext>
+                      </a:extLst>
+                    </p:cNvPr>
+                    <p:cNvPicPr>
+                      <a:picLocks noChangeAspect="1"/>
+                    </p:cNvPicPr>
+                    <p:nvPr/>
+                  </p:nvPicPr>
+                  <p:blipFill>
+                    <a:blip r:embed="rId5"/>
+                    <a:stretch>
+                      <a:fillRect/>
+                    </a:stretch>
+                  </p:blipFill>
+                  <p:spPr>
+                    <a:xfrm>
+                      <a:off x="3827798" y="1962509"/>
+                      <a:ext cx="1162050" cy="485775"/>
+                    </a:xfrm>
+                    <a:prstGeom prst="rect">
+                      <a:avLst/>
+                    </a:prstGeom>
+                  </p:spPr>
+                </p:pic>
+                <p:cxnSp>
+                  <p:nvCxnSpPr>
+                    <p:cNvPr id="9" name="Straight Arrow Connector 8">
+                      <a:extLst>
+                        <a:ext uri="{FF2B5EF4-FFF2-40B4-BE49-F238E27FC236}">
+                          <a16:creationId xmlns:a16="http://schemas.microsoft.com/office/drawing/2014/main" id="{6EE7B851-6A1A-4891-9E51-410E3DA5E0A7}"/>
+                        </a:ext>
+                      </a:extLst>
+                    </p:cNvPr>
+                    <p:cNvCxnSpPr>
+                      <a:stCxn id="3" idx="3"/>
+                      <a:endCxn id="5" idx="1"/>
+                    </p:cNvCxnSpPr>
+                    <p:nvPr/>
+                  </p:nvCxnSpPr>
+                  <p:spPr>
+                    <a:xfrm>
+                      <a:off x="2081339" y="2158767"/>
+                      <a:ext cx="505344" cy="8004"/>
+                    </a:xfrm>
+                    <a:prstGeom prst="straightConnector1">
+                      <a:avLst/>
+                    </a:prstGeom>
+                    <a:ln>
+                      <a:tailEnd type="triangle"/>
+                    </a:ln>
+                  </p:spPr>
+                  <p:style>
+                    <a:lnRef idx="1">
+                      <a:schemeClr val="accent1"/>
+                    </a:lnRef>
+                    <a:fillRef idx="0">
+                      <a:schemeClr val="accent1"/>
+                    </a:fillRef>
+                    <a:effectRef idx="0">
+                      <a:schemeClr val="accent1"/>
+                    </a:effectRef>
+                    <a:fontRef idx="minor">
+                      <a:schemeClr val="tx1"/>
+                    </a:fontRef>
+                  </p:style>
+                </p:cxnSp>
+                <p:cxnSp>
+                  <p:nvCxnSpPr>
+                    <p:cNvPr id="12" name="Straight Arrow Connector 11">
+                      <a:extLst>
+                        <a:ext uri="{FF2B5EF4-FFF2-40B4-BE49-F238E27FC236}">
+                          <a16:creationId xmlns:a16="http://schemas.microsoft.com/office/drawing/2014/main" id="{1880AE6B-D2FC-40CE-8414-C76B03138DD2}"/>
+                        </a:ext>
+                      </a:extLst>
+                    </p:cNvPr>
+                    <p:cNvCxnSpPr>
+                      <a:stCxn id="5" idx="3"/>
+                    </p:cNvCxnSpPr>
+                    <p:nvPr/>
+                  </p:nvCxnSpPr>
+                  <p:spPr>
+                    <a:xfrm flipV="1">
+                      <a:off x="3282008" y="2166770"/>
+                      <a:ext cx="607412" cy="1"/>
+                    </a:xfrm>
+                    <a:prstGeom prst="straightConnector1">
+                      <a:avLst/>
+                    </a:prstGeom>
+                    <a:ln>
+                      <a:tailEnd type="triangle"/>
+                    </a:ln>
+                  </p:spPr>
+                  <p:style>
+                    <a:lnRef idx="1">
+                      <a:schemeClr val="accent1"/>
+                    </a:lnRef>
+                    <a:fillRef idx="0">
+                      <a:schemeClr val="accent1"/>
+                    </a:fillRef>
+                    <a:effectRef idx="0">
+                      <a:schemeClr val="accent1"/>
+                    </a:effectRef>
+                    <a:fontRef idx="minor">
+                      <a:schemeClr val="tx1"/>
+                    </a:fontRef>
+                  </p:style>
+                </p:cxnSp>
+                <p:sp>
+                  <p:nvSpPr>
+                    <p:cNvPr id="14" name="Cube 13">
+                      <a:extLst>
+                        <a:ext uri="{FF2B5EF4-FFF2-40B4-BE49-F238E27FC236}">
+                          <a16:creationId xmlns:a16="http://schemas.microsoft.com/office/drawing/2014/main" id="{9583BC12-D711-45B6-ACBF-497E21F566A8}"/>
+                        </a:ext>
+                      </a:extLst>
+                    </p:cNvPr>
+                    <p:cNvSpPr/>
+                    <p:nvPr/>
+                  </p:nvSpPr>
+                  <p:spPr>
+                    <a:xfrm>
+                      <a:off x="978795" y="1519707"/>
+                      <a:ext cx="4288664" cy="1022016"/>
+                    </a:xfrm>
+                    <a:prstGeom prst="cube">
+                      <a:avLst/>
+                    </a:prstGeom>
+                    <a:noFill/>
+                  </p:spPr>
+                  <p:style>
+                    <a:lnRef idx="2">
+                      <a:schemeClr val="accent1">
+                        <a:shade val="50000"/>
+                      </a:schemeClr>
+                    </a:lnRef>
+                    <a:fillRef idx="1">
+                      <a:schemeClr val="accent1"/>
+                    </a:fillRef>
+                    <a:effectRef idx="0">
+                      <a:schemeClr val="accent1"/>
+                    </a:effectRef>
+                    <a:fontRef idx="minor">
+                      <a:schemeClr val="lt1"/>
+                    </a:fontRef>
+                  </p:style>
+                  <p:txBody>
+                    <a:bodyPr rtlCol="0" anchor="ctr"/>
+                    <a:lstStyle/>
+                    <a:p>
+                      <a:pPr algn="ctr"/>
+                      <a:endParaRPr lang="en-GB" dirty="0"/>
+                    </a:p>
+                  </p:txBody>
+                </p:sp>
+              </p:grpSp>
+              <p:sp>
+                <p:nvSpPr>
+                  <p:cNvPr id="16" name="TextBox 15">
+                    <a:extLst>
+                      <a:ext uri="{FF2B5EF4-FFF2-40B4-BE49-F238E27FC236}">
+                        <a16:creationId xmlns:a16="http://schemas.microsoft.com/office/drawing/2014/main" id="{815D6D6B-DDF5-45E7-8A0E-34FA5156DA8E}"/>
+                      </a:ext>
+                    </a:extLst>
+                  </p:cNvPr>
+                  <p:cNvSpPr txBox="1"/>
+                  <p:nvPr/>
+                </p:nvSpPr>
+                <p:spPr>
+                  <a:xfrm>
+                    <a:off x="1315428" y="2509316"/>
+                    <a:ext cx="811441" cy="646331"/>
+                  </a:xfrm>
+                  <a:prstGeom prst="rect">
+                    <a:avLst/>
+                  </a:prstGeom>
+                  <a:noFill/>
+                </p:spPr>
+                <p:txBody>
+                  <a:bodyPr wrap="none" rtlCol="0">
+                    <a:spAutoFit/>
+                  </a:bodyPr>
+                  <a:lstStyle/>
+                  <a:p>
+                    <a:r>
+                      <a:rPr lang="en-GB" dirty="0"/>
+                      <a:t>Data </a:t>
+                    </a:r>
+                  </a:p>
+                  <a:p>
+                    <a:r>
+                      <a:rPr lang="en-GB" dirty="0"/>
+                      <a:t>source</a:t>
+                    </a:r>
+                  </a:p>
+                </p:txBody>
+              </p:sp>
+              <p:sp>
+                <p:nvSpPr>
+                  <p:cNvPr id="17" name="TextBox 16">
+                    <a:extLst>
+                      <a:ext uri="{FF2B5EF4-FFF2-40B4-BE49-F238E27FC236}">
+                        <a16:creationId xmlns:a16="http://schemas.microsoft.com/office/drawing/2014/main" id="{4BCF63A8-7D16-4A80-B71D-CE667FEA1A12}"/>
+                      </a:ext>
+                    </a:extLst>
+                  </p:cNvPr>
+                  <p:cNvSpPr txBox="1"/>
+                  <p:nvPr/>
+                </p:nvSpPr>
+                <p:spPr>
+                  <a:xfrm>
+                    <a:off x="2586683" y="2506174"/>
+                    <a:ext cx="729174" cy="923330"/>
+                  </a:xfrm>
+                  <a:prstGeom prst="rect">
+                    <a:avLst/>
+                  </a:prstGeom>
+                  <a:noFill/>
+                </p:spPr>
+                <p:txBody>
+                  <a:bodyPr wrap="none" rtlCol="0">
+                    <a:spAutoFit/>
+                  </a:bodyPr>
+                  <a:lstStyle/>
+                  <a:p>
+                    <a:r>
+                      <a:rPr lang="en-GB" dirty="0"/>
+                      <a:t>Azure</a:t>
+                    </a:r>
+                  </a:p>
+                  <a:p>
+                    <a:r>
+                      <a:rPr lang="en-GB" dirty="0"/>
+                      <a:t>Data </a:t>
+                    </a:r>
+                  </a:p>
+                  <a:p>
+                    <a:r>
+                      <a:rPr lang="en-GB" dirty="0"/>
+                      <a:t>bricks</a:t>
+                    </a:r>
+                  </a:p>
+                </p:txBody>
+              </p:sp>
+              <p:sp>
+                <p:nvSpPr>
+                  <p:cNvPr id="18" name="TextBox 17">
+                    <a:extLst>
+                      <a:ext uri="{FF2B5EF4-FFF2-40B4-BE49-F238E27FC236}">
+                        <a16:creationId xmlns:a16="http://schemas.microsoft.com/office/drawing/2014/main" id="{5C1948B8-13E8-47FC-8C17-E8839B6F2224}"/>
+                      </a:ext>
+                    </a:extLst>
+                  </p:cNvPr>
+                  <p:cNvSpPr txBox="1"/>
+                  <p:nvPr/>
+                </p:nvSpPr>
+                <p:spPr>
+                  <a:xfrm>
+                    <a:off x="3937845" y="2541722"/>
+                    <a:ext cx="977255" cy="646331"/>
+                  </a:xfrm>
+                  <a:prstGeom prst="rect">
+                    <a:avLst/>
+                  </a:prstGeom>
+                  <a:noFill/>
+                </p:spPr>
+                <p:txBody>
+                  <a:bodyPr wrap="none" rtlCol="0">
+                    <a:spAutoFit/>
+                  </a:bodyPr>
+                  <a:lstStyle/>
+                  <a:p>
+                    <a:r>
+                      <a:rPr lang="en-GB" dirty="0"/>
+                      <a:t>MLFlow </a:t>
+                    </a:r>
+                  </a:p>
+                  <a:p>
+                    <a:r>
+                      <a:rPr lang="en-GB" dirty="0"/>
+                      <a:t>tracking</a:t>
+                    </a:r>
+                  </a:p>
+                </p:txBody>
+              </p:sp>
+            </p:grpSp>
+            <p:sp>
+              <p:nvSpPr>
+                <p:cNvPr id="20" name="TextBox 19">
                   <a:extLst>
-                    <a:ext uri="{28A0092B-C50C-407E-A947-70E740481C1C}">
-                      <a14:useLocalDpi xmlns:a14="http://schemas.microsoft.com/office/drawing/2010/main" val="0"/>
-                    </a:ext>
-                    <a:ext uri="{96DAC541-7B7A-43D3-8B79-37D633B846F1}">
-                      <asvg:svgBlip xmlns:asvg="http://schemas.microsoft.com/office/drawing/2016/SVG/main" r:embed="rId3"/>
+                    <a:ext uri="{FF2B5EF4-FFF2-40B4-BE49-F238E27FC236}">
+                      <a16:creationId xmlns:a16="http://schemas.microsoft.com/office/drawing/2014/main" id="{79C04613-F53F-4A9D-B33D-8B32CFC17697}"/>
                     </a:ext>
                   </a:extLst>
-                </a:blip>
-                <a:stretch>
-                  <a:fillRect/>
-                </a:stretch>
-              </p:blipFill>
+                </p:cNvPr>
+                <p:cNvSpPr txBox="1"/>
+                <p:nvPr/>
+              </p:nvSpPr>
               <p:spPr>
                 <a:xfrm>
-                  <a:off x="1315428" y="1775811"/>
-                  <a:ext cx="765911" cy="765911"/>
+                  <a:off x="2440380" y="1145858"/>
+                  <a:ext cx="1451936" cy="369332"/>
                 </a:xfrm>
                 <a:prstGeom prst="rect">
                   <a:avLst/>
                 </a:prstGeom>
+                <a:noFill/>
               </p:spPr>
-            </p:pic>
-            <p:pic>
-              <p:nvPicPr>
-                <p:cNvPr id="5" name="Picture 4">
+              <p:txBody>
+                <a:bodyPr wrap="none" rtlCol="0">
+                  <a:spAutoFit/>
+                </a:bodyPr>
+                <a:lstStyle/>
+                <a:p>
+                  <a:r>
+                    <a:rPr lang="en-GB" dirty="0"/>
+                    <a:t>Development</a:t>
+                  </a:r>
+                </a:p>
+              </p:txBody>
+            </p:sp>
+          </p:grpSp>
+          <p:pic>
+            <p:nvPicPr>
+              <p:cNvPr id="11" name="Picture 10">
+                <a:extLst>
+                  <a:ext uri="{FF2B5EF4-FFF2-40B4-BE49-F238E27FC236}">
+                    <a16:creationId xmlns:a16="http://schemas.microsoft.com/office/drawing/2014/main" id="{82E3F97F-5078-46AC-8C83-52468738966E}"/>
+                  </a:ext>
+                </a:extLst>
+              </p:cNvPr>
+              <p:cNvPicPr>
+                <a:picLocks noChangeAspect="1"/>
+              </p:cNvPicPr>
+              <p:nvPr/>
+            </p:nvPicPr>
+            <p:blipFill>
+              <a:blip r:embed="rId6"/>
+              <a:stretch>
+                <a:fillRect/>
+              </a:stretch>
+            </p:blipFill>
+            <p:spPr>
+              <a:xfrm>
+                <a:off x="4972430" y="2514496"/>
+                <a:ext cx="923925" cy="733425"/>
+              </a:xfrm>
+              <a:prstGeom prst="rect">
+                <a:avLst/>
+              </a:prstGeom>
+            </p:spPr>
+          </p:pic>
+          <p:grpSp>
+            <p:nvGrpSpPr>
+              <p:cNvPr id="28" name="Group 27">
+                <a:extLst>
+                  <a:ext uri="{FF2B5EF4-FFF2-40B4-BE49-F238E27FC236}">
+                    <a16:creationId xmlns:a16="http://schemas.microsoft.com/office/drawing/2014/main" id="{3E6C0F19-65A7-4FBE-A8F0-0A375663D886}"/>
+                  </a:ext>
+                </a:extLst>
+              </p:cNvPr>
+              <p:cNvGrpSpPr/>
+              <p:nvPr/>
+            </p:nvGrpSpPr>
+            <p:grpSpPr>
+              <a:xfrm>
+                <a:off x="4991424" y="655359"/>
+                <a:ext cx="4105835" cy="1022016"/>
+                <a:chOff x="5835443" y="813619"/>
+                <a:chExt cx="4105835" cy="1022016"/>
+              </a:xfrm>
+            </p:grpSpPr>
+            <p:grpSp>
+              <p:nvGrpSpPr>
+                <p:cNvPr id="25" name="Group 24">
                   <a:extLst>
                     <a:ext uri="{FF2B5EF4-FFF2-40B4-BE49-F238E27FC236}">
-                      <a16:creationId xmlns:a16="http://schemas.microsoft.com/office/drawing/2014/main" id="{BA314474-F19C-4F09-A29F-E2458BC2805C}"/>
+                      <a16:creationId xmlns:a16="http://schemas.microsoft.com/office/drawing/2014/main" id="{11299963-A613-4045-9F7E-423EDB815074}"/>
                     </a:ext>
                   </a:extLst>
                 </p:cNvPr>
-                <p:cNvPicPr>
-                  <a:picLocks noChangeAspect="1"/>
-                </p:cNvPicPr>
+                <p:cNvGrpSpPr/>
                 <p:nvPr/>
-              </p:nvPicPr>
-              <p:blipFill>
-                <a:blip r:embed="rId4"/>
-                <a:stretch>
-                  <a:fillRect/>
-                </a:stretch>
-              </p:blipFill>
-              <p:spPr>
+              </p:nvGrpSpPr>
+              <p:grpSpPr>
                 <a:xfrm>
-                  <a:off x="2586683" y="1809583"/>
-                  <a:ext cx="695325" cy="714375"/>
+                  <a:off x="5999349" y="990088"/>
+                  <a:ext cx="2322400" cy="800100"/>
+                  <a:chOff x="5999349" y="990088"/>
+                  <a:chExt cx="2322400" cy="800100"/>
                 </a:xfrm>
-                <a:prstGeom prst="rect">
-                  <a:avLst/>
-                </a:prstGeom>
-              </p:spPr>
-            </p:pic>
-            <p:pic>
-              <p:nvPicPr>
-                <p:cNvPr id="7" name="Picture 6">
+              </p:grpSpPr>
+              <p:pic>
+                <p:nvPicPr>
+                  <p:cNvPr id="4" name="Picture 3">
+                    <a:extLst>
+                      <a:ext uri="{FF2B5EF4-FFF2-40B4-BE49-F238E27FC236}">
+                        <a16:creationId xmlns:a16="http://schemas.microsoft.com/office/drawing/2014/main" id="{C71ED731-ADF6-43CC-AE71-B0E315E8DC0E}"/>
+                      </a:ext>
+                    </a:extLst>
+                  </p:cNvPr>
+                  <p:cNvPicPr>
+                    <a:picLocks noChangeAspect="1"/>
+                  </p:cNvPicPr>
+                  <p:nvPr/>
+                </p:nvPicPr>
+                <p:blipFill>
+                  <a:blip r:embed="rId7"/>
+                  <a:stretch>
+                    <a:fillRect/>
+                  </a:stretch>
+                </p:blipFill>
+                <p:spPr>
+                  <a:xfrm>
+                    <a:off x="5999349" y="1046701"/>
+                    <a:ext cx="1000125" cy="704850"/>
+                  </a:xfrm>
+                  <a:prstGeom prst="rect">
+                    <a:avLst/>
+                  </a:prstGeom>
+                </p:spPr>
+              </p:pic>
+              <p:pic>
+                <p:nvPicPr>
+                  <p:cNvPr id="8" name="Picture 7">
+                    <a:extLst>
+                      <a:ext uri="{FF2B5EF4-FFF2-40B4-BE49-F238E27FC236}">
+                        <a16:creationId xmlns:a16="http://schemas.microsoft.com/office/drawing/2014/main" id="{AC831B61-5AD4-4DF9-AD39-6816B0A09948}"/>
+                      </a:ext>
+                    </a:extLst>
+                  </p:cNvPr>
+                  <p:cNvPicPr>
+                    <a:picLocks noChangeAspect="1"/>
+                  </p:cNvPicPr>
+                  <p:nvPr/>
+                </p:nvPicPr>
+                <p:blipFill>
+                  <a:blip r:embed="rId8"/>
+                  <a:stretch>
+                    <a:fillRect/>
+                  </a:stretch>
+                </p:blipFill>
+                <p:spPr>
+                  <a:xfrm>
+                    <a:off x="7454974" y="990088"/>
+                    <a:ext cx="866775" cy="800100"/>
+                  </a:xfrm>
+                  <a:prstGeom prst="rect">
+                    <a:avLst/>
+                  </a:prstGeom>
+                </p:spPr>
+              </p:pic>
+            </p:grpSp>
+            <p:sp>
+              <p:nvSpPr>
+                <p:cNvPr id="27" name="Cube 26">
                   <a:extLst>
                     <a:ext uri="{FF2B5EF4-FFF2-40B4-BE49-F238E27FC236}">
-                      <a16:creationId xmlns:a16="http://schemas.microsoft.com/office/drawing/2014/main" id="{3E7D4FDE-7F9D-4562-87D3-CD0463A0201C}"/>
-                    </a:ext>
-                  </a:extLst>
-                </p:cNvPr>
-                <p:cNvPicPr>
-                  <a:picLocks noChangeAspect="1"/>
-                </p:cNvPicPr>
-                <p:nvPr/>
-              </p:nvPicPr>
-              <p:blipFill>
-                <a:blip r:embed="rId5"/>
-                <a:stretch>
-                  <a:fillRect/>
-                </a:stretch>
-              </p:blipFill>
-              <p:spPr>
-                <a:xfrm>
-                  <a:off x="3827798" y="1962509"/>
-                  <a:ext cx="1162050" cy="485775"/>
-                </a:xfrm>
-                <a:prstGeom prst="rect">
-                  <a:avLst/>
-                </a:prstGeom>
-              </p:spPr>
-            </p:pic>
-            <p:cxnSp>
-              <p:nvCxnSpPr>
-                <p:cNvPr id="9" name="Straight Arrow Connector 8">
-                  <a:extLst>
-                    <a:ext uri="{FF2B5EF4-FFF2-40B4-BE49-F238E27FC236}">
-                      <a16:creationId xmlns:a16="http://schemas.microsoft.com/office/drawing/2014/main" id="{6EE7B851-6A1A-4891-9E51-410E3DA5E0A7}"/>
-                    </a:ext>
-                  </a:extLst>
-                </p:cNvPr>
-                <p:cNvCxnSpPr>
-                  <a:stCxn id="3" idx="3"/>
-                  <a:endCxn id="5" idx="1"/>
-                </p:cNvCxnSpPr>
-                <p:nvPr/>
-              </p:nvCxnSpPr>
-              <p:spPr>
-                <a:xfrm>
-                  <a:off x="2081339" y="2158767"/>
-                  <a:ext cx="505344" cy="8004"/>
-                </a:xfrm>
-                <a:prstGeom prst="straightConnector1">
-                  <a:avLst/>
-                </a:prstGeom>
-                <a:ln>
-                  <a:tailEnd type="triangle"/>
-                </a:ln>
-              </p:spPr>
-              <p:style>
-                <a:lnRef idx="1">
-                  <a:schemeClr val="accent1"/>
-                </a:lnRef>
-                <a:fillRef idx="0">
-                  <a:schemeClr val="accent1"/>
-                </a:fillRef>
-                <a:effectRef idx="0">
-                  <a:schemeClr val="accent1"/>
-                </a:effectRef>
-                <a:fontRef idx="minor">
-                  <a:schemeClr val="tx1"/>
-                </a:fontRef>
-              </p:style>
-            </p:cxnSp>
-            <p:cxnSp>
-              <p:nvCxnSpPr>
-                <p:cNvPr id="12" name="Straight Arrow Connector 11">
-                  <a:extLst>
-                    <a:ext uri="{FF2B5EF4-FFF2-40B4-BE49-F238E27FC236}">
-                      <a16:creationId xmlns:a16="http://schemas.microsoft.com/office/drawing/2014/main" id="{1880AE6B-D2FC-40CE-8414-C76B03138DD2}"/>
-                    </a:ext>
-                  </a:extLst>
-                </p:cNvPr>
-                <p:cNvCxnSpPr>
-                  <a:stCxn id="5" idx="3"/>
-                </p:cNvCxnSpPr>
-                <p:nvPr/>
-              </p:nvCxnSpPr>
-              <p:spPr>
-                <a:xfrm flipV="1">
-                  <a:off x="3282008" y="2166770"/>
-                  <a:ext cx="607412" cy="1"/>
-                </a:xfrm>
-                <a:prstGeom prst="straightConnector1">
-                  <a:avLst/>
-                </a:prstGeom>
-                <a:ln>
-                  <a:tailEnd type="triangle"/>
-                </a:ln>
-              </p:spPr>
-              <p:style>
-                <a:lnRef idx="1">
-                  <a:schemeClr val="accent1"/>
-                </a:lnRef>
-                <a:fillRef idx="0">
-                  <a:schemeClr val="accent1"/>
-                </a:fillRef>
-                <a:effectRef idx="0">
-                  <a:schemeClr val="accent1"/>
-                </a:effectRef>
-                <a:fontRef idx="minor">
-                  <a:schemeClr val="tx1"/>
-                </a:fontRef>
-              </p:style>
-            </p:cxnSp>
-            <p:sp>
-              <p:nvSpPr>
-                <p:cNvPr id="14" name="Cube 13">
-                  <a:extLst>
-                    <a:ext uri="{FF2B5EF4-FFF2-40B4-BE49-F238E27FC236}">
-                      <a16:creationId xmlns:a16="http://schemas.microsoft.com/office/drawing/2014/main" id="{9583BC12-D711-45B6-ACBF-497E21F566A8}"/>
+                      <a16:creationId xmlns:a16="http://schemas.microsoft.com/office/drawing/2014/main" id="{C3FD1A3F-3FC4-45C4-BDAB-0AF97E495A10}"/>
                     </a:ext>
                   </a:extLst>
                 </p:cNvPr>
@@ -3603,8 +3988,8 @@
               </p:nvSpPr>
               <p:spPr>
                 <a:xfrm>
-                  <a:off x="978795" y="1519707"/>
-                  <a:ext cx="4288664" cy="1022016"/>
+                  <a:off x="5835443" y="813619"/>
+                  <a:ext cx="4105835" cy="1022016"/>
                 </a:xfrm>
                 <a:prstGeom prst="cube">
                   <a:avLst/>
@@ -3639,306 +4024,57 @@
           </p:grpSp>
           <p:sp>
             <p:nvSpPr>
-              <p:cNvPr id="16" name="TextBox 15">
+              <p:cNvPr id="31" name="Cube 30">
                 <a:extLst>
                   <a:ext uri="{FF2B5EF4-FFF2-40B4-BE49-F238E27FC236}">
-                    <a16:creationId xmlns:a16="http://schemas.microsoft.com/office/drawing/2014/main" id="{815D6D6B-DDF5-45E7-8A0E-34FA5156DA8E}"/>
+                    <a16:creationId xmlns:a16="http://schemas.microsoft.com/office/drawing/2014/main" id="{33F0EC28-7B6B-48A0-8FEF-7D4AE721C3E3}"/>
                   </a:ext>
                 </a:extLst>
               </p:cNvPr>
-              <p:cNvSpPr txBox="1"/>
+              <p:cNvSpPr/>
               <p:nvPr/>
             </p:nvSpPr>
             <p:spPr>
               <a:xfrm>
-                <a:off x="1315428" y="2509316"/>
-                <a:ext cx="811441" cy="646331"/>
+                <a:off x="4850023" y="2225905"/>
+                <a:ext cx="1446634" cy="1022016"/>
               </a:xfrm>
-              <a:prstGeom prst="rect">
+              <a:prstGeom prst="cube">
                 <a:avLst/>
               </a:prstGeom>
               <a:noFill/>
             </p:spPr>
+            <p:style>
+              <a:lnRef idx="2">
+                <a:schemeClr val="accent1">
+                  <a:shade val="50000"/>
+                </a:schemeClr>
+              </a:lnRef>
+              <a:fillRef idx="1">
+                <a:schemeClr val="accent1"/>
+              </a:fillRef>
+              <a:effectRef idx="0">
+                <a:schemeClr val="accent1"/>
+              </a:effectRef>
+              <a:fontRef idx="minor">
+                <a:schemeClr val="lt1"/>
+              </a:fontRef>
+            </p:style>
             <p:txBody>
-              <a:bodyPr wrap="none" rtlCol="0">
-                <a:spAutoFit/>
-              </a:bodyPr>
+              <a:bodyPr rtlCol="0" anchor="ctr"/>
               <a:lstStyle/>
               <a:p>
-                <a:r>
-                  <a:rPr lang="en-GB" dirty="0"/>
-                  <a:t>Data </a:t>
-                </a:r>
-              </a:p>
-              <a:p>
-                <a:r>
-                  <a:rPr lang="en-GB" dirty="0"/>
-                  <a:t>source</a:t>
-                </a:r>
+                <a:pPr algn="ctr"/>
+                <a:endParaRPr lang="en-GB"/>
               </a:p>
             </p:txBody>
           </p:sp>
-          <p:sp>
-            <p:nvSpPr>
-              <p:cNvPr id="17" name="TextBox 16">
+          <p:pic>
+            <p:nvPicPr>
+              <p:cNvPr id="39" name="Picture 38">
                 <a:extLst>
                   <a:ext uri="{FF2B5EF4-FFF2-40B4-BE49-F238E27FC236}">
-                    <a16:creationId xmlns:a16="http://schemas.microsoft.com/office/drawing/2014/main" id="{4BCF63A8-7D16-4A80-B71D-CE667FEA1A12}"/>
-                  </a:ext>
-                </a:extLst>
-              </p:cNvPr>
-              <p:cNvSpPr txBox="1"/>
-              <p:nvPr/>
-            </p:nvSpPr>
-            <p:spPr>
-              <a:xfrm>
-                <a:off x="2586683" y="2506174"/>
-                <a:ext cx="729174" cy="923330"/>
-              </a:xfrm>
-              <a:prstGeom prst="rect">
-                <a:avLst/>
-              </a:prstGeom>
-              <a:noFill/>
-            </p:spPr>
-            <p:txBody>
-              <a:bodyPr wrap="none" rtlCol="0">
-                <a:spAutoFit/>
-              </a:bodyPr>
-              <a:lstStyle/>
-              <a:p>
-                <a:r>
-                  <a:rPr lang="en-GB" dirty="0"/>
-                  <a:t>Azure</a:t>
-                </a:r>
-              </a:p>
-              <a:p>
-                <a:r>
-                  <a:rPr lang="en-GB" dirty="0"/>
-                  <a:t>Data </a:t>
-                </a:r>
-              </a:p>
-              <a:p>
-                <a:r>
-                  <a:rPr lang="en-GB" dirty="0"/>
-                  <a:t>bricks</a:t>
-                </a:r>
-              </a:p>
-            </p:txBody>
-          </p:sp>
-          <p:sp>
-            <p:nvSpPr>
-              <p:cNvPr id="18" name="TextBox 17">
-                <a:extLst>
-                  <a:ext uri="{FF2B5EF4-FFF2-40B4-BE49-F238E27FC236}">
-                    <a16:creationId xmlns:a16="http://schemas.microsoft.com/office/drawing/2014/main" id="{5C1948B8-13E8-47FC-8C17-E8839B6F2224}"/>
-                  </a:ext>
-                </a:extLst>
-              </p:cNvPr>
-              <p:cNvSpPr txBox="1"/>
-              <p:nvPr/>
-            </p:nvSpPr>
-            <p:spPr>
-              <a:xfrm>
-                <a:off x="3937845" y="2541722"/>
-                <a:ext cx="977255" cy="646331"/>
-              </a:xfrm>
-              <a:prstGeom prst="rect">
-                <a:avLst/>
-              </a:prstGeom>
-              <a:noFill/>
-            </p:spPr>
-            <p:txBody>
-              <a:bodyPr wrap="none" rtlCol="0">
-                <a:spAutoFit/>
-              </a:bodyPr>
-              <a:lstStyle/>
-              <a:p>
-                <a:r>
-                  <a:rPr lang="en-GB" dirty="0"/>
-                  <a:t>MLFlow </a:t>
-                </a:r>
-              </a:p>
-              <a:p>
-                <a:r>
-                  <a:rPr lang="en-GB" dirty="0"/>
-                  <a:t>tracking</a:t>
-                </a:r>
-              </a:p>
-            </p:txBody>
-          </p:sp>
-        </p:grpSp>
-        <p:sp>
-          <p:nvSpPr>
-            <p:cNvPr id="20" name="TextBox 19">
-              <a:extLst>
-                <a:ext uri="{FF2B5EF4-FFF2-40B4-BE49-F238E27FC236}">
-                  <a16:creationId xmlns:a16="http://schemas.microsoft.com/office/drawing/2014/main" id="{79C04613-F53F-4A9D-B33D-8B32CFC17697}"/>
-                </a:ext>
-              </a:extLst>
-            </p:cNvPr>
-            <p:cNvSpPr txBox="1"/>
-            <p:nvPr/>
-          </p:nvSpPr>
-          <p:spPr>
-            <a:xfrm>
-              <a:off x="2440380" y="1145858"/>
-              <a:ext cx="1451936" cy="369332"/>
-            </a:xfrm>
-            <a:prstGeom prst="rect">
-              <a:avLst/>
-            </a:prstGeom>
-            <a:noFill/>
-          </p:spPr>
-          <p:txBody>
-            <a:bodyPr wrap="none" rtlCol="0">
-              <a:spAutoFit/>
-            </a:bodyPr>
-            <a:lstStyle/>
-            <a:p>
-              <a:r>
-                <a:rPr lang="en-GB" dirty="0"/>
-                <a:t>Development</a:t>
-              </a:r>
-            </a:p>
-          </p:txBody>
-        </p:sp>
-      </p:grpSp>
-      <p:pic>
-        <p:nvPicPr>
-          <p:cNvPr id="11" name="Picture 10">
-            <a:extLst>
-              <a:ext uri="{FF2B5EF4-FFF2-40B4-BE49-F238E27FC236}">
-                <a16:creationId xmlns:a16="http://schemas.microsoft.com/office/drawing/2014/main" id="{82E3F97F-5078-46AC-8C83-52468738966E}"/>
-              </a:ext>
-            </a:extLst>
-          </p:cNvPr>
-          <p:cNvPicPr>
-            <a:picLocks noChangeAspect="1"/>
-          </p:cNvPicPr>
-          <p:nvPr/>
-        </p:nvPicPr>
-        <p:blipFill>
-          <a:blip r:embed="rId6"/>
-          <a:stretch>
-            <a:fillRect/>
-          </a:stretch>
-        </p:blipFill>
-        <p:spPr>
-          <a:xfrm>
-            <a:off x="5835443" y="2695575"/>
-            <a:ext cx="923925" cy="733425"/>
-          </a:xfrm>
-          <a:prstGeom prst="rect">
-            <a:avLst/>
-          </a:prstGeom>
-        </p:spPr>
-      </p:pic>
-      <p:pic>
-        <p:nvPicPr>
-          <p:cNvPr id="24" name="Picture 23">
-            <a:extLst>
-              <a:ext uri="{FF2B5EF4-FFF2-40B4-BE49-F238E27FC236}">
-                <a16:creationId xmlns:a16="http://schemas.microsoft.com/office/drawing/2014/main" id="{F1713759-3CB0-4E0B-87FB-A12A8D0CCF55}"/>
-              </a:ext>
-            </a:extLst>
-          </p:cNvPr>
-          <p:cNvPicPr>
-            <a:picLocks noChangeAspect="1"/>
-          </p:cNvPicPr>
-          <p:nvPr/>
-        </p:nvPicPr>
-        <p:blipFill>
-          <a:blip r:embed="rId7"/>
-          <a:stretch>
-            <a:fillRect/>
-          </a:stretch>
-        </p:blipFill>
-        <p:spPr>
-          <a:xfrm>
-            <a:off x="1114551" y="3702354"/>
-            <a:ext cx="923925" cy="1133475"/>
-          </a:xfrm>
-          <a:prstGeom prst="rect">
-            <a:avLst/>
-          </a:prstGeom>
-        </p:spPr>
-      </p:pic>
-      <p:grpSp>
-        <p:nvGrpSpPr>
-          <p:cNvPr id="28" name="Group 27">
-            <a:extLst>
-              <a:ext uri="{FF2B5EF4-FFF2-40B4-BE49-F238E27FC236}">
-                <a16:creationId xmlns:a16="http://schemas.microsoft.com/office/drawing/2014/main" id="{3E6C0F19-65A7-4FBE-A8F0-0A375663D886}"/>
-              </a:ext>
-            </a:extLst>
-          </p:cNvPr>
-          <p:cNvGrpSpPr/>
-          <p:nvPr/>
-        </p:nvGrpSpPr>
-        <p:grpSpPr>
-          <a:xfrm>
-            <a:off x="5835443" y="813619"/>
-            <a:ext cx="4105835" cy="1022016"/>
-            <a:chOff x="5835443" y="813619"/>
-            <a:chExt cx="4105835" cy="1022016"/>
-          </a:xfrm>
-        </p:grpSpPr>
-        <p:grpSp>
-          <p:nvGrpSpPr>
-            <p:cNvPr id="25" name="Group 24">
-              <a:extLst>
-                <a:ext uri="{FF2B5EF4-FFF2-40B4-BE49-F238E27FC236}">
-                  <a16:creationId xmlns:a16="http://schemas.microsoft.com/office/drawing/2014/main" id="{11299963-A613-4045-9F7E-423EDB815074}"/>
-                </a:ext>
-              </a:extLst>
-            </p:cNvPr>
-            <p:cNvGrpSpPr/>
-            <p:nvPr/>
-          </p:nvGrpSpPr>
-          <p:grpSpPr>
-            <a:xfrm>
-              <a:off x="5999349" y="951451"/>
-              <a:ext cx="3752271" cy="824992"/>
-              <a:chOff x="5999349" y="951451"/>
-              <a:chExt cx="3752271" cy="824992"/>
-            </a:xfrm>
-          </p:grpSpPr>
-          <p:pic>
-            <p:nvPicPr>
-              <p:cNvPr id="4" name="Picture 3">
-                <a:extLst>
-                  <a:ext uri="{FF2B5EF4-FFF2-40B4-BE49-F238E27FC236}">
-                    <a16:creationId xmlns:a16="http://schemas.microsoft.com/office/drawing/2014/main" id="{C71ED731-ADF6-43CC-AE71-B0E315E8DC0E}"/>
-                  </a:ext>
-                </a:extLst>
-              </p:cNvPr>
-              <p:cNvPicPr>
-                <a:picLocks noChangeAspect="1"/>
-              </p:cNvPicPr>
-              <p:nvPr/>
-            </p:nvPicPr>
-            <p:blipFill>
-              <a:blip r:embed="rId8"/>
-              <a:stretch>
-                <a:fillRect/>
-              </a:stretch>
-            </p:blipFill>
-            <p:spPr>
-              <a:xfrm>
-                <a:off x="5999349" y="1046701"/>
-                <a:ext cx="1000125" cy="704850"/>
-              </a:xfrm>
-              <a:prstGeom prst="rect">
-                <a:avLst/>
-              </a:prstGeom>
-            </p:spPr>
-          </p:pic>
-          <p:pic>
-            <p:nvPicPr>
-              <p:cNvPr id="8" name="Picture 7">
-                <a:extLst>
-                  <a:ext uri="{FF2B5EF4-FFF2-40B4-BE49-F238E27FC236}">
-                    <a16:creationId xmlns:a16="http://schemas.microsoft.com/office/drawing/2014/main" id="{AC831B61-5AD4-4DF9-AD39-6816B0A09948}"/>
+                    <a16:creationId xmlns:a16="http://schemas.microsoft.com/office/drawing/2014/main" id="{D5DCBE6E-8C1E-4D22-B005-D9AE08645FC3}"/>
                   </a:ext>
                 </a:extLst>
               </p:cNvPr>
@@ -3955,8 +4091,8 @@
             </p:blipFill>
             <p:spPr>
               <a:xfrm>
-                <a:off x="7454974" y="951451"/>
-                <a:ext cx="866775" cy="800100"/>
+                <a:off x="8731735" y="349036"/>
+                <a:ext cx="923834" cy="248783"/>
               </a:xfrm>
               <a:prstGeom prst="rect">
                 <a:avLst/>
@@ -3965,10 +4101,10 @@
           </p:pic>
           <p:pic>
             <p:nvPicPr>
-              <p:cNvPr id="22" name="Picture 21">
+              <p:cNvPr id="41" name="Picture 40">
                 <a:extLst>
                   <a:ext uri="{FF2B5EF4-FFF2-40B4-BE49-F238E27FC236}">
-                    <a16:creationId xmlns:a16="http://schemas.microsoft.com/office/drawing/2014/main" id="{E3AA718C-C04C-4FCD-8A70-208C087E51BA}"/>
+                    <a16:creationId xmlns:a16="http://schemas.microsoft.com/office/drawing/2014/main" id="{62567DDE-571A-4B74-8F0E-87AE839A76CF}"/>
                   </a:ext>
                 </a:extLst>
               </p:cNvPr>
@@ -3985,8 +4121,536 @@
             </p:blipFill>
             <p:spPr>
               <a:xfrm>
-                <a:off x="8894370" y="1071593"/>
-                <a:ext cx="857250" cy="704850"/>
+                <a:off x="4356363" y="893175"/>
+                <a:ext cx="473962" cy="398686"/>
+              </a:xfrm>
+              <a:prstGeom prst="rect">
+                <a:avLst/>
+              </a:prstGeom>
+            </p:spPr>
+          </p:pic>
+          <p:cxnSp>
+            <p:nvCxnSpPr>
+              <p:cNvPr id="6" name="Connector: Elbow 5">
+                <a:extLst>
+                  <a:ext uri="{FF2B5EF4-FFF2-40B4-BE49-F238E27FC236}">
+                    <a16:creationId xmlns:a16="http://schemas.microsoft.com/office/drawing/2014/main" id="{B16F135B-4056-421C-948C-59960FAED34B}"/>
+                  </a:ext>
+                </a:extLst>
+              </p:cNvPr>
+              <p:cNvCxnSpPr>
+                <a:cxnSpLocks/>
+                <a:stCxn id="14" idx="5"/>
+                <a:endCxn id="27" idx="2"/>
+              </p:cNvCxnSpPr>
+              <p:nvPr/>
+            </p:nvCxnSpPr>
+            <p:spPr>
+              <a:xfrm flipV="1">
+                <a:off x="4469886" y="1294119"/>
+                <a:ext cx="521538" cy="629353"/>
+              </a:xfrm>
+              <a:prstGeom prst="bentConnector3">
+                <a:avLst/>
+              </a:prstGeom>
+              <a:ln>
+                <a:tailEnd type="triangle"/>
+              </a:ln>
+            </p:spPr>
+            <p:style>
+              <a:lnRef idx="1">
+                <a:schemeClr val="accent1"/>
+              </a:lnRef>
+              <a:fillRef idx="0">
+                <a:schemeClr val="accent1"/>
+              </a:fillRef>
+              <a:effectRef idx="0">
+                <a:schemeClr val="accent1"/>
+              </a:effectRef>
+              <a:fontRef idx="minor">
+                <a:schemeClr val="tx1"/>
+              </a:fontRef>
+            </p:style>
+          </p:cxnSp>
+          <p:sp>
+            <p:nvSpPr>
+              <p:cNvPr id="13" name="TextBox 12">
+                <a:extLst>
+                  <a:ext uri="{FF2B5EF4-FFF2-40B4-BE49-F238E27FC236}">
+                    <a16:creationId xmlns:a16="http://schemas.microsoft.com/office/drawing/2014/main" id="{8E2EDC54-FD58-483B-BA14-BEDB18AF3AF2}"/>
+                  </a:ext>
+                </a:extLst>
+              </p:cNvPr>
+              <p:cNvSpPr txBox="1"/>
+              <p:nvPr/>
+            </p:nvSpPr>
+            <p:spPr>
+              <a:xfrm>
+                <a:off x="5434392" y="307318"/>
+                <a:ext cx="3316292" cy="369332"/>
+              </a:xfrm>
+              <a:prstGeom prst="rect">
+                <a:avLst/>
+              </a:prstGeom>
+              <a:noFill/>
+            </p:spPr>
+            <p:txBody>
+              <a:bodyPr wrap="none" rtlCol="0">
+                <a:spAutoFit/>
+              </a:bodyPr>
+              <a:lstStyle/>
+              <a:p>
+                <a:r>
+                  <a:rPr lang="en-GB" dirty="0"/>
+                  <a:t>Containerized model deployment</a:t>
+                </a:r>
+              </a:p>
+            </p:txBody>
+          </p:sp>
+          <p:sp>
+            <p:nvSpPr>
+              <p:cNvPr id="32" name="TextBox 31">
+                <a:extLst>
+                  <a:ext uri="{FF2B5EF4-FFF2-40B4-BE49-F238E27FC236}">
+                    <a16:creationId xmlns:a16="http://schemas.microsoft.com/office/drawing/2014/main" id="{7A5DE1F8-288A-40A0-A2AF-1A8121D8981B}"/>
+                  </a:ext>
+                </a:extLst>
+              </p:cNvPr>
+              <p:cNvSpPr txBox="1"/>
+              <p:nvPr/>
+            </p:nvSpPr>
+            <p:spPr>
+              <a:xfrm>
+                <a:off x="5115612" y="1875965"/>
+                <a:ext cx="2918619" cy="369332"/>
+              </a:xfrm>
+              <a:prstGeom prst="rect">
+                <a:avLst/>
+              </a:prstGeom>
+              <a:noFill/>
+            </p:spPr>
+            <p:txBody>
+              <a:bodyPr wrap="none" rtlCol="0">
+                <a:spAutoFit/>
+              </a:bodyPr>
+              <a:lstStyle/>
+              <a:p>
+                <a:r>
+                  <a:rPr lang="en-GB" dirty="0"/>
+                  <a:t>Retrieved model deployment</a:t>
+                </a:r>
+              </a:p>
+            </p:txBody>
+          </p:sp>
+          <p:cxnSp>
+            <p:nvCxnSpPr>
+              <p:cNvPr id="26" name="Connector: Elbow 25">
+                <a:extLst>
+                  <a:ext uri="{FF2B5EF4-FFF2-40B4-BE49-F238E27FC236}">
+                    <a16:creationId xmlns:a16="http://schemas.microsoft.com/office/drawing/2014/main" id="{72C65006-3ED4-4C1A-9E25-44865EAA38C2}"/>
+                  </a:ext>
+                </a:extLst>
+              </p:cNvPr>
+              <p:cNvCxnSpPr>
+                <a:cxnSpLocks/>
+                <a:stCxn id="14" idx="5"/>
+                <a:endCxn id="31" idx="2"/>
+              </p:cNvCxnSpPr>
+              <p:nvPr/>
+            </p:nvCxnSpPr>
+            <p:spPr>
+              <a:xfrm>
+                <a:off x="4469886" y="1923472"/>
+                <a:ext cx="380137" cy="941193"/>
+              </a:xfrm>
+              <a:prstGeom prst="bentConnector3">
+                <a:avLst/>
+              </a:prstGeom>
+              <a:ln>
+                <a:tailEnd type="triangle"/>
+              </a:ln>
+            </p:spPr>
+            <p:style>
+              <a:lnRef idx="1">
+                <a:schemeClr val="accent1"/>
+              </a:lnRef>
+              <a:fillRef idx="0">
+                <a:schemeClr val="accent1"/>
+              </a:fillRef>
+              <a:effectRef idx="0">
+                <a:schemeClr val="accent1"/>
+              </a:effectRef>
+              <a:fontRef idx="minor">
+                <a:schemeClr val="tx1"/>
+              </a:fontRef>
+            </p:style>
+          </p:cxnSp>
+          <p:sp>
+            <p:nvSpPr>
+              <p:cNvPr id="30" name="Rectangle 29">
+                <a:extLst>
+                  <a:ext uri="{FF2B5EF4-FFF2-40B4-BE49-F238E27FC236}">
+                    <a16:creationId xmlns:a16="http://schemas.microsoft.com/office/drawing/2014/main" id="{78492EE9-FA46-4937-9F7E-32703EA3641D}"/>
+                  </a:ext>
+                </a:extLst>
+              </p:cNvPr>
+              <p:cNvSpPr/>
+              <p:nvPr/>
+            </p:nvSpPr>
+            <p:spPr>
+              <a:xfrm>
+                <a:off x="9707565" y="2187279"/>
+                <a:ext cx="1828800" cy="845798"/>
+              </a:xfrm>
+              <a:prstGeom prst="rect">
+                <a:avLst/>
+              </a:prstGeom>
+            </p:spPr>
+            <p:style>
+              <a:lnRef idx="2">
+                <a:schemeClr val="accent1">
+                  <a:shade val="50000"/>
+                </a:schemeClr>
+              </a:lnRef>
+              <a:fillRef idx="1">
+                <a:schemeClr val="accent1"/>
+              </a:fillRef>
+              <a:effectRef idx="0">
+                <a:schemeClr val="accent1"/>
+              </a:effectRef>
+              <a:fontRef idx="minor">
+                <a:schemeClr val="lt1"/>
+              </a:fontRef>
+            </p:style>
+            <p:txBody>
+              <a:bodyPr rtlCol="0" anchor="ctr"/>
+              <a:lstStyle/>
+              <a:p>
+                <a:pPr algn="ctr"/>
+                <a:r>
+                  <a:rPr lang="en-GB" dirty="0"/>
+                  <a:t>Batch</a:t>
+                </a:r>
+              </a:p>
+              <a:p>
+                <a:pPr algn="ctr"/>
+                <a:r>
+                  <a:rPr lang="en-GB" dirty="0"/>
+                  <a:t>(Airflow)</a:t>
+                </a:r>
+              </a:p>
+            </p:txBody>
+          </p:sp>
+          <p:sp>
+            <p:nvSpPr>
+              <p:cNvPr id="33" name="TextBox 32">
+                <a:extLst>
+                  <a:ext uri="{FF2B5EF4-FFF2-40B4-BE49-F238E27FC236}">
+                    <a16:creationId xmlns:a16="http://schemas.microsoft.com/office/drawing/2014/main" id="{445C4801-735E-448F-8965-D5EB61710333}"/>
+                  </a:ext>
+                </a:extLst>
+              </p:cNvPr>
+              <p:cNvSpPr txBox="1"/>
+              <p:nvPr/>
+            </p:nvSpPr>
+            <p:spPr>
+              <a:xfrm>
+                <a:off x="9881809" y="307318"/>
+                <a:ext cx="1654556" cy="369332"/>
+              </a:xfrm>
+              <a:prstGeom prst="rect">
+                <a:avLst/>
+              </a:prstGeom>
+              <a:noFill/>
+            </p:spPr>
+            <p:txBody>
+              <a:bodyPr wrap="none" rtlCol="0">
+                <a:spAutoFit/>
+              </a:bodyPr>
+              <a:lstStyle/>
+              <a:p>
+                <a:r>
+                  <a:rPr lang="en-GB" dirty="0"/>
+                  <a:t>Workload types</a:t>
+                </a:r>
+              </a:p>
+            </p:txBody>
+          </p:sp>
+          <p:sp>
+            <p:nvSpPr>
+              <p:cNvPr id="38" name="Rectangle 37">
+                <a:extLst>
+                  <a:ext uri="{FF2B5EF4-FFF2-40B4-BE49-F238E27FC236}">
+                    <a16:creationId xmlns:a16="http://schemas.microsoft.com/office/drawing/2014/main" id="{38E19B20-1728-40B3-B252-01BAEB65211E}"/>
+                  </a:ext>
+                </a:extLst>
+              </p:cNvPr>
+              <p:cNvSpPr/>
+              <p:nvPr/>
+            </p:nvSpPr>
+            <p:spPr>
+              <a:xfrm>
+                <a:off x="9794687" y="615716"/>
+                <a:ext cx="1828800" cy="845798"/>
+              </a:xfrm>
+              <a:prstGeom prst="rect">
+                <a:avLst/>
+              </a:prstGeom>
+            </p:spPr>
+            <p:style>
+              <a:lnRef idx="2">
+                <a:schemeClr val="accent1">
+                  <a:shade val="50000"/>
+                </a:schemeClr>
+              </a:lnRef>
+              <a:fillRef idx="1">
+                <a:schemeClr val="accent1"/>
+              </a:fillRef>
+              <a:effectRef idx="0">
+                <a:schemeClr val="accent1"/>
+              </a:effectRef>
+              <a:fontRef idx="minor">
+                <a:schemeClr val="lt1"/>
+              </a:fontRef>
+            </p:style>
+            <p:txBody>
+              <a:bodyPr rtlCol="0" anchor="ctr"/>
+              <a:lstStyle/>
+              <a:p>
+                <a:pPr algn="ctr"/>
+                <a:r>
+                  <a:rPr lang="en-GB" dirty="0"/>
+                  <a:t>Online</a:t>
+                </a:r>
+              </a:p>
+            </p:txBody>
+          </p:sp>
+          <p:cxnSp>
+            <p:nvCxnSpPr>
+              <p:cNvPr id="35" name="Straight Arrow Connector 34">
+                <a:extLst>
+                  <a:ext uri="{FF2B5EF4-FFF2-40B4-BE49-F238E27FC236}">
+                    <a16:creationId xmlns:a16="http://schemas.microsoft.com/office/drawing/2014/main" id="{3C71C2B1-5EFD-43E9-83AD-35787C4A343F}"/>
+                  </a:ext>
+                </a:extLst>
+              </p:cNvPr>
+              <p:cNvCxnSpPr>
+                <a:stCxn id="38" idx="1"/>
+                <a:endCxn id="27" idx="5"/>
+              </p:cNvCxnSpPr>
+              <p:nvPr/>
+            </p:nvCxnSpPr>
+            <p:spPr>
+              <a:xfrm flipH="1">
+                <a:off x="9097259" y="1038615"/>
+                <a:ext cx="697428" cy="0"/>
+              </a:xfrm>
+              <a:prstGeom prst="straightConnector1">
+                <a:avLst/>
+              </a:prstGeom>
+              <a:ln>
+                <a:tailEnd type="triangle"/>
+              </a:ln>
+            </p:spPr>
+            <p:style>
+              <a:lnRef idx="1">
+                <a:schemeClr val="accent1"/>
+              </a:lnRef>
+              <a:fillRef idx="0">
+                <a:schemeClr val="accent1"/>
+              </a:fillRef>
+              <a:effectRef idx="0">
+                <a:schemeClr val="accent1"/>
+              </a:effectRef>
+              <a:fontRef idx="minor">
+                <a:schemeClr val="tx1"/>
+              </a:fontRef>
+            </p:style>
+          </p:cxnSp>
+          <p:sp>
+            <p:nvSpPr>
+              <p:cNvPr id="42" name="TextBox 41">
+                <a:extLst>
+                  <a:ext uri="{FF2B5EF4-FFF2-40B4-BE49-F238E27FC236}">
+                    <a16:creationId xmlns:a16="http://schemas.microsoft.com/office/drawing/2014/main" id="{0C96020C-483D-4E23-97BD-799026B4919E}"/>
+                  </a:ext>
+                </a:extLst>
+              </p:cNvPr>
+              <p:cNvSpPr txBox="1"/>
+              <p:nvPr/>
+            </p:nvSpPr>
+            <p:spPr>
+              <a:xfrm>
+                <a:off x="9201496" y="1098706"/>
+                <a:ext cx="524503" cy="646331"/>
+              </a:xfrm>
+              <a:prstGeom prst="rect">
+                <a:avLst/>
+              </a:prstGeom>
+              <a:noFill/>
+            </p:spPr>
+            <p:txBody>
+              <a:bodyPr wrap="square" rtlCol="0">
+                <a:spAutoFit/>
+              </a:bodyPr>
+              <a:lstStyle/>
+              <a:p>
+                <a:r>
+                  <a:rPr lang="en-GB" dirty="0"/>
+                  <a:t>Call</a:t>
+                </a:r>
+              </a:p>
+              <a:p>
+                <a:r>
+                  <a:rPr lang="en-GB" dirty="0"/>
+                  <a:t>API</a:t>
+                </a:r>
+              </a:p>
+            </p:txBody>
+          </p:sp>
+          <p:cxnSp>
+            <p:nvCxnSpPr>
+              <p:cNvPr id="44" name="Straight Arrow Connector 43">
+                <a:extLst>
+                  <a:ext uri="{FF2B5EF4-FFF2-40B4-BE49-F238E27FC236}">
+                    <a16:creationId xmlns:a16="http://schemas.microsoft.com/office/drawing/2014/main" id="{233D3E2C-E19E-42DB-A0DB-A730C43FB496}"/>
+                  </a:ext>
+                </a:extLst>
+              </p:cNvPr>
+              <p:cNvCxnSpPr>
+                <a:stCxn id="30" idx="1"/>
+                <a:endCxn id="31" idx="5"/>
+              </p:cNvCxnSpPr>
+              <p:nvPr/>
+            </p:nvCxnSpPr>
+            <p:spPr>
+              <a:xfrm flipH="1" flipV="1">
+                <a:off x="6296657" y="2609161"/>
+                <a:ext cx="3410908" cy="1017"/>
+              </a:xfrm>
+              <a:prstGeom prst="straightConnector1">
+                <a:avLst/>
+              </a:prstGeom>
+              <a:ln>
+                <a:tailEnd type="triangle"/>
+              </a:ln>
+            </p:spPr>
+            <p:style>
+              <a:lnRef idx="1">
+                <a:schemeClr val="accent1"/>
+              </a:lnRef>
+              <a:fillRef idx="0">
+                <a:schemeClr val="accent1"/>
+              </a:fillRef>
+              <a:effectRef idx="0">
+                <a:schemeClr val="accent1"/>
+              </a:effectRef>
+              <a:fontRef idx="minor">
+                <a:schemeClr val="tx1"/>
+              </a:fontRef>
+            </p:style>
+          </p:cxnSp>
+          <p:sp>
+            <p:nvSpPr>
+              <p:cNvPr id="46" name="TextBox 45">
+                <a:extLst>
+                  <a:ext uri="{FF2B5EF4-FFF2-40B4-BE49-F238E27FC236}">
+                    <a16:creationId xmlns:a16="http://schemas.microsoft.com/office/drawing/2014/main" id="{53FAD112-4279-441F-9562-C6A351BA9E58}"/>
+                  </a:ext>
+                </a:extLst>
+              </p:cNvPr>
+              <p:cNvSpPr txBox="1"/>
+              <p:nvPr/>
+            </p:nvSpPr>
+            <p:spPr>
+              <a:xfrm>
+                <a:off x="7808281" y="2277981"/>
+                <a:ext cx="1637692" cy="369332"/>
+              </a:xfrm>
+              <a:prstGeom prst="rect">
+                <a:avLst/>
+              </a:prstGeom>
+              <a:noFill/>
+            </p:spPr>
+            <p:txBody>
+              <a:bodyPr wrap="none" rtlCol="0">
+                <a:spAutoFit/>
+              </a:bodyPr>
+              <a:lstStyle/>
+              <a:p>
+                <a:r>
+                  <a:rPr lang="en-GB" dirty="0"/>
+                  <a:t>Orchestrate job</a:t>
+                </a:r>
+              </a:p>
+            </p:txBody>
+          </p:sp>
+          <p:pic>
+            <p:nvPicPr>
+              <p:cNvPr id="48" name="Picture 47">
+                <a:extLst>
+                  <a:ext uri="{FF2B5EF4-FFF2-40B4-BE49-F238E27FC236}">
+                    <a16:creationId xmlns:a16="http://schemas.microsoft.com/office/drawing/2014/main" id="{964B214E-C13E-4A2B-A326-DF7BE62E29B4}"/>
+                  </a:ext>
+                </a:extLst>
+              </p:cNvPr>
+              <p:cNvPicPr>
+                <a:picLocks noChangeAspect="1"/>
+              </p:cNvPicPr>
+              <p:nvPr/>
+            </p:nvPicPr>
+            <p:blipFill>
+              <a:blip r:embed="rId11">
+                <a:extLst>
+                  <a:ext uri="{BEBA8EAE-BF5A-486C-A8C5-ECC9F3942E4B}">
+                    <a14:imgProps xmlns:a14="http://schemas.microsoft.com/office/drawing/2010/main">
+                      <a14:imgLayer r:embed="rId12">
+                        <a14:imgEffect>
+                          <a14:brightnessContrast contrast="40000"/>
+                        </a14:imgEffect>
+                      </a14:imgLayer>
+                    </a14:imgProps>
+                  </a:ext>
+                </a:extLst>
+              </a:blip>
+              <a:stretch>
+                <a:fillRect/>
+              </a:stretch>
+            </p:blipFill>
+            <p:spPr>
+              <a:xfrm>
+                <a:off x="230989" y="393836"/>
+                <a:ext cx="1482345" cy="646331"/>
+              </a:xfrm>
+              <a:prstGeom prst="rect">
+                <a:avLst/>
+              </a:prstGeom>
+            </p:spPr>
+          </p:pic>
+          <p:pic>
+            <p:nvPicPr>
+              <p:cNvPr id="49" name="Picture 48">
+                <a:extLst>
+                  <a:ext uri="{FF2B5EF4-FFF2-40B4-BE49-F238E27FC236}">
+                    <a16:creationId xmlns:a16="http://schemas.microsoft.com/office/drawing/2014/main" id="{EA9F67CE-574D-47A5-AB66-E050385A37A7}"/>
+                  </a:ext>
+                </a:extLst>
+              </p:cNvPr>
+              <p:cNvPicPr>
+                <a:picLocks noChangeAspect="1"/>
+              </p:cNvPicPr>
+              <p:nvPr/>
+            </p:nvPicPr>
+            <p:blipFill>
+              <a:blip r:embed="rId13"/>
+              <a:stretch>
+                <a:fillRect/>
+              </a:stretch>
+            </p:blipFill>
+            <p:spPr>
+              <a:xfrm>
+                <a:off x="3983970" y="959944"/>
+                <a:ext cx="452947" cy="555677"/>
               </a:xfrm>
               <a:prstGeom prst="rect">
                 <a:avLst/>
@@ -3996,219 +4660,222 @@
         </p:grpSp>
         <p:sp>
           <p:nvSpPr>
-            <p:cNvPr id="27" name="Cube 26">
+            <p:cNvPr id="40" name="TextBox 39">
               <a:extLst>
                 <a:ext uri="{FF2B5EF4-FFF2-40B4-BE49-F238E27FC236}">
-                  <a16:creationId xmlns:a16="http://schemas.microsoft.com/office/drawing/2014/main" id="{C3FD1A3F-3FC4-45C4-BDAB-0AF97E495A10}"/>
+                  <a16:creationId xmlns:a16="http://schemas.microsoft.com/office/drawing/2014/main" id="{F4E33A39-1BDD-44C6-8D77-8FB9AB95E31E}"/>
                 </a:ext>
               </a:extLst>
             </p:cNvPr>
-            <p:cNvSpPr/>
+            <p:cNvSpPr txBox="1"/>
             <p:nvPr/>
           </p:nvSpPr>
           <p:spPr>
             <a:xfrm>
-              <a:off x="5835443" y="813619"/>
-              <a:ext cx="4105835" cy="1022016"/>
+              <a:off x="7921376" y="2578211"/>
+              <a:ext cx="681340" cy="369332"/>
             </a:xfrm>
-            <a:prstGeom prst="cube">
+            <a:prstGeom prst="rect">
               <a:avLst/>
             </a:prstGeom>
             <a:noFill/>
           </p:spPr>
+          <p:txBody>
+            <a:bodyPr wrap="none" rtlCol="0">
+              <a:spAutoFit/>
+            </a:bodyPr>
+            <a:lstStyle/>
+            <a:p>
+              <a:r>
+                <a:rPr lang="en-GB" dirty="0"/>
+                <a:t>LOGS</a:t>
+              </a:r>
+            </a:p>
+          </p:txBody>
+        </p:sp>
+        <p:sp>
+          <p:nvSpPr>
+            <p:cNvPr id="43" name="TextBox 42">
+              <a:extLst>
+                <a:ext uri="{FF2B5EF4-FFF2-40B4-BE49-F238E27FC236}">
+                  <a16:creationId xmlns:a16="http://schemas.microsoft.com/office/drawing/2014/main" id="{0F60C258-DB07-488B-95D7-469C3F748E17}"/>
+                </a:ext>
+              </a:extLst>
+            </p:cNvPr>
+            <p:cNvSpPr txBox="1"/>
+            <p:nvPr/>
+          </p:nvSpPr>
+          <p:spPr>
+            <a:xfrm>
+              <a:off x="5056612" y="2602883"/>
+              <a:ext cx="545277" cy="369332"/>
+            </a:xfrm>
+            <a:prstGeom prst="rect">
+              <a:avLst/>
+            </a:prstGeom>
+            <a:noFill/>
+          </p:spPr>
+          <p:txBody>
+            <a:bodyPr wrap="none" rtlCol="0">
+              <a:spAutoFit/>
+            </a:bodyPr>
+            <a:lstStyle/>
+            <a:p>
+              <a:r>
+                <a:rPr lang="en-GB" dirty="0"/>
+                <a:t>ACS</a:t>
+              </a:r>
+            </a:p>
+          </p:txBody>
+        </p:sp>
+        <p:sp>
+          <p:nvSpPr>
+            <p:cNvPr id="45" name="TextBox 44">
+              <a:extLst>
+                <a:ext uri="{FF2B5EF4-FFF2-40B4-BE49-F238E27FC236}">
+                  <a16:creationId xmlns:a16="http://schemas.microsoft.com/office/drawing/2014/main" id="{058A5B6B-BB53-445B-B003-AFAF0DAC7CB1}"/>
+                </a:ext>
+              </a:extLst>
+            </p:cNvPr>
+            <p:cNvSpPr txBox="1"/>
+            <p:nvPr/>
+          </p:nvSpPr>
+          <p:spPr>
+            <a:xfrm>
+              <a:off x="6322625" y="2578211"/>
+              <a:ext cx="541687" cy="369332"/>
+            </a:xfrm>
+            <a:prstGeom prst="rect">
+              <a:avLst/>
+            </a:prstGeom>
+            <a:noFill/>
+          </p:spPr>
+          <p:txBody>
+            <a:bodyPr wrap="none" rtlCol="0">
+              <a:spAutoFit/>
+            </a:bodyPr>
+            <a:lstStyle/>
+            <a:p>
+              <a:r>
+                <a:rPr lang="en-GB" dirty="0"/>
+                <a:t>AKS</a:t>
+              </a:r>
+            </a:p>
+          </p:txBody>
+        </p:sp>
+        <p:pic>
+          <p:nvPicPr>
+            <p:cNvPr id="23" name="Picture 22">
+              <a:extLst>
+                <a:ext uri="{FF2B5EF4-FFF2-40B4-BE49-F238E27FC236}">
+                  <a16:creationId xmlns:a16="http://schemas.microsoft.com/office/drawing/2014/main" id="{23E531A5-72A8-4F0A-99DA-7979049C4B92}"/>
+                </a:ext>
+              </a:extLst>
+            </p:cNvPr>
+            <p:cNvPicPr>
+              <a:picLocks noChangeAspect="1"/>
+            </p:cNvPicPr>
+            <p:nvPr/>
+          </p:nvPicPr>
+          <p:blipFill rotWithShape="1">
+            <a:blip r:embed="rId14"/>
+            <a:srcRect l="15788" r="20418" b="40130"/>
+            <a:stretch/>
+          </p:blipFill>
+          <p:spPr>
+            <a:xfrm>
+              <a:off x="8366283" y="2182113"/>
+              <a:ext cx="520982" cy="462607"/>
+            </a:xfrm>
+            <a:prstGeom prst="rect">
+              <a:avLst/>
+            </a:prstGeom>
+          </p:spPr>
+        </p:pic>
+        <p:cxnSp>
+          <p:nvCxnSpPr>
+            <p:cNvPr id="29" name="Straight Arrow Connector 28">
+              <a:extLst>
+                <a:ext uri="{FF2B5EF4-FFF2-40B4-BE49-F238E27FC236}">
+                  <a16:creationId xmlns:a16="http://schemas.microsoft.com/office/drawing/2014/main" id="{6A547D07-77EE-4C51-8504-C342B1C7919A}"/>
+                </a:ext>
+              </a:extLst>
+            </p:cNvPr>
+            <p:cNvCxnSpPr>
+              <a:stCxn id="4" idx="3"/>
+              <a:endCxn id="8" idx="1"/>
+            </p:cNvCxnSpPr>
+            <p:nvPr/>
+          </p:nvCxnSpPr>
+          <p:spPr>
+            <a:xfrm flipV="1">
+              <a:off x="6206971" y="2468250"/>
+              <a:ext cx="455500" cy="8988"/>
+            </a:xfrm>
+            <a:prstGeom prst="straightConnector1">
+              <a:avLst/>
+            </a:prstGeom>
+            <a:ln>
+              <a:tailEnd type="triangle"/>
+            </a:ln>
+          </p:spPr>
           <p:style>
-            <a:lnRef idx="2">
-              <a:schemeClr val="accent1">
-                <a:shade val="50000"/>
-              </a:schemeClr>
+            <a:lnRef idx="1">
+              <a:schemeClr val="accent1"/>
             </a:lnRef>
-            <a:fillRef idx="1">
+            <a:fillRef idx="0">
               <a:schemeClr val="accent1"/>
             </a:fillRef>
             <a:effectRef idx="0">
               <a:schemeClr val="accent1"/>
             </a:effectRef>
             <a:fontRef idx="minor">
-              <a:schemeClr val="lt1"/>
+              <a:schemeClr val="tx1"/>
             </a:fontRef>
           </p:style>
-          <p:txBody>
-            <a:bodyPr rtlCol="0" anchor="ctr"/>
-            <a:lstStyle/>
-            <a:p>
-              <a:pPr algn="ctr"/>
-              <a:endParaRPr lang="en-GB"/>
-            </a:p>
-          </p:txBody>
-        </p:sp>
+        </p:cxnSp>
+        <p:cxnSp>
+          <p:nvCxnSpPr>
+            <p:cNvPr id="36" name="Straight Arrow Connector 35">
+              <a:extLst>
+                <a:ext uri="{FF2B5EF4-FFF2-40B4-BE49-F238E27FC236}">
+                  <a16:creationId xmlns:a16="http://schemas.microsoft.com/office/drawing/2014/main" id="{6CFE45C8-F237-4EC7-8982-B901CBFB7F7D}"/>
+                </a:ext>
+              </a:extLst>
+            </p:cNvPr>
+            <p:cNvCxnSpPr>
+              <a:stCxn id="8" idx="3"/>
+            </p:cNvCxnSpPr>
+            <p:nvPr/>
+          </p:nvCxnSpPr>
+          <p:spPr>
+            <a:xfrm>
+              <a:off x="7529246" y="2468250"/>
+              <a:ext cx="732800" cy="0"/>
+            </a:xfrm>
+            <a:prstGeom prst="straightConnector1">
+              <a:avLst/>
+            </a:prstGeom>
+            <a:ln>
+              <a:tailEnd type="triangle"/>
+            </a:ln>
+          </p:spPr>
+          <p:style>
+            <a:lnRef idx="1">
+              <a:schemeClr val="accent1"/>
+            </a:lnRef>
+            <a:fillRef idx="0">
+              <a:schemeClr val="accent1"/>
+            </a:fillRef>
+            <a:effectRef idx="0">
+              <a:schemeClr val="accent1"/>
+            </a:effectRef>
+            <a:fontRef idx="minor">
+              <a:schemeClr val="tx1"/>
+            </a:fontRef>
+          </p:style>
+        </p:cxnSp>
       </p:grpSp>
-      <p:sp>
-        <p:nvSpPr>
-          <p:cNvPr id="31" name="Cube 30">
-            <a:extLst>
-              <a:ext uri="{FF2B5EF4-FFF2-40B4-BE49-F238E27FC236}">
-                <a16:creationId xmlns:a16="http://schemas.microsoft.com/office/drawing/2014/main" id="{33F0EC28-7B6B-48A0-8FEF-7D4AE721C3E3}"/>
-              </a:ext>
-            </a:extLst>
-          </p:cNvPr>
-          <p:cNvSpPr/>
-          <p:nvPr/>
-        </p:nvSpPr>
-        <p:spPr>
-          <a:xfrm>
-            <a:off x="5727273" y="2406984"/>
-            <a:ext cx="1446634" cy="1022016"/>
-          </a:xfrm>
-          <a:prstGeom prst="cube">
-            <a:avLst/>
-          </a:prstGeom>
-          <a:noFill/>
-        </p:spPr>
-        <p:style>
-          <a:lnRef idx="2">
-            <a:schemeClr val="accent1">
-              <a:shade val="50000"/>
-            </a:schemeClr>
-          </a:lnRef>
-          <a:fillRef idx="1">
-            <a:schemeClr val="accent1"/>
-          </a:fillRef>
-          <a:effectRef idx="0">
-            <a:schemeClr val="accent1"/>
-          </a:effectRef>
-          <a:fontRef idx="minor">
-            <a:schemeClr val="lt1"/>
-          </a:fontRef>
-        </p:style>
-        <p:txBody>
-          <a:bodyPr rtlCol="0" anchor="ctr"/>
-          <a:lstStyle/>
-          <a:p>
-            <a:pPr algn="ctr"/>
-            <a:endParaRPr lang="en-GB"/>
-          </a:p>
-        </p:txBody>
-      </p:sp>
-      <p:pic>
-        <p:nvPicPr>
-          <p:cNvPr id="36" name="Picture 35">
-            <a:extLst>
-              <a:ext uri="{FF2B5EF4-FFF2-40B4-BE49-F238E27FC236}">
-                <a16:creationId xmlns:a16="http://schemas.microsoft.com/office/drawing/2014/main" id="{B4995401-7BB6-427F-A1F0-5802AFD2A063}"/>
-              </a:ext>
-            </a:extLst>
-          </p:cNvPr>
-          <p:cNvPicPr>
-            <a:picLocks noChangeAspect="1"/>
-          </p:cNvPicPr>
-          <p:nvPr/>
-        </p:nvPicPr>
-        <p:blipFill>
-          <a:blip r:embed="rId11"/>
-          <a:stretch>
-            <a:fillRect/>
-          </a:stretch>
-        </p:blipFill>
-        <p:spPr>
-          <a:xfrm>
-            <a:off x="2615397" y="3875008"/>
-            <a:ext cx="1101902" cy="788166"/>
-          </a:xfrm>
-          <a:prstGeom prst="rect">
-            <a:avLst/>
-          </a:prstGeom>
-        </p:spPr>
-      </p:pic>
-      <p:pic>
-        <p:nvPicPr>
-          <p:cNvPr id="37" name="Picture 36">
-            <a:extLst>
-              <a:ext uri="{FF2B5EF4-FFF2-40B4-BE49-F238E27FC236}">
-                <a16:creationId xmlns:a16="http://schemas.microsoft.com/office/drawing/2014/main" id="{01B5E9C8-6A15-4721-9B40-FC9AE2E1E280}"/>
-              </a:ext>
-            </a:extLst>
-          </p:cNvPr>
-          <p:cNvPicPr>
-            <a:picLocks noChangeAspect="1"/>
-          </p:cNvPicPr>
-          <p:nvPr/>
-        </p:nvPicPr>
-        <p:blipFill>
-          <a:blip r:embed="rId5"/>
-          <a:stretch>
-            <a:fillRect/>
-          </a:stretch>
-        </p:blipFill>
-        <p:spPr>
-          <a:xfrm>
-            <a:off x="1789220" y="5281333"/>
-            <a:ext cx="1162050" cy="485775"/>
-          </a:xfrm>
-          <a:prstGeom prst="rect">
-            <a:avLst/>
-          </a:prstGeom>
-        </p:spPr>
-      </p:pic>
-      <p:pic>
-        <p:nvPicPr>
-          <p:cNvPr id="39" name="Picture 38">
-            <a:extLst>
-              <a:ext uri="{FF2B5EF4-FFF2-40B4-BE49-F238E27FC236}">
-                <a16:creationId xmlns:a16="http://schemas.microsoft.com/office/drawing/2014/main" id="{D5DCBE6E-8C1E-4D22-B005-D9AE08645FC3}"/>
-              </a:ext>
-            </a:extLst>
-          </p:cNvPr>
-          <p:cNvPicPr>
-            <a:picLocks noChangeAspect="1"/>
-          </p:cNvPicPr>
-          <p:nvPr/>
-        </p:nvPicPr>
-        <p:blipFill>
-          <a:blip r:embed="rId12"/>
-          <a:stretch>
-            <a:fillRect/>
-          </a:stretch>
-        </p:blipFill>
-        <p:spPr>
-          <a:xfrm>
-            <a:off x="3502007" y="5167857"/>
-            <a:ext cx="1349332" cy="363367"/>
-          </a:xfrm>
-          <a:prstGeom prst="rect">
-            <a:avLst/>
-          </a:prstGeom>
-        </p:spPr>
-      </p:pic>
-      <p:pic>
-        <p:nvPicPr>
-          <p:cNvPr id="41" name="Picture 40">
-            <a:extLst>
-              <a:ext uri="{FF2B5EF4-FFF2-40B4-BE49-F238E27FC236}">
-                <a16:creationId xmlns:a16="http://schemas.microsoft.com/office/drawing/2014/main" id="{62567DDE-571A-4B74-8F0E-87AE839A76CF}"/>
-              </a:ext>
-            </a:extLst>
-          </p:cNvPr>
-          <p:cNvPicPr>
-            <a:picLocks noChangeAspect="1"/>
-          </p:cNvPicPr>
-          <p:nvPr/>
-        </p:nvPicPr>
-        <p:blipFill>
-          <a:blip r:embed="rId13"/>
-          <a:stretch>
-            <a:fillRect/>
-          </a:stretch>
-        </p:blipFill>
-        <p:spPr>
-          <a:xfrm>
-            <a:off x="5344345" y="5167857"/>
-            <a:ext cx="751655" cy="632275"/>
-          </a:xfrm>
-          <a:prstGeom prst="rect">
-            <a:avLst/>
-          </a:prstGeom>
-        </p:spPr>
-      </p:pic>
     </p:spTree>
     <p:extLst>
       <p:ext uri="{BB962C8B-B14F-4D97-AF65-F5344CB8AC3E}">

</xml_diff>

<commit_message>
fast api and gitignore
</commit_message>
<xml_diff>
--- a/.github/MLOPS project overview.pptx
+++ b/.github/MLOPS project overview.pptx
@@ -261,7 +261,7 @@
           <a:p>
             <a:fld id="{AE4AF83A-EA3E-4332-8308-96A2DEFAAF7F}" type="datetimeFigureOut">
               <a:rPr lang="en-GB" smtClean="0"/>
-              <a:t>02/05/2022</a:t>
+              <a:t>03/05/2022</a:t>
             </a:fld>
             <a:endParaRPr lang="en-GB"/>
           </a:p>
@@ -461,7 +461,7 @@
           <a:p>
             <a:fld id="{AE4AF83A-EA3E-4332-8308-96A2DEFAAF7F}" type="datetimeFigureOut">
               <a:rPr lang="en-GB" smtClean="0"/>
-              <a:t>02/05/2022</a:t>
+              <a:t>03/05/2022</a:t>
             </a:fld>
             <a:endParaRPr lang="en-GB"/>
           </a:p>
@@ -671,7 +671,7 @@
           <a:p>
             <a:fld id="{AE4AF83A-EA3E-4332-8308-96A2DEFAAF7F}" type="datetimeFigureOut">
               <a:rPr lang="en-GB" smtClean="0"/>
-              <a:t>02/05/2022</a:t>
+              <a:t>03/05/2022</a:t>
             </a:fld>
             <a:endParaRPr lang="en-GB"/>
           </a:p>
@@ -871,7 +871,7 @@
           <a:p>
             <a:fld id="{AE4AF83A-EA3E-4332-8308-96A2DEFAAF7F}" type="datetimeFigureOut">
               <a:rPr lang="en-GB" smtClean="0"/>
-              <a:t>02/05/2022</a:t>
+              <a:t>03/05/2022</a:t>
             </a:fld>
             <a:endParaRPr lang="en-GB"/>
           </a:p>
@@ -1147,7 +1147,7 @@
           <a:p>
             <a:fld id="{AE4AF83A-EA3E-4332-8308-96A2DEFAAF7F}" type="datetimeFigureOut">
               <a:rPr lang="en-GB" smtClean="0"/>
-              <a:t>02/05/2022</a:t>
+              <a:t>03/05/2022</a:t>
             </a:fld>
             <a:endParaRPr lang="en-GB"/>
           </a:p>
@@ -1415,7 +1415,7 @@
           <a:p>
             <a:fld id="{AE4AF83A-EA3E-4332-8308-96A2DEFAAF7F}" type="datetimeFigureOut">
               <a:rPr lang="en-GB" smtClean="0"/>
-              <a:t>02/05/2022</a:t>
+              <a:t>03/05/2022</a:t>
             </a:fld>
             <a:endParaRPr lang="en-GB"/>
           </a:p>
@@ -1830,7 +1830,7 @@
           <a:p>
             <a:fld id="{AE4AF83A-EA3E-4332-8308-96A2DEFAAF7F}" type="datetimeFigureOut">
               <a:rPr lang="en-GB" smtClean="0"/>
-              <a:t>02/05/2022</a:t>
+              <a:t>03/05/2022</a:t>
             </a:fld>
             <a:endParaRPr lang="en-GB"/>
           </a:p>
@@ -1972,7 +1972,7 @@
           <a:p>
             <a:fld id="{AE4AF83A-EA3E-4332-8308-96A2DEFAAF7F}" type="datetimeFigureOut">
               <a:rPr lang="en-GB" smtClean="0"/>
-              <a:t>02/05/2022</a:t>
+              <a:t>03/05/2022</a:t>
             </a:fld>
             <a:endParaRPr lang="en-GB"/>
           </a:p>
@@ -2085,7 +2085,7 @@
           <a:p>
             <a:fld id="{AE4AF83A-EA3E-4332-8308-96A2DEFAAF7F}" type="datetimeFigureOut">
               <a:rPr lang="en-GB" smtClean="0"/>
-              <a:t>02/05/2022</a:t>
+              <a:t>03/05/2022</a:t>
             </a:fld>
             <a:endParaRPr lang="en-GB"/>
           </a:p>
@@ -2398,7 +2398,7 @@
           <a:p>
             <a:fld id="{AE4AF83A-EA3E-4332-8308-96A2DEFAAF7F}" type="datetimeFigureOut">
               <a:rPr lang="en-GB" smtClean="0"/>
-              <a:t>02/05/2022</a:t>
+              <a:t>03/05/2022</a:t>
             </a:fld>
             <a:endParaRPr lang="en-GB"/>
           </a:p>
@@ -2687,7 +2687,7 @@
           <a:p>
             <a:fld id="{AE4AF83A-EA3E-4332-8308-96A2DEFAAF7F}" type="datetimeFigureOut">
               <a:rPr lang="en-GB" smtClean="0"/>
-              <a:t>02/05/2022</a:t>
+              <a:t>03/05/2022</a:t>
             </a:fld>
             <a:endParaRPr lang="en-GB"/>
           </a:p>
@@ -2930,7 +2930,7 @@
           <a:p>
             <a:fld id="{AE4AF83A-EA3E-4332-8308-96A2DEFAAF7F}" type="datetimeFigureOut">
               <a:rPr lang="en-GB" smtClean="0"/>
-              <a:t>02/05/2022</a:t>
+              <a:t>03/05/2022</a:t>
             </a:fld>
             <a:endParaRPr lang="en-GB"/>
           </a:p>
@@ -3347,12 +3347,42 @@
           <a:chExt cx="0" cy="0"/>
         </a:xfrm>
       </p:grpSpPr>
+      <p:pic>
+        <p:nvPicPr>
+          <p:cNvPr id="10" name="Picture 9">
+            <a:extLst>
+              <a:ext uri="{FF2B5EF4-FFF2-40B4-BE49-F238E27FC236}">
+                <a16:creationId xmlns:a16="http://schemas.microsoft.com/office/drawing/2014/main" id="{D9DA92C8-9984-4642-B997-A6CEF1E756AF}"/>
+              </a:ext>
+            </a:extLst>
+          </p:cNvPr>
+          <p:cNvPicPr>
+            <a:picLocks noChangeAspect="1"/>
+          </p:cNvPicPr>
+          <p:nvPr/>
+        </p:nvPicPr>
+        <p:blipFill>
+          <a:blip r:embed="rId2"/>
+          <a:stretch>
+            <a:fillRect/>
+          </a:stretch>
+        </p:blipFill>
+        <p:spPr>
+          <a:xfrm>
+            <a:off x="8404175" y="1728481"/>
+            <a:ext cx="679296" cy="583395"/>
+          </a:xfrm>
+          <a:prstGeom prst="rect">
+            <a:avLst/>
+          </a:prstGeom>
+        </p:spPr>
+      </p:pic>
       <p:grpSp>
         <p:nvGrpSpPr>
-          <p:cNvPr id="37" name="Group 36">
-            <a:extLst>
-              <a:ext uri="{FF2B5EF4-FFF2-40B4-BE49-F238E27FC236}">
-                <a16:creationId xmlns:a16="http://schemas.microsoft.com/office/drawing/2014/main" id="{5C738D8B-1C32-4B64-8A24-F553CE314B2F}"/>
+          <p:cNvPr id="54" name="Group 53">
+            <a:extLst>
+              <a:ext uri="{FF2B5EF4-FFF2-40B4-BE49-F238E27FC236}">
+                <a16:creationId xmlns:a16="http://schemas.microsoft.com/office/drawing/2014/main" id="{1F3B8217-E9D9-4B3A-AA22-4FEA608226E1}"/>
               </a:ext>
             </a:extLst>
           </p:cNvPr>
@@ -3361,18 +3391,18 @@
         </p:nvGrpSpPr>
         <p:grpSpPr>
           <a:xfrm>
-            <a:off x="232738" y="1543690"/>
-            <a:ext cx="11442265" cy="3142695"/>
+            <a:off x="374867" y="1080051"/>
+            <a:ext cx="11442265" cy="5125929"/>
             <a:chOff x="232738" y="1543690"/>
-            <a:chExt cx="11442265" cy="3142695"/>
+            <a:chExt cx="11442265" cy="5125929"/>
           </a:xfrm>
         </p:grpSpPr>
         <p:grpSp>
           <p:nvGrpSpPr>
-            <p:cNvPr id="50" name="Group 49">
+            <p:cNvPr id="47" name="Group 46">
               <a:extLst>
                 <a:ext uri="{FF2B5EF4-FFF2-40B4-BE49-F238E27FC236}">
-                  <a16:creationId xmlns:a16="http://schemas.microsoft.com/office/drawing/2014/main" id="{0215EDFD-9E11-40A3-A02F-508A3B91E5FD}"/>
+                  <a16:creationId xmlns:a16="http://schemas.microsoft.com/office/drawing/2014/main" id="{21A0D31D-194E-4AA2-BF8A-270A869CDB4D}"/>
                 </a:ext>
               </a:extLst>
             </p:cNvPr>
@@ -3382,17 +3412,17 @@
           <p:grpSpPr>
             <a:xfrm>
               <a:off x="232738" y="1543690"/>
-              <a:ext cx="11442265" cy="3142695"/>
-              <a:chOff x="181222" y="307318"/>
-              <a:chExt cx="11442265" cy="3142695"/>
+              <a:ext cx="11442265" cy="4518729"/>
+              <a:chOff x="232738" y="1543690"/>
+              <a:chExt cx="11442265" cy="4518729"/>
             </a:xfrm>
           </p:grpSpPr>
           <p:grpSp>
             <p:nvGrpSpPr>
-              <p:cNvPr id="21" name="Group 20">
+              <p:cNvPr id="37" name="Group 36">
                 <a:extLst>
                   <a:ext uri="{FF2B5EF4-FFF2-40B4-BE49-F238E27FC236}">
-                    <a16:creationId xmlns:a16="http://schemas.microsoft.com/office/drawing/2014/main" id="{8886BEB6-794C-4EFA-B728-B210963FB472}"/>
+                    <a16:creationId xmlns:a16="http://schemas.microsoft.com/office/drawing/2014/main" id="{5C738D8B-1C32-4B64-8A24-F553CE314B2F}"/>
                   </a:ext>
                 </a:extLst>
               </p:cNvPr>
@@ -3401,18 +3431,18 @@
             </p:nvGrpSpPr>
             <p:grpSpPr>
               <a:xfrm>
-                <a:off x="181222" y="1166367"/>
-                <a:ext cx="4288664" cy="2283646"/>
-                <a:chOff x="978795" y="1145858"/>
-                <a:chExt cx="4288664" cy="2283646"/>
+                <a:off x="232738" y="1543690"/>
+                <a:ext cx="11442265" cy="4518729"/>
+                <a:chOff x="232738" y="1543690"/>
+                <a:chExt cx="11442265" cy="4518729"/>
               </a:xfrm>
             </p:grpSpPr>
             <p:grpSp>
               <p:nvGrpSpPr>
-                <p:cNvPr id="19" name="Group 18">
+                <p:cNvPr id="50" name="Group 49">
                   <a:extLst>
                     <a:ext uri="{FF2B5EF4-FFF2-40B4-BE49-F238E27FC236}">
-                      <a16:creationId xmlns:a16="http://schemas.microsoft.com/office/drawing/2014/main" id="{B480DC62-708E-460F-BBA7-0C24381EBD89}"/>
+                      <a16:creationId xmlns:a16="http://schemas.microsoft.com/office/drawing/2014/main" id="{0215EDFD-9E11-40A3-A02F-508A3B91E5FD}"/>
                     </a:ext>
                   </a:extLst>
                 </p:cNvPr>
@@ -3421,18 +3451,18 @@
               </p:nvGrpSpPr>
               <p:grpSpPr>
                 <a:xfrm>
-                  <a:off x="978795" y="1519707"/>
-                  <a:ext cx="4288664" cy="1909797"/>
-                  <a:chOff x="978795" y="1519707"/>
-                  <a:chExt cx="4288664" cy="1909797"/>
+                  <a:off x="232738" y="1543690"/>
+                  <a:ext cx="11442265" cy="4518729"/>
+                  <a:chOff x="181222" y="307318"/>
+                  <a:chExt cx="11442265" cy="4518729"/>
                 </a:xfrm>
               </p:grpSpPr>
               <p:grpSp>
                 <p:nvGrpSpPr>
-                  <p:cNvPr id="15" name="Group 14">
+                  <p:cNvPr id="21" name="Group 20">
                     <a:extLst>
                       <a:ext uri="{FF2B5EF4-FFF2-40B4-BE49-F238E27FC236}">
-                        <a16:creationId xmlns:a16="http://schemas.microsoft.com/office/drawing/2014/main" id="{A89A81EE-F0C2-4944-8FC4-BA1AE7C08669}"/>
+                        <a16:creationId xmlns:a16="http://schemas.microsoft.com/office/drawing/2014/main" id="{8886BEB6-794C-4EFA-B728-B210963FB472}"/>
                       </a:ext>
                     </a:extLst>
                   </p:cNvPr>
@@ -3441,200 +3471,585 @@
                 </p:nvGrpSpPr>
                 <p:grpSpPr>
                   <a:xfrm>
-                    <a:off x="978795" y="1519707"/>
-                    <a:ext cx="4288664" cy="1022016"/>
-                    <a:chOff x="978795" y="1519707"/>
-                    <a:chExt cx="4288664" cy="1022016"/>
+                    <a:off x="181222" y="1166367"/>
+                    <a:ext cx="4288664" cy="2283646"/>
+                    <a:chOff x="978795" y="1145858"/>
+                    <a:chExt cx="4288664" cy="2283646"/>
                   </a:xfrm>
                 </p:grpSpPr>
-                <p:pic>
-                  <p:nvPicPr>
-                    <p:cNvPr id="3" name="Graphic 2" descr="Database with solid fill">
+                <p:grpSp>
+                  <p:nvGrpSpPr>
+                    <p:cNvPr id="19" name="Group 18">
                       <a:extLst>
                         <a:ext uri="{FF2B5EF4-FFF2-40B4-BE49-F238E27FC236}">
-                          <a16:creationId xmlns:a16="http://schemas.microsoft.com/office/drawing/2014/main" id="{15BA35E9-6818-4796-9089-FC2A1552DA28}"/>
+                          <a16:creationId xmlns:a16="http://schemas.microsoft.com/office/drawing/2014/main" id="{B480DC62-708E-460F-BBA7-0C24381EBD89}"/>
                         </a:ext>
                       </a:extLst>
                     </p:cNvPr>
-                    <p:cNvPicPr>
-                      <a:picLocks noChangeAspect="1"/>
-                    </p:cNvPicPr>
+                    <p:cNvGrpSpPr/>
                     <p:nvPr/>
-                  </p:nvPicPr>
-                  <p:blipFill>
-                    <a:blip r:embed="rId2">
+                  </p:nvGrpSpPr>
+                  <p:grpSpPr>
+                    <a:xfrm>
+                      <a:off x="978795" y="1519707"/>
+                      <a:ext cx="4288664" cy="1909797"/>
+                      <a:chOff x="978795" y="1519707"/>
+                      <a:chExt cx="4288664" cy="1909797"/>
+                    </a:xfrm>
+                  </p:grpSpPr>
+                  <p:grpSp>
+                    <p:nvGrpSpPr>
+                      <p:cNvPr id="15" name="Group 14">
+                        <a:extLst>
+                          <a:ext uri="{FF2B5EF4-FFF2-40B4-BE49-F238E27FC236}">
+                            <a16:creationId xmlns:a16="http://schemas.microsoft.com/office/drawing/2014/main" id="{A89A81EE-F0C2-4944-8FC4-BA1AE7C08669}"/>
+                          </a:ext>
+                        </a:extLst>
+                      </p:cNvPr>
+                      <p:cNvGrpSpPr/>
+                      <p:nvPr/>
+                    </p:nvGrpSpPr>
+                    <p:grpSpPr>
+                      <a:xfrm>
+                        <a:off x="978795" y="1519707"/>
+                        <a:ext cx="4288664" cy="1022016"/>
+                        <a:chOff x="978795" y="1519707"/>
+                        <a:chExt cx="4288664" cy="1022016"/>
+                      </a:xfrm>
+                    </p:grpSpPr>
+                    <p:pic>
+                      <p:nvPicPr>
+                        <p:cNvPr id="3" name="Graphic 2" descr="Database with solid fill">
+                          <a:extLst>
+                            <a:ext uri="{FF2B5EF4-FFF2-40B4-BE49-F238E27FC236}">
+                              <a16:creationId xmlns:a16="http://schemas.microsoft.com/office/drawing/2014/main" id="{15BA35E9-6818-4796-9089-FC2A1552DA28}"/>
+                            </a:ext>
+                          </a:extLst>
+                        </p:cNvPr>
+                        <p:cNvPicPr>
+                          <a:picLocks noChangeAspect="1"/>
+                        </p:cNvPicPr>
+                        <p:nvPr/>
+                      </p:nvPicPr>
+                      <p:blipFill>
+                        <a:blip r:embed="rId3">
+                          <a:extLst>
+                            <a:ext uri="{28A0092B-C50C-407E-A947-70E740481C1C}">
+                              <a14:useLocalDpi xmlns:a14="http://schemas.microsoft.com/office/drawing/2010/main" val="0"/>
+                            </a:ext>
+                            <a:ext uri="{96DAC541-7B7A-43D3-8B79-37D633B846F1}">
+                              <asvg:svgBlip xmlns:asvg="http://schemas.microsoft.com/office/drawing/2016/SVG/main" r:embed="rId4"/>
+                            </a:ext>
+                          </a:extLst>
+                        </a:blip>
+                        <a:stretch>
+                          <a:fillRect/>
+                        </a:stretch>
+                      </p:blipFill>
+                      <p:spPr>
+                        <a:xfrm>
+                          <a:off x="1315428" y="1775811"/>
+                          <a:ext cx="765911" cy="765911"/>
+                        </a:xfrm>
+                        <a:prstGeom prst="rect">
+                          <a:avLst/>
+                        </a:prstGeom>
+                      </p:spPr>
+                    </p:pic>
+                    <p:pic>
+                      <p:nvPicPr>
+                        <p:cNvPr id="5" name="Picture 4">
+                          <a:extLst>
+                            <a:ext uri="{FF2B5EF4-FFF2-40B4-BE49-F238E27FC236}">
+                              <a16:creationId xmlns:a16="http://schemas.microsoft.com/office/drawing/2014/main" id="{BA314474-F19C-4F09-A29F-E2458BC2805C}"/>
+                            </a:ext>
+                          </a:extLst>
+                        </p:cNvPr>
+                        <p:cNvPicPr>
+                          <a:picLocks noChangeAspect="1"/>
+                        </p:cNvPicPr>
+                        <p:nvPr/>
+                      </p:nvPicPr>
+                      <p:blipFill>
+                        <a:blip r:embed="rId5"/>
+                        <a:stretch>
+                          <a:fillRect/>
+                        </a:stretch>
+                      </p:blipFill>
+                      <p:spPr>
+                        <a:xfrm>
+                          <a:off x="2586683" y="1809583"/>
+                          <a:ext cx="695325" cy="714375"/>
+                        </a:xfrm>
+                        <a:prstGeom prst="rect">
+                          <a:avLst/>
+                        </a:prstGeom>
+                      </p:spPr>
+                    </p:pic>
+                    <p:pic>
+                      <p:nvPicPr>
+                        <p:cNvPr id="7" name="Picture 6">
+                          <a:extLst>
+                            <a:ext uri="{FF2B5EF4-FFF2-40B4-BE49-F238E27FC236}">
+                              <a16:creationId xmlns:a16="http://schemas.microsoft.com/office/drawing/2014/main" id="{3E7D4FDE-7F9D-4562-87D3-CD0463A0201C}"/>
+                            </a:ext>
+                          </a:extLst>
+                        </p:cNvPr>
+                        <p:cNvPicPr>
+                          <a:picLocks noChangeAspect="1"/>
+                        </p:cNvPicPr>
+                        <p:nvPr/>
+                      </p:nvPicPr>
+                      <p:blipFill>
+                        <a:blip r:embed="rId6"/>
+                        <a:stretch>
+                          <a:fillRect/>
+                        </a:stretch>
+                      </p:blipFill>
+                      <p:spPr>
+                        <a:xfrm>
+                          <a:off x="3827798" y="1962509"/>
+                          <a:ext cx="1162050" cy="485775"/>
+                        </a:xfrm>
+                        <a:prstGeom prst="rect">
+                          <a:avLst/>
+                        </a:prstGeom>
+                      </p:spPr>
+                    </p:pic>
+                    <p:cxnSp>
+                      <p:nvCxnSpPr>
+                        <p:cNvPr id="9" name="Straight Arrow Connector 8">
+                          <a:extLst>
+                            <a:ext uri="{FF2B5EF4-FFF2-40B4-BE49-F238E27FC236}">
+                              <a16:creationId xmlns:a16="http://schemas.microsoft.com/office/drawing/2014/main" id="{6EE7B851-6A1A-4891-9E51-410E3DA5E0A7}"/>
+                            </a:ext>
+                          </a:extLst>
+                        </p:cNvPr>
+                        <p:cNvCxnSpPr>
+                          <a:stCxn id="3" idx="3"/>
+                          <a:endCxn id="5" idx="1"/>
+                        </p:cNvCxnSpPr>
+                        <p:nvPr/>
+                      </p:nvCxnSpPr>
+                      <p:spPr>
+                        <a:xfrm>
+                          <a:off x="2081339" y="2158767"/>
+                          <a:ext cx="505344" cy="8004"/>
+                        </a:xfrm>
+                        <a:prstGeom prst="straightConnector1">
+                          <a:avLst/>
+                        </a:prstGeom>
+                        <a:ln>
+                          <a:tailEnd type="triangle"/>
+                        </a:ln>
+                      </p:spPr>
+                      <p:style>
+                        <a:lnRef idx="1">
+                          <a:schemeClr val="accent1"/>
+                        </a:lnRef>
+                        <a:fillRef idx="0">
+                          <a:schemeClr val="accent1"/>
+                        </a:fillRef>
+                        <a:effectRef idx="0">
+                          <a:schemeClr val="accent1"/>
+                        </a:effectRef>
+                        <a:fontRef idx="minor">
+                          <a:schemeClr val="tx1"/>
+                        </a:fontRef>
+                      </p:style>
+                    </p:cxnSp>
+                    <p:cxnSp>
+                      <p:nvCxnSpPr>
+                        <p:cNvPr id="12" name="Straight Arrow Connector 11">
+                          <a:extLst>
+                            <a:ext uri="{FF2B5EF4-FFF2-40B4-BE49-F238E27FC236}">
+                              <a16:creationId xmlns:a16="http://schemas.microsoft.com/office/drawing/2014/main" id="{1880AE6B-D2FC-40CE-8414-C76B03138DD2}"/>
+                            </a:ext>
+                          </a:extLst>
+                        </p:cNvPr>
+                        <p:cNvCxnSpPr>
+                          <a:stCxn id="5" idx="3"/>
+                        </p:cNvCxnSpPr>
+                        <p:nvPr/>
+                      </p:nvCxnSpPr>
+                      <p:spPr>
+                        <a:xfrm flipV="1">
+                          <a:off x="3282008" y="2166770"/>
+                          <a:ext cx="607412" cy="1"/>
+                        </a:xfrm>
+                        <a:prstGeom prst="straightConnector1">
+                          <a:avLst/>
+                        </a:prstGeom>
+                        <a:ln>
+                          <a:tailEnd type="triangle"/>
+                        </a:ln>
+                      </p:spPr>
+                      <p:style>
+                        <a:lnRef idx="1">
+                          <a:schemeClr val="accent1"/>
+                        </a:lnRef>
+                        <a:fillRef idx="0">
+                          <a:schemeClr val="accent1"/>
+                        </a:fillRef>
+                        <a:effectRef idx="0">
+                          <a:schemeClr val="accent1"/>
+                        </a:effectRef>
+                        <a:fontRef idx="minor">
+                          <a:schemeClr val="tx1"/>
+                        </a:fontRef>
+                      </p:style>
+                    </p:cxnSp>
+                    <p:sp>
+                      <p:nvSpPr>
+                        <p:cNvPr id="14" name="Cube 13">
+                          <a:extLst>
+                            <a:ext uri="{FF2B5EF4-FFF2-40B4-BE49-F238E27FC236}">
+                              <a16:creationId xmlns:a16="http://schemas.microsoft.com/office/drawing/2014/main" id="{9583BC12-D711-45B6-ACBF-497E21F566A8}"/>
+                            </a:ext>
+                          </a:extLst>
+                        </p:cNvPr>
+                        <p:cNvSpPr/>
+                        <p:nvPr/>
+                      </p:nvSpPr>
+                      <p:spPr>
+                        <a:xfrm>
+                          <a:off x="978795" y="1519707"/>
+                          <a:ext cx="4288664" cy="1022016"/>
+                        </a:xfrm>
+                        <a:prstGeom prst="cube">
+                          <a:avLst/>
+                        </a:prstGeom>
+                        <a:noFill/>
+                      </p:spPr>
+                      <p:style>
+                        <a:lnRef idx="2">
+                          <a:schemeClr val="accent1">
+                            <a:shade val="50000"/>
+                          </a:schemeClr>
+                        </a:lnRef>
+                        <a:fillRef idx="1">
+                          <a:schemeClr val="accent1"/>
+                        </a:fillRef>
+                        <a:effectRef idx="0">
+                          <a:schemeClr val="accent1"/>
+                        </a:effectRef>
+                        <a:fontRef idx="minor">
+                          <a:schemeClr val="lt1"/>
+                        </a:fontRef>
+                      </p:style>
+                      <p:txBody>
+                        <a:bodyPr rtlCol="0" anchor="ctr"/>
+                        <a:lstStyle/>
+                        <a:p>
+                          <a:pPr algn="ctr"/>
+                          <a:endParaRPr lang="en-GB" dirty="0"/>
+                        </a:p>
+                      </p:txBody>
+                    </p:sp>
+                  </p:grpSp>
+                  <p:sp>
+                    <p:nvSpPr>
+                      <p:cNvPr id="16" name="TextBox 15">
+                        <a:extLst>
+                          <a:ext uri="{FF2B5EF4-FFF2-40B4-BE49-F238E27FC236}">
+                            <a16:creationId xmlns:a16="http://schemas.microsoft.com/office/drawing/2014/main" id="{815D6D6B-DDF5-45E7-8A0E-34FA5156DA8E}"/>
+                          </a:ext>
+                        </a:extLst>
+                      </p:cNvPr>
+                      <p:cNvSpPr txBox="1"/>
+                      <p:nvPr/>
+                    </p:nvSpPr>
+                    <p:spPr>
+                      <a:xfrm>
+                        <a:off x="1315428" y="2509316"/>
+                        <a:ext cx="811441" cy="646331"/>
+                      </a:xfrm>
+                      <a:prstGeom prst="rect">
+                        <a:avLst/>
+                      </a:prstGeom>
+                      <a:noFill/>
+                    </p:spPr>
+                    <p:txBody>
+                      <a:bodyPr wrap="none" rtlCol="0">
+                        <a:spAutoFit/>
+                      </a:bodyPr>
+                      <a:lstStyle/>
+                      <a:p>
+                        <a:r>
+                          <a:rPr lang="en-GB" dirty="0"/>
+                          <a:t>Data </a:t>
+                        </a:r>
+                      </a:p>
+                      <a:p>
+                        <a:r>
+                          <a:rPr lang="en-GB" dirty="0"/>
+                          <a:t>source</a:t>
+                        </a:r>
+                      </a:p>
+                    </p:txBody>
+                  </p:sp>
+                  <p:sp>
+                    <p:nvSpPr>
+                      <p:cNvPr id="17" name="TextBox 16">
+                        <a:extLst>
+                          <a:ext uri="{FF2B5EF4-FFF2-40B4-BE49-F238E27FC236}">
+                            <a16:creationId xmlns:a16="http://schemas.microsoft.com/office/drawing/2014/main" id="{4BCF63A8-7D16-4A80-B71D-CE667FEA1A12}"/>
+                          </a:ext>
+                        </a:extLst>
+                      </p:cNvPr>
+                      <p:cNvSpPr txBox="1"/>
+                      <p:nvPr/>
+                    </p:nvSpPr>
+                    <p:spPr>
+                      <a:xfrm>
+                        <a:off x="2586683" y="2506174"/>
+                        <a:ext cx="729174" cy="923330"/>
+                      </a:xfrm>
+                      <a:prstGeom prst="rect">
+                        <a:avLst/>
+                      </a:prstGeom>
+                      <a:noFill/>
+                    </p:spPr>
+                    <p:txBody>
+                      <a:bodyPr wrap="none" rtlCol="0">
+                        <a:spAutoFit/>
+                      </a:bodyPr>
+                      <a:lstStyle/>
+                      <a:p>
+                        <a:r>
+                          <a:rPr lang="en-GB" dirty="0"/>
+                          <a:t>Azure</a:t>
+                        </a:r>
+                      </a:p>
+                      <a:p>
+                        <a:r>
+                          <a:rPr lang="en-GB" dirty="0"/>
+                          <a:t>Data </a:t>
+                        </a:r>
+                      </a:p>
+                      <a:p>
+                        <a:r>
+                          <a:rPr lang="en-GB" dirty="0"/>
+                          <a:t>bricks</a:t>
+                        </a:r>
+                      </a:p>
+                    </p:txBody>
+                  </p:sp>
+                  <p:sp>
+                    <p:nvSpPr>
+                      <p:cNvPr id="18" name="TextBox 17">
+                        <a:extLst>
+                          <a:ext uri="{FF2B5EF4-FFF2-40B4-BE49-F238E27FC236}">
+                            <a16:creationId xmlns:a16="http://schemas.microsoft.com/office/drawing/2014/main" id="{5C1948B8-13E8-47FC-8C17-E8839B6F2224}"/>
+                          </a:ext>
+                        </a:extLst>
+                      </p:cNvPr>
+                      <p:cNvSpPr txBox="1"/>
+                      <p:nvPr/>
+                    </p:nvSpPr>
+                    <p:spPr>
+                      <a:xfrm>
+                        <a:off x="3937845" y="2541722"/>
+                        <a:ext cx="977255" cy="646331"/>
+                      </a:xfrm>
+                      <a:prstGeom prst="rect">
+                        <a:avLst/>
+                      </a:prstGeom>
+                      <a:noFill/>
+                    </p:spPr>
+                    <p:txBody>
+                      <a:bodyPr wrap="none" rtlCol="0">
+                        <a:spAutoFit/>
+                      </a:bodyPr>
+                      <a:lstStyle/>
+                      <a:p>
+                        <a:r>
+                          <a:rPr lang="en-GB" dirty="0"/>
+                          <a:t>MLFlow </a:t>
+                        </a:r>
+                      </a:p>
+                      <a:p>
+                        <a:r>
+                          <a:rPr lang="en-GB" dirty="0"/>
+                          <a:t>tracking</a:t>
+                        </a:r>
+                      </a:p>
+                    </p:txBody>
+                  </p:sp>
+                </p:grpSp>
+                <p:sp>
+                  <p:nvSpPr>
+                    <p:cNvPr id="20" name="TextBox 19">
                       <a:extLst>
-                        <a:ext uri="{28A0092B-C50C-407E-A947-70E740481C1C}">
-                          <a14:useLocalDpi xmlns:a14="http://schemas.microsoft.com/office/drawing/2010/main" val="0"/>
-                        </a:ext>
-                        <a:ext uri="{96DAC541-7B7A-43D3-8B79-37D633B846F1}">
-                          <asvg:svgBlip xmlns:asvg="http://schemas.microsoft.com/office/drawing/2016/SVG/main" r:embed="rId3"/>
+                        <a:ext uri="{FF2B5EF4-FFF2-40B4-BE49-F238E27FC236}">
+                          <a16:creationId xmlns:a16="http://schemas.microsoft.com/office/drawing/2014/main" id="{79C04613-F53F-4A9D-B33D-8B32CFC17697}"/>
                         </a:ext>
                       </a:extLst>
-                    </a:blip>
-                    <a:stretch>
-                      <a:fillRect/>
-                    </a:stretch>
-                  </p:blipFill>
+                    </p:cNvPr>
+                    <p:cNvSpPr txBox="1"/>
+                    <p:nvPr/>
+                  </p:nvSpPr>
                   <p:spPr>
                     <a:xfrm>
-                      <a:off x="1315428" y="1775811"/>
-                      <a:ext cx="765911" cy="765911"/>
+                      <a:off x="2440380" y="1145858"/>
+                      <a:ext cx="1451936" cy="369332"/>
                     </a:xfrm>
                     <a:prstGeom prst="rect">
                       <a:avLst/>
                     </a:prstGeom>
+                    <a:noFill/>
                   </p:spPr>
-                </p:pic>
-                <p:pic>
-                  <p:nvPicPr>
-                    <p:cNvPr id="5" name="Picture 4">
+                  <p:txBody>
+                    <a:bodyPr wrap="none" rtlCol="0">
+                      <a:spAutoFit/>
+                    </a:bodyPr>
+                    <a:lstStyle/>
+                    <a:p>
+                      <a:r>
+                        <a:rPr lang="en-GB" dirty="0"/>
+                        <a:t>Development</a:t>
+                      </a:r>
+                    </a:p>
+                  </p:txBody>
+                </p:sp>
+              </p:grpSp>
+              <p:pic>
+                <p:nvPicPr>
+                  <p:cNvPr id="11" name="Picture 10">
+                    <a:extLst>
+                      <a:ext uri="{FF2B5EF4-FFF2-40B4-BE49-F238E27FC236}">
+                        <a16:creationId xmlns:a16="http://schemas.microsoft.com/office/drawing/2014/main" id="{82E3F97F-5078-46AC-8C83-52468738966E}"/>
+                      </a:ext>
+                    </a:extLst>
+                  </p:cNvPr>
+                  <p:cNvPicPr>
+                    <a:picLocks noChangeAspect="1"/>
+                  </p:cNvPicPr>
+                  <p:nvPr/>
+                </p:nvPicPr>
+                <p:blipFill>
+                  <a:blip r:embed="rId7"/>
+                  <a:stretch>
+                    <a:fillRect/>
+                  </a:stretch>
+                </p:blipFill>
+                <p:spPr>
+                  <a:xfrm>
+                    <a:off x="4972430" y="2514496"/>
+                    <a:ext cx="923925" cy="733425"/>
+                  </a:xfrm>
+                  <a:prstGeom prst="rect">
+                    <a:avLst/>
+                  </a:prstGeom>
+                </p:spPr>
+              </p:pic>
+              <p:grpSp>
+                <p:nvGrpSpPr>
+                  <p:cNvPr id="28" name="Group 27">
+                    <a:extLst>
+                      <a:ext uri="{FF2B5EF4-FFF2-40B4-BE49-F238E27FC236}">
+                        <a16:creationId xmlns:a16="http://schemas.microsoft.com/office/drawing/2014/main" id="{3E6C0F19-65A7-4FBE-A8F0-0A375663D886}"/>
+                      </a:ext>
+                    </a:extLst>
+                  </p:cNvPr>
+                  <p:cNvGrpSpPr/>
+                  <p:nvPr/>
+                </p:nvGrpSpPr>
+                <p:grpSpPr>
+                  <a:xfrm>
+                    <a:off x="4991424" y="655359"/>
+                    <a:ext cx="4105835" cy="1022016"/>
+                    <a:chOff x="5835443" y="813619"/>
+                    <a:chExt cx="4105835" cy="1022016"/>
+                  </a:xfrm>
+                </p:grpSpPr>
+                <p:grpSp>
+                  <p:nvGrpSpPr>
+                    <p:cNvPr id="25" name="Group 24">
                       <a:extLst>
                         <a:ext uri="{FF2B5EF4-FFF2-40B4-BE49-F238E27FC236}">
-                          <a16:creationId xmlns:a16="http://schemas.microsoft.com/office/drawing/2014/main" id="{BA314474-F19C-4F09-A29F-E2458BC2805C}"/>
+                          <a16:creationId xmlns:a16="http://schemas.microsoft.com/office/drawing/2014/main" id="{11299963-A613-4045-9F7E-423EDB815074}"/>
                         </a:ext>
                       </a:extLst>
                     </p:cNvPr>
-                    <p:cNvPicPr>
-                      <a:picLocks noChangeAspect="1"/>
-                    </p:cNvPicPr>
+                    <p:cNvGrpSpPr/>
                     <p:nvPr/>
-                  </p:nvPicPr>
-                  <p:blipFill>
-                    <a:blip r:embed="rId4"/>
-                    <a:stretch>
-                      <a:fillRect/>
-                    </a:stretch>
-                  </p:blipFill>
-                  <p:spPr>
+                  </p:nvGrpSpPr>
+                  <p:grpSpPr>
                     <a:xfrm>
-                      <a:off x="2586683" y="1809583"/>
-                      <a:ext cx="695325" cy="714375"/>
+                      <a:off x="5999349" y="990088"/>
+                      <a:ext cx="2322400" cy="800100"/>
+                      <a:chOff x="5999349" y="990088"/>
+                      <a:chExt cx="2322400" cy="800100"/>
                     </a:xfrm>
-                    <a:prstGeom prst="rect">
-                      <a:avLst/>
-                    </a:prstGeom>
-                  </p:spPr>
-                </p:pic>
-                <p:pic>
-                  <p:nvPicPr>
-                    <p:cNvPr id="7" name="Picture 6">
+                  </p:grpSpPr>
+                  <p:pic>
+                    <p:nvPicPr>
+                      <p:cNvPr id="4" name="Picture 3">
+                        <a:extLst>
+                          <a:ext uri="{FF2B5EF4-FFF2-40B4-BE49-F238E27FC236}">
+                            <a16:creationId xmlns:a16="http://schemas.microsoft.com/office/drawing/2014/main" id="{C71ED731-ADF6-43CC-AE71-B0E315E8DC0E}"/>
+                          </a:ext>
+                        </a:extLst>
+                      </p:cNvPr>
+                      <p:cNvPicPr>
+                        <a:picLocks noChangeAspect="1"/>
+                      </p:cNvPicPr>
+                      <p:nvPr/>
+                    </p:nvPicPr>
+                    <p:blipFill>
+                      <a:blip r:embed="rId8"/>
+                      <a:stretch>
+                        <a:fillRect/>
+                      </a:stretch>
+                    </p:blipFill>
+                    <p:spPr>
+                      <a:xfrm>
+                        <a:off x="5999349" y="1046701"/>
+                        <a:ext cx="1000125" cy="704850"/>
+                      </a:xfrm>
+                      <a:prstGeom prst="rect">
+                        <a:avLst/>
+                      </a:prstGeom>
+                    </p:spPr>
+                  </p:pic>
+                  <p:pic>
+                    <p:nvPicPr>
+                      <p:cNvPr id="8" name="Picture 7">
+                        <a:extLst>
+                          <a:ext uri="{FF2B5EF4-FFF2-40B4-BE49-F238E27FC236}">
+                            <a16:creationId xmlns:a16="http://schemas.microsoft.com/office/drawing/2014/main" id="{AC831B61-5AD4-4DF9-AD39-6816B0A09948}"/>
+                          </a:ext>
+                        </a:extLst>
+                      </p:cNvPr>
+                      <p:cNvPicPr>
+                        <a:picLocks noChangeAspect="1"/>
+                      </p:cNvPicPr>
+                      <p:nvPr/>
+                    </p:nvPicPr>
+                    <p:blipFill>
+                      <a:blip r:embed="rId9"/>
+                      <a:stretch>
+                        <a:fillRect/>
+                      </a:stretch>
+                    </p:blipFill>
+                    <p:spPr>
+                      <a:xfrm>
+                        <a:off x="7454974" y="990088"/>
+                        <a:ext cx="866775" cy="800100"/>
+                      </a:xfrm>
+                      <a:prstGeom prst="rect">
+                        <a:avLst/>
+                      </a:prstGeom>
+                    </p:spPr>
+                  </p:pic>
+                </p:grpSp>
+                <p:sp>
+                  <p:nvSpPr>
+                    <p:cNvPr id="27" name="Cube 26">
                       <a:extLst>
                         <a:ext uri="{FF2B5EF4-FFF2-40B4-BE49-F238E27FC236}">
-                          <a16:creationId xmlns:a16="http://schemas.microsoft.com/office/drawing/2014/main" id="{3E7D4FDE-7F9D-4562-87D3-CD0463A0201C}"/>
-                        </a:ext>
-                      </a:extLst>
-                    </p:cNvPr>
-                    <p:cNvPicPr>
-                      <a:picLocks noChangeAspect="1"/>
-                    </p:cNvPicPr>
-                    <p:nvPr/>
-                  </p:nvPicPr>
-                  <p:blipFill>
-                    <a:blip r:embed="rId5"/>
-                    <a:stretch>
-                      <a:fillRect/>
-                    </a:stretch>
-                  </p:blipFill>
-                  <p:spPr>
-                    <a:xfrm>
-                      <a:off x="3827798" y="1962509"/>
-                      <a:ext cx="1162050" cy="485775"/>
-                    </a:xfrm>
-                    <a:prstGeom prst="rect">
-                      <a:avLst/>
-                    </a:prstGeom>
-                  </p:spPr>
-                </p:pic>
-                <p:cxnSp>
-                  <p:nvCxnSpPr>
-                    <p:cNvPr id="9" name="Straight Arrow Connector 8">
-                      <a:extLst>
-                        <a:ext uri="{FF2B5EF4-FFF2-40B4-BE49-F238E27FC236}">
-                          <a16:creationId xmlns:a16="http://schemas.microsoft.com/office/drawing/2014/main" id="{6EE7B851-6A1A-4891-9E51-410E3DA5E0A7}"/>
-                        </a:ext>
-                      </a:extLst>
-                    </p:cNvPr>
-                    <p:cNvCxnSpPr>
-                      <a:stCxn id="3" idx="3"/>
-                      <a:endCxn id="5" idx="1"/>
-                    </p:cNvCxnSpPr>
-                    <p:nvPr/>
-                  </p:nvCxnSpPr>
-                  <p:spPr>
-                    <a:xfrm>
-                      <a:off x="2081339" y="2158767"/>
-                      <a:ext cx="505344" cy="8004"/>
-                    </a:xfrm>
-                    <a:prstGeom prst="straightConnector1">
-                      <a:avLst/>
-                    </a:prstGeom>
-                    <a:ln>
-                      <a:tailEnd type="triangle"/>
-                    </a:ln>
-                  </p:spPr>
-                  <p:style>
-                    <a:lnRef idx="1">
-                      <a:schemeClr val="accent1"/>
-                    </a:lnRef>
-                    <a:fillRef idx="0">
-                      <a:schemeClr val="accent1"/>
-                    </a:fillRef>
-                    <a:effectRef idx="0">
-                      <a:schemeClr val="accent1"/>
-                    </a:effectRef>
-                    <a:fontRef idx="minor">
-                      <a:schemeClr val="tx1"/>
-                    </a:fontRef>
-                  </p:style>
-                </p:cxnSp>
-                <p:cxnSp>
-                  <p:nvCxnSpPr>
-                    <p:cNvPr id="12" name="Straight Arrow Connector 11">
-                      <a:extLst>
-                        <a:ext uri="{FF2B5EF4-FFF2-40B4-BE49-F238E27FC236}">
-                          <a16:creationId xmlns:a16="http://schemas.microsoft.com/office/drawing/2014/main" id="{1880AE6B-D2FC-40CE-8414-C76B03138DD2}"/>
-                        </a:ext>
-                      </a:extLst>
-                    </p:cNvPr>
-                    <p:cNvCxnSpPr>
-                      <a:stCxn id="5" idx="3"/>
-                    </p:cNvCxnSpPr>
-                    <p:nvPr/>
-                  </p:nvCxnSpPr>
-                  <p:spPr>
-                    <a:xfrm flipV="1">
-                      <a:off x="3282008" y="2166770"/>
-                      <a:ext cx="607412" cy="1"/>
-                    </a:xfrm>
-                    <a:prstGeom prst="straightConnector1">
-                      <a:avLst/>
-                    </a:prstGeom>
-                    <a:ln>
-                      <a:tailEnd type="triangle"/>
-                    </a:ln>
-                  </p:spPr>
-                  <p:style>
-                    <a:lnRef idx="1">
-                      <a:schemeClr val="accent1"/>
-                    </a:lnRef>
-                    <a:fillRef idx="0">
-                      <a:schemeClr val="accent1"/>
-                    </a:fillRef>
-                    <a:effectRef idx="0">
-                      <a:schemeClr val="accent1"/>
-                    </a:effectRef>
-                    <a:fontRef idx="minor">
-                      <a:schemeClr val="tx1"/>
-                    </a:fontRef>
-                  </p:style>
-                </p:cxnSp>
-                <p:sp>
-                  <p:nvSpPr>
-                    <p:cNvPr id="14" name="Cube 13">
-                      <a:extLst>
-                        <a:ext uri="{FF2B5EF4-FFF2-40B4-BE49-F238E27FC236}">
-                          <a16:creationId xmlns:a16="http://schemas.microsoft.com/office/drawing/2014/main" id="{9583BC12-D711-45B6-ACBF-497E21F566A8}"/>
+                          <a16:creationId xmlns:a16="http://schemas.microsoft.com/office/drawing/2014/main" id="{C3FD1A3F-3FC4-45C4-BDAB-0AF97E495A10}"/>
                         </a:ext>
                       </a:extLst>
                     </p:cNvPr>
@@ -3643,8 +4058,8 @@
                   </p:nvSpPr>
                   <p:spPr>
                     <a:xfrm>
-                      <a:off x="978795" y="1519707"/>
-                      <a:ext cx="4288664" cy="1022016"/>
+                      <a:off x="5835443" y="813619"/>
+                      <a:ext cx="4105835" cy="1022016"/>
                     </a:xfrm>
                     <a:prstGeom prst="cube">
                       <a:avLst/>
@@ -3679,10 +4094,160 @@
               </p:grpSp>
               <p:sp>
                 <p:nvSpPr>
-                  <p:cNvPr id="16" name="TextBox 15">
+                  <p:cNvPr id="31" name="Cube 30">
                     <a:extLst>
                       <a:ext uri="{FF2B5EF4-FFF2-40B4-BE49-F238E27FC236}">
-                        <a16:creationId xmlns:a16="http://schemas.microsoft.com/office/drawing/2014/main" id="{815D6D6B-DDF5-45E7-8A0E-34FA5156DA8E}"/>
+                        <a16:creationId xmlns:a16="http://schemas.microsoft.com/office/drawing/2014/main" id="{33F0EC28-7B6B-48A0-8FEF-7D4AE721C3E3}"/>
+                      </a:ext>
+                    </a:extLst>
+                  </p:cNvPr>
+                  <p:cNvSpPr/>
+                  <p:nvPr/>
+                </p:nvSpPr>
+                <p:spPr>
+                  <a:xfrm>
+                    <a:off x="4850023" y="2225905"/>
+                    <a:ext cx="1446634" cy="1022016"/>
+                  </a:xfrm>
+                  <a:prstGeom prst="cube">
+                    <a:avLst/>
+                  </a:prstGeom>
+                  <a:noFill/>
+                </p:spPr>
+                <p:style>
+                  <a:lnRef idx="2">
+                    <a:schemeClr val="accent1">
+                      <a:shade val="50000"/>
+                    </a:schemeClr>
+                  </a:lnRef>
+                  <a:fillRef idx="1">
+                    <a:schemeClr val="accent1"/>
+                  </a:fillRef>
+                  <a:effectRef idx="0">
+                    <a:schemeClr val="accent1"/>
+                  </a:effectRef>
+                  <a:fontRef idx="minor">
+                    <a:schemeClr val="lt1"/>
+                  </a:fontRef>
+                </p:style>
+                <p:txBody>
+                  <a:bodyPr rtlCol="0" anchor="ctr"/>
+                  <a:lstStyle/>
+                  <a:p>
+                    <a:pPr algn="ctr"/>
+                    <a:endParaRPr lang="en-GB"/>
+                  </a:p>
+                </p:txBody>
+              </p:sp>
+              <p:pic>
+                <p:nvPicPr>
+                  <p:cNvPr id="39" name="Picture 38">
+                    <a:extLst>
+                      <a:ext uri="{FF2B5EF4-FFF2-40B4-BE49-F238E27FC236}">
+                        <a16:creationId xmlns:a16="http://schemas.microsoft.com/office/drawing/2014/main" id="{D5DCBE6E-8C1E-4D22-B005-D9AE08645FC3}"/>
+                      </a:ext>
+                    </a:extLst>
+                  </p:cNvPr>
+                  <p:cNvPicPr>
+                    <a:picLocks noChangeAspect="1"/>
+                  </p:cNvPicPr>
+                  <p:nvPr/>
+                </p:nvPicPr>
+                <p:blipFill>
+                  <a:blip r:embed="rId10"/>
+                  <a:stretch>
+                    <a:fillRect/>
+                  </a:stretch>
+                </p:blipFill>
+                <p:spPr>
+                  <a:xfrm>
+                    <a:off x="8731735" y="349036"/>
+                    <a:ext cx="923834" cy="248783"/>
+                  </a:xfrm>
+                  <a:prstGeom prst="rect">
+                    <a:avLst/>
+                  </a:prstGeom>
+                </p:spPr>
+              </p:pic>
+              <p:pic>
+                <p:nvPicPr>
+                  <p:cNvPr id="41" name="Picture 40">
+                    <a:extLst>
+                      <a:ext uri="{FF2B5EF4-FFF2-40B4-BE49-F238E27FC236}">
+                        <a16:creationId xmlns:a16="http://schemas.microsoft.com/office/drawing/2014/main" id="{62567DDE-571A-4B74-8F0E-87AE839A76CF}"/>
+                      </a:ext>
+                    </a:extLst>
+                  </p:cNvPr>
+                  <p:cNvPicPr>
+                    <a:picLocks noChangeAspect="1"/>
+                  </p:cNvPicPr>
+                  <p:nvPr/>
+                </p:nvPicPr>
+                <p:blipFill>
+                  <a:blip r:embed="rId11"/>
+                  <a:stretch>
+                    <a:fillRect/>
+                  </a:stretch>
+                </p:blipFill>
+                <p:spPr>
+                  <a:xfrm>
+                    <a:off x="4356363" y="893175"/>
+                    <a:ext cx="473962" cy="398686"/>
+                  </a:xfrm>
+                  <a:prstGeom prst="rect">
+                    <a:avLst/>
+                  </a:prstGeom>
+                </p:spPr>
+              </p:pic>
+              <p:cxnSp>
+                <p:nvCxnSpPr>
+                  <p:cNvPr id="6" name="Connector: Elbow 5">
+                    <a:extLst>
+                      <a:ext uri="{FF2B5EF4-FFF2-40B4-BE49-F238E27FC236}">
+                        <a16:creationId xmlns:a16="http://schemas.microsoft.com/office/drawing/2014/main" id="{B16F135B-4056-421C-948C-59960FAED34B}"/>
+                      </a:ext>
+                    </a:extLst>
+                  </p:cNvPr>
+                  <p:cNvCxnSpPr>
+                    <a:cxnSpLocks/>
+                    <a:stCxn id="14" idx="5"/>
+                    <a:endCxn id="27" idx="2"/>
+                  </p:cNvCxnSpPr>
+                  <p:nvPr/>
+                </p:nvCxnSpPr>
+                <p:spPr>
+                  <a:xfrm flipV="1">
+                    <a:off x="4469886" y="1294119"/>
+                    <a:ext cx="521538" cy="629353"/>
+                  </a:xfrm>
+                  <a:prstGeom prst="bentConnector3">
+                    <a:avLst/>
+                  </a:prstGeom>
+                  <a:ln>
+                    <a:tailEnd type="triangle"/>
+                  </a:ln>
+                </p:spPr>
+                <p:style>
+                  <a:lnRef idx="1">
+                    <a:schemeClr val="accent1"/>
+                  </a:lnRef>
+                  <a:fillRef idx="0">
+                    <a:schemeClr val="accent1"/>
+                  </a:fillRef>
+                  <a:effectRef idx="0">
+                    <a:schemeClr val="accent1"/>
+                  </a:effectRef>
+                  <a:fontRef idx="minor">
+                    <a:schemeClr val="tx1"/>
+                  </a:fontRef>
+                </p:style>
+              </p:cxnSp>
+              <p:sp>
+                <p:nvSpPr>
+                  <p:cNvPr id="13" name="TextBox 12">
+                    <a:extLst>
+                      <a:ext uri="{FF2B5EF4-FFF2-40B4-BE49-F238E27FC236}">
+                        <a16:creationId xmlns:a16="http://schemas.microsoft.com/office/drawing/2014/main" id="{8E2EDC54-FD58-483B-BA14-BEDB18AF3AF2}"/>
                       </a:ext>
                     </a:extLst>
                   </p:cNvPr>
@@ -3691,8 +4256,8 @@
                 </p:nvSpPr>
                 <p:spPr>
                   <a:xfrm>
-                    <a:off x="1315428" y="2509316"/>
-                    <a:ext cx="811441" cy="646331"/>
+                    <a:off x="5434392" y="307318"/>
+                    <a:ext cx="3316292" cy="369332"/>
                   </a:xfrm>
                   <a:prstGeom prst="rect">
                     <a:avLst/>
@@ -3707,23 +4272,17 @@
                   <a:p>
                     <a:r>
                       <a:rPr lang="en-GB" dirty="0"/>
-                      <a:t>Data </a:t>
-                    </a:r>
-                  </a:p>
-                  <a:p>
-                    <a:r>
-                      <a:rPr lang="en-GB" dirty="0"/>
-                      <a:t>source</a:t>
+                      <a:t>Containerized model deployment</a:t>
                     </a:r>
                   </a:p>
                 </p:txBody>
               </p:sp>
               <p:sp>
                 <p:nvSpPr>
-                  <p:cNvPr id="17" name="TextBox 16">
+                  <p:cNvPr id="32" name="TextBox 31">
                     <a:extLst>
                       <a:ext uri="{FF2B5EF4-FFF2-40B4-BE49-F238E27FC236}">
-                        <a16:creationId xmlns:a16="http://schemas.microsoft.com/office/drawing/2014/main" id="{4BCF63A8-7D16-4A80-B71D-CE667FEA1A12}"/>
+                        <a16:creationId xmlns:a16="http://schemas.microsoft.com/office/drawing/2014/main" id="{7A5DE1F8-288A-40A0-A2AF-1A8121D8981B}"/>
                       </a:ext>
                     </a:extLst>
                   </p:cNvPr>
@@ -3732,8 +4291,8 @@
                 </p:nvSpPr>
                 <p:spPr>
                   <a:xfrm>
-                    <a:off x="2586683" y="2506174"/>
-                    <a:ext cx="729174" cy="923330"/>
+                    <a:off x="5115612" y="1875965"/>
+                    <a:ext cx="2918619" cy="369332"/>
                   </a:xfrm>
                   <a:prstGeom prst="rect">
                     <a:avLst/>
@@ -3748,29 +4307,116 @@
                   <a:p>
                     <a:r>
                       <a:rPr lang="en-GB" dirty="0"/>
-                      <a:t>Azure</a:t>
+                      <a:t>Retrieved model deployment</a:t>
+                    </a:r>
+                  </a:p>
+                </p:txBody>
+              </p:sp>
+              <p:cxnSp>
+                <p:nvCxnSpPr>
+                  <p:cNvPr id="26" name="Connector: Elbow 25">
+                    <a:extLst>
+                      <a:ext uri="{FF2B5EF4-FFF2-40B4-BE49-F238E27FC236}">
+                        <a16:creationId xmlns:a16="http://schemas.microsoft.com/office/drawing/2014/main" id="{72C65006-3ED4-4C1A-9E25-44865EAA38C2}"/>
+                      </a:ext>
+                    </a:extLst>
+                  </p:cNvPr>
+                  <p:cNvCxnSpPr>
+                    <a:cxnSpLocks/>
+                    <a:stCxn id="14" idx="5"/>
+                    <a:endCxn id="31" idx="2"/>
+                  </p:cNvCxnSpPr>
+                  <p:nvPr/>
+                </p:nvCxnSpPr>
+                <p:spPr>
+                  <a:xfrm>
+                    <a:off x="4469886" y="1923472"/>
+                    <a:ext cx="380137" cy="941193"/>
+                  </a:xfrm>
+                  <a:prstGeom prst="bentConnector3">
+                    <a:avLst/>
+                  </a:prstGeom>
+                  <a:ln>
+                    <a:tailEnd type="triangle"/>
+                  </a:ln>
+                </p:spPr>
+                <p:style>
+                  <a:lnRef idx="1">
+                    <a:schemeClr val="accent1"/>
+                  </a:lnRef>
+                  <a:fillRef idx="0">
+                    <a:schemeClr val="accent1"/>
+                  </a:fillRef>
+                  <a:effectRef idx="0">
+                    <a:schemeClr val="accent1"/>
+                  </a:effectRef>
+                  <a:fontRef idx="minor">
+                    <a:schemeClr val="tx1"/>
+                  </a:fontRef>
+                </p:style>
+              </p:cxnSp>
+              <p:sp>
+                <p:nvSpPr>
+                  <p:cNvPr id="30" name="Rectangle 29">
+                    <a:extLst>
+                      <a:ext uri="{FF2B5EF4-FFF2-40B4-BE49-F238E27FC236}">
+                        <a16:creationId xmlns:a16="http://schemas.microsoft.com/office/drawing/2014/main" id="{78492EE9-FA46-4937-9F7E-32703EA3641D}"/>
+                      </a:ext>
+                    </a:extLst>
+                  </p:cNvPr>
+                  <p:cNvSpPr/>
+                  <p:nvPr/>
+                </p:nvSpPr>
+                <p:spPr>
+                  <a:xfrm>
+                    <a:off x="9707565" y="2187279"/>
+                    <a:ext cx="1828800" cy="845798"/>
+                  </a:xfrm>
+                  <a:prstGeom prst="rect">
+                    <a:avLst/>
+                  </a:prstGeom>
+                </p:spPr>
+                <p:style>
+                  <a:lnRef idx="2">
+                    <a:schemeClr val="accent1">
+                      <a:shade val="50000"/>
+                    </a:schemeClr>
+                  </a:lnRef>
+                  <a:fillRef idx="1">
+                    <a:schemeClr val="accent1"/>
+                  </a:fillRef>
+                  <a:effectRef idx="0">
+                    <a:schemeClr val="accent1"/>
+                  </a:effectRef>
+                  <a:fontRef idx="minor">
+                    <a:schemeClr val="lt1"/>
+                  </a:fontRef>
+                </p:style>
+                <p:txBody>
+                  <a:bodyPr rtlCol="0" anchor="ctr"/>
+                  <a:lstStyle/>
+                  <a:p>
+                    <a:pPr algn="ctr"/>
+                    <a:r>
+                      <a:rPr lang="en-GB" dirty="0"/>
+                      <a:t>Batch</a:t>
                     </a:r>
                   </a:p>
                   <a:p>
+                    <a:pPr algn="ctr"/>
                     <a:r>
                       <a:rPr lang="en-GB" dirty="0"/>
-                      <a:t>Data </a:t>
-                    </a:r>
-                  </a:p>
-                  <a:p>
-                    <a:r>
-                      <a:rPr lang="en-GB" dirty="0"/>
-                      <a:t>bricks</a:t>
+                      <a:t>(Airflow)</a:t>
                     </a:r>
                   </a:p>
                 </p:txBody>
               </p:sp>
               <p:sp>
                 <p:nvSpPr>
-                  <p:cNvPr id="18" name="TextBox 17">
+                  <p:cNvPr id="33" name="TextBox 32">
                     <a:extLst>
                       <a:ext uri="{FF2B5EF4-FFF2-40B4-BE49-F238E27FC236}">
-                        <a16:creationId xmlns:a16="http://schemas.microsoft.com/office/drawing/2014/main" id="{5C1948B8-13E8-47FC-8C17-E8839B6F2224}"/>
+                        <a16:creationId xmlns:a16="http://schemas.microsoft.com/office/drawing/2014/main" id="{445C4801-735E-448F-8965-D5EB61710333}"/>
                       </a:ext>
                     </a:extLst>
                   </p:cNvPr>
@@ -3779,8 +4425,8 @@
                 </p:nvSpPr>
                 <p:spPr>
                   <a:xfrm>
-                    <a:off x="3937845" y="2541722"/>
-                    <a:ext cx="977255" cy="646331"/>
+                    <a:off x="9881809" y="307318"/>
+                    <a:ext cx="1654556" cy="369332"/>
                   </a:xfrm>
                   <a:prstGeom prst="rect">
                     <a:avLst/>
@@ -3795,24 +4441,298 @@
                   <a:p>
                     <a:r>
                       <a:rPr lang="en-GB" dirty="0"/>
-                      <a:t>MLFlow </a:t>
+                      <a:t>Workload types</a:t>
+                    </a:r>
+                  </a:p>
+                </p:txBody>
+              </p:sp>
+              <p:sp>
+                <p:nvSpPr>
+                  <p:cNvPr id="38" name="Rectangle 37">
+                    <a:extLst>
+                      <a:ext uri="{FF2B5EF4-FFF2-40B4-BE49-F238E27FC236}">
+                        <a16:creationId xmlns:a16="http://schemas.microsoft.com/office/drawing/2014/main" id="{38E19B20-1728-40B3-B252-01BAEB65211E}"/>
+                      </a:ext>
+                    </a:extLst>
+                  </p:cNvPr>
+                  <p:cNvSpPr/>
+                  <p:nvPr/>
+                </p:nvSpPr>
+                <p:spPr>
+                  <a:xfrm>
+                    <a:off x="9794687" y="615716"/>
+                    <a:ext cx="1828800" cy="845798"/>
+                  </a:xfrm>
+                  <a:prstGeom prst="rect">
+                    <a:avLst/>
+                  </a:prstGeom>
+                </p:spPr>
+                <p:style>
+                  <a:lnRef idx="2">
+                    <a:schemeClr val="accent1">
+                      <a:shade val="50000"/>
+                    </a:schemeClr>
+                  </a:lnRef>
+                  <a:fillRef idx="1">
+                    <a:schemeClr val="accent1"/>
+                  </a:fillRef>
+                  <a:effectRef idx="0">
+                    <a:schemeClr val="accent1"/>
+                  </a:effectRef>
+                  <a:fontRef idx="minor">
+                    <a:schemeClr val="lt1"/>
+                  </a:fontRef>
+                </p:style>
+                <p:txBody>
+                  <a:bodyPr rtlCol="0" anchor="ctr"/>
+                  <a:lstStyle/>
+                  <a:p>
+                    <a:pPr algn="ctr"/>
+                    <a:r>
+                      <a:rPr lang="en-GB" dirty="0"/>
+                      <a:t>Online</a:t>
+                    </a:r>
+                  </a:p>
+                </p:txBody>
+              </p:sp>
+              <p:cxnSp>
+                <p:nvCxnSpPr>
+                  <p:cNvPr id="35" name="Straight Arrow Connector 34">
+                    <a:extLst>
+                      <a:ext uri="{FF2B5EF4-FFF2-40B4-BE49-F238E27FC236}">
+                        <a16:creationId xmlns:a16="http://schemas.microsoft.com/office/drawing/2014/main" id="{3C71C2B1-5EFD-43E9-83AD-35787C4A343F}"/>
+                      </a:ext>
+                    </a:extLst>
+                  </p:cNvPr>
+                  <p:cNvCxnSpPr>
+                    <a:stCxn id="38" idx="1"/>
+                    <a:endCxn id="27" idx="5"/>
+                  </p:cNvCxnSpPr>
+                  <p:nvPr/>
+                </p:nvCxnSpPr>
+                <p:spPr>
+                  <a:xfrm flipH="1">
+                    <a:off x="9097259" y="1038615"/>
+                    <a:ext cx="697428" cy="0"/>
+                  </a:xfrm>
+                  <a:prstGeom prst="straightConnector1">
+                    <a:avLst/>
+                  </a:prstGeom>
+                  <a:ln>
+                    <a:tailEnd type="triangle"/>
+                  </a:ln>
+                </p:spPr>
+                <p:style>
+                  <a:lnRef idx="1">
+                    <a:schemeClr val="accent1"/>
+                  </a:lnRef>
+                  <a:fillRef idx="0">
+                    <a:schemeClr val="accent1"/>
+                  </a:fillRef>
+                  <a:effectRef idx="0">
+                    <a:schemeClr val="accent1"/>
+                  </a:effectRef>
+                  <a:fontRef idx="minor">
+                    <a:schemeClr val="tx1"/>
+                  </a:fontRef>
+                </p:style>
+              </p:cxnSp>
+              <p:sp>
+                <p:nvSpPr>
+                  <p:cNvPr id="42" name="TextBox 41">
+                    <a:extLst>
+                      <a:ext uri="{FF2B5EF4-FFF2-40B4-BE49-F238E27FC236}">
+                        <a16:creationId xmlns:a16="http://schemas.microsoft.com/office/drawing/2014/main" id="{0C96020C-483D-4E23-97BD-799026B4919E}"/>
+                      </a:ext>
+                    </a:extLst>
+                  </p:cNvPr>
+                  <p:cNvSpPr txBox="1"/>
+                  <p:nvPr/>
+                </p:nvSpPr>
+                <p:spPr>
+                  <a:xfrm>
+                    <a:off x="9201496" y="1098706"/>
+                    <a:ext cx="524503" cy="646331"/>
+                  </a:xfrm>
+                  <a:prstGeom prst="rect">
+                    <a:avLst/>
+                  </a:prstGeom>
+                  <a:noFill/>
+                </p:spPr>
+                <p:txBody>
+                  <a:bodyPr wrap="square" rtlCol="0">
+                    <a:spAutoFit/>
+                  </a:bodyPr>
+                  <a:lstStyle/>
+                  <a:p>
+                    <a:r>
+                      <a:rPr lang="en-GB" dirty="0"/>
+                      <a:t>Call</a:t>
                     </a:r>
                   </a:p>
                   <a:p>
                     <a:r>
                       <a:rPr lang="en-GB" dirty="0"/>
-                      <a:t>tracking</a:t>
+                      <a:t>API</a:t>
                     </a:r>
                   </a:p>
                 </p:txBody>
               </p:sp>
+              <p:cxnSp>
+                <p:nvCxnSpPr>
+                  <p:cNvPr id="44" name="Straight Arrow Connector 43">
+                    <a:extLst>
+                      <a:ext uri="{FF2B5EF4-FFF2-40B4-BE49-F238E27FC236}">
+                        <a16:creationId xmlns:a16="http://schemas.microsoft.com/office/drawing/2014/main" id="{233D3E2C-E19E-42DB-A0DB-A730C43FB496}"/>
+                      </a:ext>
+                    </a:extLst>
+                  </p:cNvPr>
+                  <p:cNvCxnSpPr>
+                    <a:stCxn id="30" idx="1"/>
+                    <a:endCxn id="31" idx="5"/>
+                  </p:cNvCxnSpPr>
+                  <p:nvPr/>
+                </p:nvCxnSpPr>
+                <p:spPr>
+                  <a:xfrm flipH="1" flipV="1">
+                    <a:off x="6296657" y="2609161"/>
+                    <a:ext cx="3410908" cy="1017"/>
+                  </a:xfrm>
+                  <a:prstGeom prst="straightConnector1">
+                    <a:avLst/>
+                  </a:prstGeom>
+                  <a:ln>
+                    <a:tailEnd type="triangle"/>
+                  </a:ln>
+                </p:spPr>
+                <p:style>
+                  <a:lnRef idx="1">
+                    <a:schemeClr val="accent1"/>
+                  </a:lnRef>
+                  <a:fillRef idx="0">
+                    <a:schemeClr val="accent1"/>
+                  </a:fillRef>
+                  <a:effectRef idx="0">
+                    <a:schemeClr val="accent1"/>
+                  </a:effectRef>
+                  <a:fontRef idx="minor">
+                    <a:schemeClr val="tx1"/>
+                  </a:fontRef>
+                </p:style>
+              </p:cxnSp>
+              <p:sp>
+                <p:nvSpPr>
+                  <p:cNvPr id="46" name="TextBox 45">
+                    <a:extLst>
+                      <a:ext uri="{FF2B5EF4-FFF2-40B4-BE49-F238E27FC236}">
+                        <a16:creationId xmlns:a16="http://schemas.microsoft.com/office/drawing/2014/main" id="{53FAD112-4279-441F-9562-C6A351BA9E58}"/>
+                      </a:ext>
+                    </a:extLst>
+                  </p:cNvPr>
+                  <p:cNvSpPr txBox="1"/>
+                  <p:nvPr/>
+                </p:nvSpPr>
+                <p:spPr>
+                  <a:xfrm>
+                    <a:off x="7808281" y="2277981"/>
+                    <a:ext cx="1637692" cy="369332"/>
+                  </a:xfrm>
+                  <a:prstGeom prst="rect">
+                    <a:avLst/>
+                  </a:prstGeom>
+                  <a:noFill/>
+                </p:spPr>
+                <p:txBody>
+                  <a:bodyPr wrap="none" rtlCol="0">
+                    <a:spAutoFit/>
+                  </a:bodyPr>
+                  <a:lstStyle/>
+                  <a:p>
+                    <a:r>
+                      <a:rPr lang="en-GB" dirty="0"/>
+                      <a:t>Orchestrate job</a:t>
+                    </a:r>
+                  </a:p>
+                </p:txBody>
+              </p:sp>
+              <p:pic>
+                <p:nvPicPr>
+                  <p:cNvPr id="48" name="Picture 47">
+                    <a:extLst>
+                      <a:ext uri="{FF2B5EF4-FFF2-40B4-BE49-F238E27FC236}">
+                        <a16:creationId xmlns:a16="http://schemas.microsoft.com/office/drawing/2014/main" id="{964B214E-C13E-4A2B-A326-DF7BE62E29B4}"/>
+                      </a:ext>
+                    </a:extLst>
+                  </p:cNvPr>
+                  <p:cNvPicPr>
+                    <a:picLocks noChangeAspect="1"/>
+                  </p:cNvPicPr>
+                  <p:nvPr/>
+                </p:nvPicPr>
+                <p:blipFill>
+                  <a:blip r:embed="rId12">
+                    <a:extLst>
+                      <a:ext uri="{BEBA8EAE-BF5A-486C-A8C5-ECC9F3942E4B}">
+                        <a14:imgProps xmlns:a14="http://schemas.microsoft.com/office/drawing/2010/main">
+                          <a14:imgLayer r:embed="rId13">
+                            <a14:imgEffect>
+                              <a14:brightnessContrast contrast="40000"/>
+                            </a14:imgEffect>
+                          </a14:imgLayer>
+                        </a14:imgProps>
+                      </a:ext>
+                    </a:extLst>
+                  </a:blip>
+                  <a:stretch>
+                    <a:fillRect/>
+                  </a:stretch>
+                </p:blipFill>
+                <p:spPr>
+                  <a:xfrm>
+                    <a:off x="230989" y="393836"/>
+                    <a:ext cx="1482345" cy="646331"/>
+                  </a:xfrm>
+                  <a:prstGeom prst="rect">
+                    <a:avLst/>
+                  </a:prstGeom>
+                </p:spPr>
+              </p:pic>
+              <p:pic>
+                <p:nvPicPr>
+                  <p:cNvPr id="49" name="Picture 48">
+                    <a:extLst>
+                      <a:ext uri="{FF2B5EF4-FFF2-40B4-BE49-F238E27FC236}">
+                        <a16:creationId xmlns:a16="http://schemas.microsoft.com/office/drawing/2014/main" id="{EA9F67CE-574D-47A5-AB66-E050385A37A7}"/>
+                      </a:ext>
+                    </a:extLst>
+                  </p:cNvPr>
+                  <p:cNvPicPr>
+                    <a:picLocks noChangeAspect="1"/>
+                  </p:cNvPicPr>
+                  <p:nvPr/>
+                </p:nvPicPr>
+                <p:blipFill rotWithShape="1">
+                  <a:blip r:embed="rId14"/>
+                  <a:srcRect b="20504"/>
+                  <a:stretch/>
+                </p:blipFill>
+                <p:spPr>
+                  <a:xfrm>
+                    <a:off x="1273652" y="4034679"/>
+                    <a:ext cx="811442" cy="791368"/>
+                  </a:xfrm>
+                  <a:prstGeom prst="rect">
+                    <a:avLst/>
+                  </a:prstGeom>
+                </p:spPr>
+              </p:pic>
             </p:grpSp>
             <p:sp>
               <p:nvSpPr>
-                <p:cNvPr id="20" name="TextBox 19">
+                <p:cNvPr id="40" name="TextBox 39">
                   <a:extLst>
                     <a:ext uri="{FF2B5EF4-FFF2-40B4-BE49-F238E27FC236}">
-                      <a16:creationId xmlns:a16="http://schemas.microsoft.com/office/drawing/2014/main" id="{79C04613-F53F-4A9D-B33D-8B32CFC17697}"/>
+                      <a16:creationId xmlns:a16="http://schemas.microsoft.com/office/drawing/2014/main" id="{F4E33A39-1BDD-44C6-8D77-8FB9AB95E31E}"/>
                     </a:ext>
                   </a:extLst>
                 </p:cNvPr>
@@ -3821,8 +4741,8 @@
               </p:nvSpPr>
               <p:spPr>
                 <a:xfrm>
-                  <a:off x="2440380" y="1145858"/>
-                  <a:ext cx="1451936" cy="369332"/>
+                  <a:off x="7921376" y="2578211"/>
+                  <a:ext cx="824265" cy="369332"/>
                 </a:xfrm>
                 <a:prstGeom prst="rect">
                   <a:avLst/>
@@ -3837,18 +4757,171 @@
                 <a:p>
                   <a:r>
                     <a:rPr lang="en-GB" dirty="0"/>
-                    <a:t>Development</a:t>
+                    <a:t>Az API </a:t>
                   </a:r>
                 </a:p>
               </p:txBody>
             </p:sp>
+            <p:sp>
+              <p:nvSpPr>
+                <p:cNvPr id="43" name="TextBox 42">
+                  <a:extLst>
+                    <a:ext uri="{FF2B5EF4-FFF2-40B4-BE49-F238E27FC236}">
+                      <a16:creationId xmlns:a16="http://schemas.microsoft.com/office/drawing/2014/main" id="{0F60C258-DB07-488B-95D7-469C3F748E17}"/>
+                    </a:ext>
+                  </a:extLst>
+                </p:cNvPr>
+                <p:cNvSpPr txBox="1"/>
+                <p:nvPr/>
+              </p:nvSpPr>
+              <p:spPr>
+                <a:xfrm>
+                  <a:off x="5056612" y="2602883"/>
+                  <a:ext cx="545277" cy="369332"/>
+                </a:xfrm>
+                <a:prstGeom prst="rect">
+                  <a:avLst/>
+                </a:prstGeom>
+                <a:noFill/>
+              </p:spPr>
+              <p:txBody>
+                <a:bodyPr wrap="none" rtlCol="0">
+                  <a:spAutoFit/>
+                </a:bodyPr>
+                <a:lstStyle/>
+                <a:p>
+                  <a:r>
+                    <a:rPr lang="en-GB" dirty="0"/>
+                    <a:t>ACS</a:t>
+                  </a:r>
+                </a:p>
+              </p:txBody>
+            </p:sp>
+            <p:sp>
+              <p:nvSpPr>
+                <p:cNvPr id="45" name="TextBox 44">
+                  <a:extLst>
+                    <a:ext uri="{FF2B5EF4-FFF2-40B4-BE49-F238E27FC236}">
+                      <a16:creationId xmlns:a16="http://schemas.microsoft.com/office/drawing/2014/main" id="{058A5B6B-BB53-445B-B003-AFAF0DAC7CB1}"/>
+                    </a:ext>
+                  </a:extLst>
+                </p:cNvPr>
+                <p:cNvSpPr txBox="1"/>
+                <p:nvPr/>
+              </p:nvSpPr>
+              <p:spPr>
+                <a:xfrm>
+                  <a:off x="6322625" y="2578211"/>
+                  <a:ext cx="541687" cy="369332"/>
+                </a:xfrm>
+                <a:prstGeom prst="rect">
+                  <a:avLst/>
+                </a:prstGeom>
+                <a:noFill/>
+              </p:spPr>
+              <p:txBody>
+                <a:bodyPr wrap="none" rtlCol="0">
+                  <a:spAutoFit/>
+                </a:bodyPr>
+                <a:lstStyle/>
+                <a:p>
+                  <a:r>
+                    <a:rPr lang="en-GB" dirty="0"/>
+                    <a:t>AKS</a:t>
+                  </a:r>
+                </a:p>
+              </p:txBody>
+            </p:sp>
+            <p:cxnSp>
+              <p:nvCxnSpPr>
+                <p:cNvPr id="29" name="Straight Arrow Connector 28">
+                  <a:extLst>
+                    <a:ext uri="{FF2B5EF4-FFF2-40B4-BE49-F238E27FC236}">
+                      <a16:creationId xmlns:a16="http://schemas.microsoft.com/office/drawing/2014/main" id="{6A547D07-77EE-4C51-8504-C342B1C7919A}"/>
+                    </a:ext>
+                  </a:extLst>
+                </p:cNvPr>
+                <p:cNvCxnSpPr>
+                  <a:stCxn id="4" idx="3"/>
+                  <a:endCxn id="8" idx="1"/>
+                </p:cNvCxnSpPr>
+                <p:nvPr/>
+              </p:nvCxnSpPr>
+              <p:spPr>
+                <a:xfrm flipV="1">
+                  <a:off x="6206971" y="2468250"/>
+                  <a:ext cx="455500" cy="8988"/>
+                </a:xfrm>
+                <a:prstGeom prst="straightConnector1">
+                  <a:avLst/>
+                </a:prstGeom>
+                <a:ln>
+                  <a:tailEnd type="triangle"/>
+                </a:ln>
+              </p:spPr>
+              <p:style>
+                <a:lnRef idx="1">
+                  <a:schemeClr val="accent1"/>
+                </a:lnRef>
+                <a:fillRef idx="0">
+                  <a:schemeClr val="accent1"/>
+                </a:fillRef>
+                <a:effectRef idx="0">
+                  <a:schemeClr val="accent1"/>
+                </a:effectRef>
+                <a:fontRef idx="minor">
+                  <a:schemeClr val="tx1"/>
+                </a:fontRef>
+              </p:style>
+            </p:cxnSp>
+            <p:cxnSp>
+              <p:nvCxnSpPr>
+                <p:cNvPr id="36" name="Straight Arrow Connector 35">
+                  <a:extLst>
+                    <a:ext uri="{FF2B5EF4-FFF2-40B4-BE49-F238E27FC236}">
+                      <a16:creationId xmlns:a16="http://schemas.microsoft.com/office/drawing/2014/main" id="{6CFE45C8-F237-4EC7-8982-B901CBFB7F7D}"/>
+                    </a:ext>
+                  </a:extLst>
+                </p:cNvPr>
+                <p:cNvCxnSpPr>
+                  <a:stCxn id="8" idx="3"/>
+                </p:cNvCxnSpPr>
+                <p:nvPr/>
+              </p:nvCxnSpPr>
+              <p:spPr>
+                <a:xfrm>
+                  <a:off x="7529246" y="2468250"/>
+                  <a:ext cx="732800" cy="0"/>
+                </a:xfrm>
+                <a:prstGeom prst="straightConnector1">
+                  <a:avLst/>
+                </a:prstGeom>
+                <a:ln>
+                  <a:tailEnd type="triangle"/>
+                </a:ln>
+              </p:spPr>
+              <p:style>
+                <a:lnRef idx="1">
+                  <a:schemeClr val="accent1"/>
+                </a:lnRef>
+                <a:fillRef idx="0">
+                  <a:schemeClr val="accent1"/>
+                </a:fillRef>
+                <a:effectRef idx="0">
+                  <a:schemeClr val="accent1"/>
+                </a:effectRef>
+                <a:fontRef idx="minor">
+                  <a:schemeClr val="tx1"/>
+                </a:fontRef>
+              </p:style>
+            </p:cxnSp>
           </p:grpSp>
           <p:pic>
             <p:nvPicPr>
-              <p:cNvPr id="11" name="Picture 10">
+              <p:cNvPr id="24" name="Picture 23">
                 <a:extLst>
                   <a:ext uri="{FF2B5EF4-FFF2-40B4-BE49-F238E27FC236}">
-                    <a16:creationId xmlns:a16="http://schemas.microsoft.com/office/drawing/2014/main" id="{82E3F97F-5078-46AC-8C83-52468738966E}"/>
+                    <a16:creationId xmlns:a16="http://schemas.microsoft.com/office/drawing/2014/main" id="{2426B08A-9A26-42D9-8125-96E797A6F899}"/>
                   </a:ext>
                 </a:extLst>
               </p:cNvPr>
@@ -3858,799 +4931,15 @@
               <p:nvPr/>
             </p:nvPicPr>
             <p:blipFill>
-              <a:blip r:embed="rId6"/>
+              <a:blip r:embed="rId15"/>
               <a:stretch>
                 <a:fillRect/>
               </a:stretch>
             </p:blipFill>
             <p:spPr>
               <a:xfrm>
-                <a:off x="4972430" y="2514496"/>
-                <a:ext cx="923925" cy="733425"/>
-              </a:xfrm>
-              <a:prstGeom prst="rect">
-                <a:avLst/>
-              </a:prstGeom>
-            </p:spPr>
-          </p:pic>
-          <p:grpSp>
-            <p:nvGrpSpPr>
-              <p:cNvPr id="28" name="Group 27">
-                <a:extLst>
-                  <a:ext uri="{FF2B5EF4-FFF2-40B4-BE49-F238E27FC236}">
-                    <a16:creationId xmlns:a16="http://schemas.microsoft.com/office/drawing/2014/main" id="{3E6C0F19-65A7-4FBE-A8F0-0A375663D886}"/>
-                  </a:ext>
-                </a:extLst>
-              </p:cNvPr>
-              <p:cNvGrpSpPr/>
-              <p:nvPr/>
-            </p:nvGrpSpPr>
-            <p:grpSpPr>
-              <a:xfrm>
-                <a:off x="4991424" y="655359"/>
-                <a:ext cx="4105835" cy="1022016"/>
-                <a:chOff x="5835443" y="813619"/>
-                <a:chExt cx="4105835" cy="1022016"/>
-              </a:xfrm>
-            </p:grpSpPr>
-            <p:grpSp>
-              <p:nvGrpSpPr>
-                <p:cNvPr id="25" name="Group 24">
-                  <a:extLst>
-                    <a:ext uri="{FF2B5EF4-FFF2-40B4-BE49-F238E27FC236}">
-                      <a16:creationId xmlns:a16="http://schemas.microsoft.com/office/drawing/2014/main" id="{11299963-A613-4045-9F7E-423EDB815074}"/>
-                    </a:ext>
-                  </a:extLst>
-                </p:cNvPr>
-                <p:cNvGrpSpPr/>
-                <p:nvPr/>
-              </p:nvGrpSpPr>
-              <p:grpSpPr>
-                <a:xfrm>
-                  <a:off x="5999349" y="990088"/>
-                  <a:ext cx="2322400" cy="800100"/>
-                  <a:chOff x="5999349" y="990088"/>
-                  <a:chExt cx="2322400" cy="800100"/>
-                </a:xfrm>
-              </p:grpSpPr>
-              <p:pic>
-                <p:nvPicPr>
-                  <p:cNvPr id="4" name="Picture 3">
-                    <a:extLst>
-                      <a:ext uri="{FF2B5EF4-FFF2-40B4-BE49-F238E27FC236}">
-                        <a16:creationId xmlns:a16="http://schemas.microsoft.com/office/drawing/2014/main" id="{C71ED731-ADF6-43CC-AE71-B0E315E8DC0E}"/>
-                      </a:ext>
-                    </a:extLst>
-                  </p:cNvPr>
-                  <p:cNvPicPr>
-                    <a:picLocks noChangeAspect="1"/>
-                  </p:cNvPicPr>
-                  <p:nvPr/>
-                </p:nvPicPr>
-                <p:blipFill>
-                  <a:blip r:embed="rId7"/>
-                  <a:stretch>
-                    <a:fillRect/>
-                  </a:stretch>
-                </p:blipFill>
-                <p:spPr>
-                  <a:xfrm>
-                    <a:off x="5999349" y="1046701"/>
-                    <a:ext cx="1000125" cy="704850"/>
-                  </a:xfrm>
-                  <a:prstGeom prst="rect">
-                    <a:avLst/>
-                  </a:prstGeom>
-                </p:spPr>
-              </p:pic>
-              <p:pic>
-                <p:nvPicPr>
-                  <p:cNvPr id="8" name="Picture 7">
-                    <a:extLst>
-                      <a:ext uri="{FF2B5EF4-FFF2-40B4-BE49-F238E27FC236}">
-                        <a16:creationId xmlns:a16="http://schemas.microsoft.com/office/drawing/2014/main" id="{AC831B61-5AD4-4DF9-AD39-6816B0A09948}"/>
-                      </a:ext>
-                    </a:extLst>
-                  </p:cNvPr>
-                  <p:cNvPicPr>
-                    <a:picLocks noChangeAspect="1"/>
-                  </p:cNvPicPr>
-                  <p:nvPr/>
-                </p:nvPicPr>
-                <p:blipFill>
-                  <a:blip r:embed="rId8"/>
-                  <a:stretch>
-                    <a:fillRect/>
-                  </a:stretch>
-                </p:blipFill>
-                <p:spPr>
-                  <a:xfrm>
-                    <a:off x="7454974" y="990088"/>
-                    <a:ext cx="866775" cy="800100"/>
-                  </a:xfrm>
-                  <a:prstGeom prst="rect">
-                    <a:avLst/>
-                  </a:prstGeom>
-                </p:spPr>
-              </p:pic>
-            </p:grpSp>
-            <p:sp>
-              <p:nvSpPr>
-                <p:cNvPr id="27" name="Cube 26">
-                  <a:extLst>
-                    <a:ext uri="{FF2B5EF4-FFF2-40B4-BE49-F238E27FC236}">
-                      <a16:creationId xmlns:a16="http://schemas.microsoft.com/office/drawing/2014/main" id="{C3FD1A3F-3FC4-45C4-BDAB-0AF97E495A10}"/>
-                    </a:ext>
-                  </a:extLst>
-                </p:cNvPr>
-                <p:cNvSpPr/>
-                <p:nvPr/>
-              </p:nvSpPr>
-              <p:spPr>
-                <a:xfrm>
-                  <a:off x="5835443" y="813619"/>
-                  <a:ext cx="4105835" cy="1022016"/>
-                </a:xfrm>
-                <a:prstGeom prst="cube">
-                  <a:avLst/>
-                </a:prstGeom>
-                <a:noFill/>
-              </p:spPr>
-              <p:style>
-                <a:lnRef idx="2">
-                  <a:schemeClr val="accent1">
-                    <a:shade val="50000"/>
-                  </a:schemeClr>
-                </a:lnRef>
-                <a:fillRef idx="1">
-                  <a:schemeClr val="accent1"/>
-                </a:fillRef>
-                <a:effectRef idx="0">
-                  <a:schemeClr val="accent1"/>
-                </a:effectRef>
-                <a:fontRef idx="minor">
-                  <a:schemeClr val="lt1"/>
-                </a:fontRef>
-              </p:style>
-              <p:txBody>
-                <a:bodyPr rtlCol="0" anchor="ctr"/>
-                <a:lstStyle/>
-                <a:p>
-                  <a:pPr algn="ctr"/>
-                  <a:endParaRPr lang="en-GB" dirty="0"/>
-                </a:p>
-              </p:txBody>
-            </p:sp>
-          </p:grpSp>
-          <p:sp>
-            <p:nvSpPr>
-              <p:cNvPr id="31" name="Cube 30">
-                <a:extLst>
-                  <a:ext uri="{FF2B5EF4-FFF2-40B4-BE49-F238E27FC236}">
-                    <a16:creationId xmlns:a16="http://schemas.microsoft.com/office/drawing/2014/main" id="{33F0EC28-7B6B-48A0-8FEF-7D4AE721C3E3}"/>
-                  </a:ext>
-                </a:extLst>
-              </p:cNvPr>
-              <p:cNvSpPr/>
-              <p:nvPr/>
-            </p:nvSpPr>
-            <p:spPr>
-              <a:xfrm>
-                <a:off x="4850023" y="2225905"/>
-                <a:ext cx="1446634" cy="1022016"/>
-              </a:xfrm>
-              <a:prstGeom prst="cube">
-                <a:avLst/>
-              </a:prstGeom>
-              <a:noFill/>
-            </p:spPr>
-            <p:style>
-              <a:lnRef idx="2">
-                <a:schemeClr val="accent1">
-                  <a:shade val="50000"/>
-                </a:schemeClr>
-              </a:lnRef>
-              <a:fillRef idx="1">
-                <a:schemeClr val="accent1"/>
-              </a:fillRef>
-              <a:effectRef idx="0">
-                <a:schemeClr val="accent1"/>
-              </a:effectRef>
-              <a:fontRef idx="minor">
-                <a:schemeClr val="lt1"/>
-              </a:fontRef>
-            </p:style>
-            <p:txBody>
-              <a:bodyPr rtlCol="0" anchor="ctr"/>
-              <a:lstStyle/>
-              <a:p>
-                <a:pPr algn="ctr"/>
-                <a:endParaRPr lang="en-GB"/>
-              </a:p>
-            </p:txBody>
-          </p:sp>
-          <p:pic>
-            <p:nvPicPr>
-              <p:cNvPr id="39" name="Picture 38">
-                <a:extLst>
-                  <a:ext uri="{FF2B5EF4-FFF2-40B4-BE49-F238E27FC236}">
-                    <a16:creationId xmlns:a16="http://schemas.microsoft.com/office/drawing/2014/main" id="{D5DCBE6E-8C1E-4D22-B005-D9AE08645FC3}"/>
-                  </a:ext>
-                </a:extLst>
-              </p:cNvPr>
-              <p:cNvPicPr>
-                <a:picLocks noChangeAspect="1"/>
-              </p:cNvPicPr>
-              <p:nvPr/>
-            </p:nvPicPr>
-            <p:blipFill>
-              <a:blip r:embed="rId9"/>
-              <a:stretch>
-                <a:fillRect/>
-              </a:stretch>
-            </p:blipFill>
-            <p:spPr>
-              <a:xfrm>
-                <a:off x="8731735" y="349036"/>
-                <a:ext cx="923834" cy="248783"/>
-              </a:xfrm>
-              <a:prstGeom prst="rect">
-                <a:avLst/>
-              </a:prstGeom>
-            </p:spPr>
-          </p:pic>
-          <p:pic>
-            <p:nvPicPr>
-              <p:cNvPr id="41" name="Picture 40">
-                <a:extLst>
-                  <a:ext uri="{FF2B5EF4-FFF2-40B4-BE49-F238E27FC236}">
-                    <a16:creationId xmlns:a16="http://schemas.microsoft.com/office/drawing/2014/main" id="{62567DDE-571A-4B74-8F0E-87AE839A76CF}"/>
-                  </a:ext>
-                </a:extLst>
-              </p:cNvPr>
-              <p:cNvPicPr>
-                <a:picLocks noChangeAspect="1"/>
-              </p:cNvPicPr>
-              <p:nvPr/>
-            </p:nvPicPr>
-            <p:blipFill>
-              <a:blip r:embed="rId10"/>
-              <a:stretch>
-                <a:fillRect/>
-              </a:stretch>
-            </p:blipFill>
-            <p:spPr>
-              <a:xfrm>
-                <a:off x="4356363" y="893175"/>
-                <a:ext cx="473962" cy="398686"/>
-              </a:xfrm>
-              <a:prstGeom prst="rect">
-                <a:avLst/>
-              </a:prstGeom>
-            </p:spPr>
-          </p:pic>
-          <p:cxnSp>
-            <p:nvCxnSpPr>
-              <p:cNvPr id="6" name="Connector: Elbow 5">
-                <a:extLst>
-                  <a:ext uri="{FF2B5EF4-FFF2-40B4-BE49-F238E27FC236}">
-                    <a16:creationId xmlns:a16="http://schemas.microsoft.com/office/drawing/2014/main" id="{B16F135B-4056-421C-948C-59960FAED34B}"/>
-                  </a:ext>
-                </a:extLst>
-              </p:cNvPr>
-              <p:cNvCxnSpPr>
-                <a:cxnSpLocks/>
-                <a:stCxn id="14" idx="5"/>
-                <a:endCxn id="27" idx="2"/>
-              </p:cNvCxnSpPr>
-              <p:nvPr/>
-            </p:nvCxnSpPr>
-            <p:spPr>
-              <a:xfrm flipV="1">
-                <a:off x="4469886" y="1294119"/>
-                <a:ext cx="521538" cy="629353"/>
-              </a:xfrm>
-              <a:prstGeom prst="bentConnector3">
-                <a:avLst/>
-              </a:prstGeom>
-              <a:ln>
-                <a:tailEnd type="triangle"/>
-              </a:ln>
-            </p:spPr>
-            <p:style>
-              <a:lnRef idx="1">
-                <a:schemeClr val="accent1"/>
-              </a:lnRef>
-              <a:fillRef idx="0">
-                <a:schemeClr val="accent1"/>
-              </a:fillRef>
-              <a:effectRef idx="0">
-                <a:schemeClr val="accent1"/>
-              </a:effectRef>
-              <a:fontRef idx="minor">
-                <a:schemeClr val="tx1"/>
-              </a:fontRef>
-            </p:style>
-          </p:cxnSp>
-          <p:sp>
-            <p:nvSpPr>
-              <p:cNvPr id="13" name="TextBox 12">
-                <a:extLst>
-                  <a:ext uri="{FF2B5EF4-FFF2-40B4-BE49-F238E27FC236}">
-                    <a16:creationId xmlns:a16="http://schemas.microsoft.com/office/drawing/2014/main" id="{8E2EDC54-FD58-483B-BA14-BEDB18AF3AF2}"/>
-                  </a:ext>
-                </a:extLst>
-              </p:cNvPr>
-              <p:cNvSpPr txBox="1"/>
-              <p:nvPr/>
-            </p:nvSpPr>
-            <p:spPr>
-              <a:xfrm>
-                <a:off x="5434392" y="307318"/>
-                <a:ext cx="3316292" cy="369332"/>
-              </a:xfrm>
-              <a:prstGeom prst="rect">
-                <a:avLst/>
-              </a:prstGeom>
-              <a:noFill/>
-            </p:spPr>
-            <p:txBody>
-              <a:bodyPr wrap="none" rtlCol="0">
-                <a:spAutoFit/>
-              </a:bodyPr>
-              <a:lstStyle/>
-              <a:p>
-                <a:r>
-                  <a:rPr lang="en-GB" dirty="0"/>
-                  <a:t>Containerized model deployment</a:t>
-                </a:r>
-              </a:p>
-            </p:txBody>
-          </p:sp>
-          <p:sp>
-            <p:nvSpPr>
-              <p:cNvPr id="32" name="TextBox 31">
-                <a:extLst>
-                  <a:ext uri="{FF2B5EF4-FFF2-40B4-BE49-F238E27FC236}">
-                    <a16:creationId xmlns:a16="http://schemas.microsoft.com/office/drawing/2014/main" id="{7A5DE1F8-288A-40A0-A2AF-1A8121D8981B}"/>
-                  </a:ext>
-                </a:extLst>
-              </p:cNvPr>
-              <p:cNvSpPr txBox="1"/>
-              <p:nvPr/>
-            </p:nvSpPr>
-            <p:spPr>
-              <a:xfrm>
-                <a:off x="5115612" y="1875965"/>
-                <a:ext cx="2918619" cy="369332"/>
-              </a:xfrm>
-              <a:prstGeom prst="rect">
-                <a:avLst/>
-              </a:prstGeom>
-              <a:noFill/>
-            </p:spPr>
-            <p:txBody>
-              <a:bodyPr wrap="none" rtlCol="0">
-                <a:spAutoFit/>
-              </a:bodyPr>
-              <a:lstStyle/>
-              <a:p>
-                <a:r>
-                  <a:rPr lang="en-GB" dirty="0"/>
-                  <a:t>Retrieved model deployment</a:t>
-                </a:r>
-              </a:p>
-            </p:txBody>
-          </p:sp>
-          <p:cxnSp>
-            <p:nvCxnSpPr>
-              <p:cNvPr id="26" name="Connector: Elbow 25">
-                <a:extLst>
-                  <a:ext uri="{FF2B5EF4-FFF2-40B4-BE49-F238E27FC236}">
-                    <a16:creationId xmlns:a16="http://schemas.microsoft.com/office/drawing/2014/main" id="{72C65006-3ED4-4C1A-9E25-44865EAA38C2}"/>
-                  </a:ext>
-                </a:extLst>
-              </p:cNvPr>
-              <p:cNvCxnSpPr>
-                <a:cxnSpLocks/>
-                <a:stCxn id="14" idx="5"/>
-                <a:endCxn id="31" idx="2"/>
-              </p:cNvCxnSpPr>
-              <p:nvPr/>
-            </p:nvCxnSpPr>
-            <p:spPr>
-              <a:xfrm>
-                <a:off x="4469886" y="1923472"/>
-                <a:ext cx="380137" cy="941193"/>
-              </a:xfrm>
-              <a:prstGeom prst="bentConnector3">
-                <a:avLst/>
-              </a:prstGeom>
-              <a:ln>
-                <a:tailEnd type="triangle"/>
-              </a:ln>
-            </p:spPr>
-            <p:style>
-              <a:lnRef idx="1">
-                <a:schemeClr val="accent1"/>
-              </a:lnRef>
-              <a:fillRef idx="0">
-                <a:schemeClr val="accent1"/>
-              </a:fillRef>
-              <a:effectRef idx="0">
-                <a:schemeClr val="accent1"/>
-              </a:effectRef>
-              <a:fontRef idx="minor">
-                <a:schemeClr val="tx1"/>
-              </a:fontRef>
-            </p:style>
-          </p:cxnSp>
-          <p:sp>
-            <p:nvSpPr>
-              <p:cNvPr id="30" name="Rectangle 29">
-                <a:extLst>
-                  <a:ext uri="{FF2B5EF4-FFF2-40B4-BE49-F238E27FC236}">
-                    <a16:creationId xmlns:a16="http://schemas.microsoft.com/office/drawing/2014/main" id="{78492EE9-FA46-4937-9F7E-32703EA3641D}"/>
-                  </a:ext>
-                </a:extLst>
-              </p:cNvPr>
-              <p:cNvSpPr/>
-              <p:nvPr/>
-            </p:nvSpPr>
-            <p:spPr>
-              <a:xfrm>
-                <a:off x="9707565" y="2187279"/>
-                <a:ext cx="1828800" cy="845798"/>
-              </a:xfrm>
-              <a:prstGeom prst="rect">
-                <a:avLst/>
-              </a:prstGeom>
-            </p:spPr>
-            <p:style>
-              <a:lnRef idx="2">
-                <a:schemeClr val="accent1">
-                  <a:shade val="50000"/>
-                </a:schemeClr>
-              </a:lnRef>
-              <a:fillRef idx="1">
-                <a:schemeClr val="accent1"/>
-              </a:fillRef>
-              <a:effectRef idx="0">
-                <a:schemeClr val="accent1"/>
-              </a:effectRef>
-              <a:fontRef idx="minor">
-                <a:schemeClr val="lt1"/>
-              </a:fontRef>
-            </p:style>
-            <p:txBody>
-              <a:bodyPr rtlCol="0" anchor="ctr"/>
-              <a:lstStyle/>
-              <a:p>
-                <a:pPr algn="ctr"/>
-                <a:r>
-                  <a:rPr lang="en-GB" dirty="0"/>
-                  <a:t>Batch</a:t>
-                </a:r>
-              </a:p>
-              <a:p>
-                <a:pPr algn="ctr"/>
-                <a:r>
-                  <a:rPr lang="en-GB" dirty="0"/>
-                  <a:t>(Airflow)</a:t>
-                </a:r>
-              </a:p>
-            </p:txBody>
-          </p:sp>
-          <p:sp>
-            <p:nvSpPr>
-              <p:cNvPr id="33" name="TextBox 32">
-                <a:extLst>
-                  <a:ext uri="{FF2B5EF4-FFF2-40B4-BE49-F238E27FC236}">
-                    <a16:creationId xmlns:a16="http://schemas.microsoft.com/office/drawing/2014/main" id="{445C4801-735E-448F-8965-D5EB61710333}"/>
-                  </a:ext>
-                </a:extLst>
-              </p:cNvPr>
-              <p:cNvSpPr txBox="1"/>
-              <p:nvPr/>
-            </p:nvSpPr>
-            <p:spPr>
-              <a:xfrm>
-                <a:off x="9881809" y="307318"/>
-                <a:ext cx="1654556" cy="369332"/>
-              </a:xfrm>
-              <a:prstGeom prst="rect">
-                <a:avLst/>
-              </a:prstGeom>
-              <a:noFill/>
-            </p:spPr>
-            <p:txBody>
-              <a:bodyPr wrap="none" rtlCol="0">
-                <a:spAutoFit/>
-              </a:bodyPr>
-              <a:lstStyle/>
-              <a:p>
-                <a:r>
-                  <a:rPr lang="en-GB" dirty="0"/>
-                  <a:t>Workload types</a:t>
-                </a:r>
-              </a:p>
-            </p:txBody>
-          </p:sp>
-          <p:sp>
-            <p:nvSpPr>
-              <p:cNvPr id="38" name="Rectangle 37">
-                <a:extLst>
-                  <a:ext uri="{FF2B5EF4-FFF2-40B4-BE49-F238E27FC236}">
-                    <a16:creationId xmlns:a16="http://schemas.microsoft.com/office/drawing/2014/main" id="{38E19B20-1728-40B3-B252-01BAEB65211E}"/>
-                  </a:ext>
-                </a:extLst>
-              </p:cNvPr>
-              <p:cNvSpPr/>
-              <p:nvPr/>
-            </p:nvSpPr>
-            <p:spPr>
-              <a:xfrm>
-                <a:off x="9794687" y="615716"/>
-                <a:ext cx="1828800" cy="845798"/>
-              </a:xfrm>
-              <a:prstGeom prst="rect">
-                <a:avLst/>
-              </a:prstGeom>
-            </p:spPr>
-            <p:style>
-              <a:lnRef idx="2">
-                <a:schemeClr val="accent1">
-                  <a:shade val="50000"/>
-                </a:schemeClr>
-              </a:lnRef>
-              <a:fillRef idx="1">
-                <a:schemeClr val="accent1"/>
-              </a:fillRef>
-              <a:effectRef idx="0">
-                <a:schemeClr val="accent1"/>
-              </a:effectRef>
-              <a:fontRef idx="minor">
-                <a:schemeClr val="lt1"/>
-              </a:fontRef>
-            </p:style>
-            <p:txBody>
-              <a:bodyPr rtlCol="0" anchor="ctr"/>
-              <a:lstStyle/>
-              <a:p>
-                <a:pPr algn="ctr"/>
-                <a:r>
-                  <a:rPr lang="en-GB" dirty="0"/>
-                  <a:t>Online</a:t>
-                </a:r>
-              </a:p>
-            </p:txBody>
-          </p:sp>
-          <p:cxnSp>
-            <p:nvCxnSpPr>
-              <p:cNvPr id="35" name="Straight Arrow Connector 34">
-                <a:extLst>
-                  <a:ext uri="{FF2B5EF4-FFF2-40B4-BE49-F238E27FC236}">
-                    <a16:creationId xmlns:a16="http://schemas.microsoft.com/office/drawing/2014/main" id="{3C71C2B1-5EFD-43E9-83AD-35787C4A343F}"/>
-                  </a:ext>
-                </a:extLst>
-              </p:cNvPr>
-              <p:cNvCxnSpPr>
-                <a:stCxn id="38" idx="1"/>
-                <a:endCxn id="27" idx="5"/>
-              </p:cNvCxnSpPr>
-              <p:nvPr/>
-            </p:nvCxnSpPr>
-            <p:spPr>
-              <a:xfrm flipH="1">
-                <a:off x="9097259" y="1038615"/>
-                <a:ext cx="697428" cy="0"/>
-              </a:xfrm>
-              <a:prstGeom prst="straightConnector1">
-                <a:avLst/>
-              </a:prstGeom>
-              <a:ln>
-                <a:tailEnd type="triangle"/>
-              </a:ln>
-            </p:spPr>
-            <p:style>
-              <a:lnRef idx="1">
-                <a:schemeClr val="accent1"/>
-              </a:lnRef>
-              <a:fillRef idx="0">
-                <a:schemeClr val="accent1"/>
-              </a:fillRef>
-              <a:effectRef idx="0">
-                <a:schemeClr val="accent1"/>
-              </a:effectRef>
-              <a:fontRef idx="minor">
-                <a:schemeClr val="tx1"/>
-              </a:fontRef>
-            </p:style>
-          </p:cxnSp>
-          <p:sp>
-            <p:nvSpPr>
-              <p:cNvPr id="42" name="TextBox 41">
-                <a:extLst>
-                  <a:ext uri="{FF2B5EF4-FFF2-40B4-BE49-F238E27FC236}">
-                    <a16:creationId xmlns:a16="http://schemas.microsoft.com/office/drawing/2014/main" id="{0C96020C-483D-4E23-97BD-799026B4919E}"/>
-                  </a:ext>
-                </a:extLst>
-              </p:cNvPr>
-              <p:cNvSpPr txBox="1"/>
-              <p:nvPr/>
-            </p:nvSpPr>
-            <p:spPr>
-              <a:xfrm>
-                <a:off x="9201496" y="1098706"/>
-                <a:ext cx="524503" cy="646331"/>
-              </a:xfrm>
-              <a:prstGeom prst="rect">
-                <a:avLst/>
-              </a:prstGeom>
-              <a:noFill/>
-            </p:spPr>
-            <p:txBody>
-              <a:bodyPr wrap="square" rtlCol="0">
-                <a:spAutoFit/>
-              </a:bodyPr>
-              <a:lstStyle/>
-              <a:p>
-                <a:r>
-                  <a:rPr lang="en-GB" dirty="0"/>
-                  <a:t>Call</a:t>
-                </a:r>
-              </a:p>
-              <a:p>
-                <a:r>
-                  <a:rPr lang="en-GB" dirty="0"/>
-                  <a:t>API</a:t>
-                </a:r>
-              </a:p>
-            </p:txBody>
-          </p:sp>
-          <p:cxnSp>
-            <p:nvCxnSpPr>
-              <p:cNvPr id="44" name="Straight Arrow Connector 43">
-                <a:extLst>
-                  <a:ext uri="{FF2B5EF4-FFF2-40B4-BE49-F238E27FC236}">
-                    <a16:creationId xmlns:a16="http://schemas.microsoft.com/office/drawing/2014/main" id="{233D3E2C-E19E-42DB-A0DB-A730C43FB496}"/>
-                  </a:ext>
-                </a:extLst>
-              </p:cNvPr>
-              <p:cNvCxnSpPr>
-                <a:stCxn id="30" idx="1"/>
-                <a:endCxn id="31" idx="5"/>
-              </p:cNvCxnSpPr>
-              <p:nvPr/>
-            </p:nvCxnSpPr>
-            <p:spPr>
-              <a:xfrm flipH="1" flipV="1">
-                <a:off x="6296657" y="2609161"/>
-                <a:ext cx="3410908" cy="1017"/>
-              </a:xfrm>
-              <a:prstGeom prst="straightConnector1">
-                <a:avLst/>
-              </a:prstGeom>
-              <a:ln>
-                <a:tailEnd type="triangle"/>
-              </a:ln>
-            </p:spPr>
-            <p:style>
-              <a:lnRef idx="1">
-                <a:schemeClr val="accent1"/>
-              </a:lnRef>
-              <a:fillRef idx="0">
-                <a:schemeClr val="accent1"/>
-              </a:fillRef>
-              <a:effectRef idx="0">
-                <a:schemeClr val="accent1"/>
-              </a:effectRef>
-              <a:fontRef idx="minor">
-                <a:schemeClr val="tx1"/>
-              </a:fontRef>
-            </p:style>
-          </p:cxnSp>
-          <p:sp>
-            <p:nvSpPr>
-              <p:cNvPr id="46" name="TextBox 45">
-                <a:extLst>
-                  <a:ext uri="{FF2B5EF4-FFF2-40B4-BE49-F238E27FC236}">
-                    <a16:creationId xmlns:a16="http://schemas.microsoft.com/office/drawing/2014/main" id="{53FAD112-4279-441F-9562-C6A351BA9E58}"/>
-                  </a:ext>
-                </a:extLst>
-              </p:cNvPr>
-              <p:cNvSpPr txBox="1"/>
-              <p:nvPr/>
-            </p:nvSpPr>
-            <p:spPr>
-              <a:xfrm>
-                <a:off x="7808281" y="2277981"/>
-                <a:ext cx="1637692" cy="369332"/>
-              </a:xfrm>
-              <a:prstGeom prst="rect">
-                <a:avLst/>
-              </a:prstGeom>
-              <a:noFill/>
-            </p:spPr>
-            <p:txBody>
-              <a:bodyPr wrap="none" rtlCol="0">
-                <a:spAutoFit/>
-              </a:bodyPr>
-              <a:lstStyle/>
-              <a:p>
-                <a:r>
-                  <a:rPr lang="en-GB" dirty="0"/>
-                  <a:t>Orchestrate job</a:t>
-                </a:r>
-              </a:p>
-            </p:txBody>
-          </p:sp>
-          <p:pic>
-            <p:nvPicPr>
-              <p:cNvPr id="48" name="Picture 47">
-                <a:extLst>
-                  <a:ext uri="{FF2B5EF4-FFF2-40B4-BE49-F238E27FC236}">
-                    <a16:creationId xmlns:a16="http://schemas.microsoft.com/office/drawing/2014/main" id="{964B214E-C13E-4A2B-A326-DF7BE62E29B4}"/>
-                  </a:ext>
-                </a:extLst>
-              </p:cNvPr>
-              <p:cNvPicPr>
-                <a:picLocks noChangeAspect="1"/>
-              </p:cNvPicPr>
-              <p:nvPr/>
-            </p:nvPicPr>
-            <p:blipFill>
-              <a:blip r:embed="rId11">
-                <a:extLst>
-                  <a:ext uri="{BEBA8EAE-BF5A-486C-A8C5-ECC9F3942E4B}">
-                    <a14:imgProps xmlns:a14="http://schemas.microsoft.com/office/drawing/2010/main">
-                      <a14:imgLayer r:embed="rId12">
-                        <a14:imgEffect>
-                          <a14:brightnessContrast contrast="40000"/>
-                        </a14:imgEffect>
-                      </a14:imgLayer>
-                    </a14:imgProps>
-                  </a:ext>
-                </a:extLst>
-              </a:blip>
-              <a:stretch>
-                <a:fillRect/>
-              </a:stretch>
-            </p:blipFill>
-            <p:spPr>
-              <a:xfrm>
-                <a:off x="230989" y="393836"/>
-                <a:ext cx="1482345" cy="646331"/>
-              </a:xfrm>
-              <a:prstGeom prst="rect">
-                <a:avLst/>
-              </a:prstGeom>
-            </p:spPr>
-          </p:pic>
-          <p:pic>
-            <p:nvPicPr>
-              <p:cNvPr id="49" name="Picture 48">
-                <a:extLst>
-                  <a:ext uri="{FF2B5EF4-FFF2-40B4-BE49-F238E27FC236}">
-                    <a16:creationId xmlns:a16="http://schemas.microsoft.com/office/drawing/2014/main" id="{EA9F67CE-574D-47A5-AB66-E050385A37A7}"/>
-                  </a:ext>
-                </a:extLst>
-              </p:cNvPr>
-              <p:cNvPicPr>
-                <a:picLocks noChangeAspect="1"/>
-              </p:cNvPicPr>
-              <p:nvPr/>
-            </p:nvPicPr>
-            <p:blipFill>
-              <a:blip r:embed="rId13"/>
-              <a:stretch>
-                <a:fillRect/>
-              </a:stretch>
-            </p:blipFill>
-            <p:spPr>
-              <a:xfrm>
-                <a:off x="3983970" y="959944"/>
-                <a:ext cx="452947" cy="555677"/>
+                <a:off x="2573539" y="5321968"/>
+                <a:ext cx="3895725" cy="704850"/>
               </a:xfrm>
               <a:prstGeom prst="rect">
                 <a:avLst/>
@@ -4660,10 +4949,10 @@
         </p:grpSp>
         <p:sp>
           <p:nvSpPr>
-            <p:cNvPr id="40" name="TextBox 39">
+            <p:cNvPr id="34" name="TextBox 33">
               <a:extLst>
                 <a:ext uri="{FF2B5EF4-FFF2-40B4-BE49-F238E27FC236}">
-                  <a16:creationId xmlns:a16="http://schemas.microsoft.com/office/drawing/2014/main" id="{F4E33A39-1BDD-44C6-8D77-8FB9AB95E31E}"/>
+                  <a16:creationId xmlns:a16="http://schemas.microsoft.com/office/drawing/2014/main" id="{2757B0C8-D684-4D83-BC15-FBBCD30BD732}"/>
                 </a:ext>
               </a:extLst>
             </p:cNvPr>
@@ -4672,8 +4961,8 @@
           </p:nvSpPr>
           <p:spPr>
             <a:xfrm>
-              <a:off x="7921376" y="2578211"/>
-              <a:ext cx="681340" cy="369332"/>
+              <a:off x="1166473" y="6078028"/>
+              <a:ext cx="970137" cy="369332"/>
             </a:xfrm>
             <a:prstGeom prst="rect">
               <a:avLst/>
@@ -4688,17 +4977,17 @@
             <a:p>
               <a:r>
                 <a:rPr lang="en-GB" dirty="0"/>
-                <a:t>LOGS</a:t>
+                <a:t>GIT HUB</a:t>
               </a:r>
             </a:p>
           </p:txBody>
         </p:sp>
         <p:sp>
           <p:nvSpPr>
-            <p:cNvPr id="43" name="TextBox 42">
+            <p:cNvPr id="51" name="TextBox 50">
               <a:extLst>
                 <a:ext uri="{FF2B5EF4-FFF2-40B4-BE49-F238E27FC236}">
-                  <a16:creationId xmlns:a16="http://schemas.microsoft.com/office/drawing/2014/main" id="{0F60C258-DB07-488B-95D7-469C3F748E17}"/>
+                  <a16:creationId xmlns:a16="http://schemas.microsoft.com/office/drawing/2014/main" id="{14625738-5C5A-416A-BDA7-F662C749FC48}"/>
                 </a:ext>
               </a:extLst>
             </p:cNvPr>
@@ -4707,8 +4996,8 @@
           </p:nvSpPr>
           <p:spPr>
             <a:xfrm>
-              <a:off x="5056612" y="2602883"/>
-              <a:ext cx="545277" cy="369332"/>
+              <a:off x="2535951" y="6023288"/>
+              <a:ext cx="1443793" cy="646331"/>
             </a:xfrm>
             <a:prstGeom prst="rect">
               <a:avLst/>
@@ -4723,17 +5012,23 @@
             <a:p>
               <a:r>
                 <a:rPr lang="en-GB" dirty="0"/>
-                <a:t>ACS</a:t>
+                <a:t>COST</a:t>
+              </a:r>
+            </a:p>
+            <a:p>
+              <a:r>
+                <a:rPr lang="en-GB" dirty="0"/>
+                <a:t>Management</a:t>
               </a:r>
             </a:p>
           </p:txBody>
         </p:sp>
         <p:sp>
           <p:nvSpPr>
-            <p:cNvPr id="45" name="TextBox 44">
+            <p:cNvPr id="52" name="TextBox 51">
               <a:extLst>
                 <a:ext uri="{FF2B5EF4-FFF2-40B4-BE49-F238E27FC236}">
-                  <a16:creationId xmlns:a16="http://schemas.microsoft.com/office/drawing/2014/main" id="{058A5B6B-BB53-445B-B003-AFAF0DAC7CB1}"/>
+                  <a16:creationId xmlns:a16="http://schemas.microsoft.com/office/drawing/2014/main" id="{9FB02B36-5AC4-47BF-914B-E5516A6CA60F}"/>
                 </a:ext>
               </a:extLst>
             </p:cNvPr>
@@ -4742,8 +5037,8 @@
           </p:nvSpPr>
           <p:spPr>
             <a:xfrm>
-              <a:off x="6322625" y="2578211"/>
-              <a:ext cx="541687" cy="369332"/>
+              <a:off x="4079703" y="6023288"/>
+              <a:ext cx="1034835" cy="369332"/>
             </a:xfrm>
             <a:prstGeom prst="rect">
               <a:avLst/>
@@ -4758,123 +5053,46 @@
             <a:p>
               <a:r>
                 <a:rPr lang="en-GB" dirty="0"/>
-                <a:t>AKS</a:t>
+                <a:t>Key vault</a:t>
               </a:r>
             </a:p>
           </p:txBody>
         </p:sp>
-        <p:pic>
-          <p:nvPicPr>
-            <p:cNvPr id="23" name="Picture 22">
+        <p:sp>
+          <p:nvSpPr>
+            <p:cNvPr id="53" name="TextBox 52">
               <a:extLst>
                 <a:ext uri="{FF2B5EF4-FFF2-40B4-BE49-F238E27FC236}">
-                  <a16:creationId xmlns:a16="http://schemas.microsoft.com/office/drawing/2014/main" id="{23E531A5-72A8-4F0A-99DA-7979049C4B92}"/>
+                  <a16:creationId xmlns:a16="http://schemas.microsoft.com/office/drawing/2014/main" id="{7FAEE844-AF2A-428A-8F42-09B984637612}"/>
                 </a:ext>
               </a:extLst>
             </p:cNvPr>
-            <p:cNvPicPr>
-              <a:picLocks noChangeAspect="1"/>
-            </p:cNvPicPr>
+            <p:cNvSpPr txBox="1"/>
             <p:nvPr/>
-          </p:nvPicPr>
-          <p:blipFill rotWithShape="1">
-            <a:blip r:embed="rId14"/>
-            <a:srcRect l="15788" r="20418" b="40130"/>
-            <a:stretch/>
-          </p:blipFill>
+          </p:nvSpPr>
           <p:spPr>
             <a:xfrm>
-              <a:off x="8366283" y="2182113"/>
-              <a:ext cx="520982" cy="462607"/>
+              <a:off x="5578582" y="6023288"/>
+              <a:ext cx="955070" cy="369332"/>
             </a:xfrm>
             <a:prstGeom prst="rect">
               <a:avLst/>
             </a:prstGeom>
+            <a:noFill/>
           </p:spPr>
-        </p:pic>
-        <p:cxnSp>
-          <p:nvCxnSpPr>
-            <p:cNvPr id="29" name="Straight Arrow Connector 28">
-              <a:extLst>
-                <a:ext uri="{FF2B5EF4-FFF2-40B4-BE49-F238E27FC236}">
-                  <a16:creationId xmlns:a16="http://schemas.microsoft.com/office/drawing/2014/main" id="{6A547D07-77EE-4C51-8504-C342B1C7919A}"/>
-                </a:ext>
-              </a:extLst>
-            </p:cNvPr>
-            <p:cNvCxnSpPr>
-              <a:stCxn id="4" idx="3"/>
-              <a:endCxn id="8" idx="1"/>
-            </p:cNvCxnSpPr>
-            <p:nvPr/>
-          </p:nvCxnSpPr>
-          <p:spPr>
-            <a:xfrm flipV="1">
-              <a:off x="6206971" y="2468250"/>
-              <a:ext cx="455500" cy="8988"/>
-            </a:xfrm>
-            <a:prstGeom prst="straightConnector1">
-              <a:avLst/>
-            </a:prstGeom>
-            <a:ln>
-              <a:tailEnd type="triangle"/>
-            </a:ln>
-          </p:spPr>
-          <p:style>
-            <a:lnRef idx="1">
-              <a:schemeClr val="accent1"/>
-            </a:lnRef>
-            <a:fillRef idx="0">
-              <a:schemeClr val="accent1"/>
-            </a:fillRef>
-            <a:effectRef idx="0">
-              <a:schemeClr val="accent1"/>
-            </a:effectRef>
-            <a:fontRef idx="minor">
-              <a:schemeClr val="tx1"/>
-            </a:fontRef>
-          </p:style>
-        </p:cxnSp>
-        <p:cxnSp>
-          <p:nvCxnSpPr>
-            <p:cNvPr id="36" name="Straight Arrow Connector 35">
-              <a:extLst>
-                <a:ext uri="{FF2B5EF4-FFF2-40B4-BE49-F238E27FC236}">
-                  <a16:creationId xmlns:a16="http://schemas.microsoft.com/office/drawing/2014/main" id="{6CFE45C8-F237-4EC7-8982-B901CBFB7F7D}"/>
-                </a:ext>
-              </a:extLst>
-            </p:cNvPr>
-            <p:cNvCxnSpPr>
-              <a:stCxn id="8" idx="3"/>
-            </p:cNvCxnSpPr>
-            <p:nvPr/>
-          </p:nvCxnSpPr>
-          <p:spPr>
-            <a:xfrm>
-              <a:off x="7529246" y="2468250"/>
-              <a:ext cx="732800" cy="0"/>
-            </a:xfrm>
-            <a:prstGeom prst="straightConnector1">
-              <a:avLst/>
-            </a:prstGeom>
-            <a:ln>
-              <a:tailEnd type="triangle"/>
-            </a:ln>
-          </p:spPr>
-          <p:style>
-            <a:lnRef idx="1">
-              <a:schemeClr val="accent1"/>
-            </a:lnRef>
-            <a:fillRef idx="0">
-              <a:schemeClr val="accent1"/>
-            </a:fillRef>
-            <a:effectRef idx="0">
-              <a:schemeClr val="accent1"/>
-            </a:effectRef>
-            <a:fontRef idx="minor">
-              <a:schemeClr val="tx1"/>
-            </a:fontRef>
-          </p:style>
-        </p:cxnSp>
+          <p:txBody>
+            <a:bodyPr wrap="none" rtlCol="0">
+              <a:spAutoFit/>
+            </a:bodyPr>
+            <a:lstStyle/>
+            <a:p>
+              <a:r>
+                <a:rPr lang="en-GB" dirty="0"/>
+                <a:t>Monitor</a:t>
+              </a:r>
+            </a:p>
+          </p:txBody>
+        </p:sp>
       </p:grpSp>
     </p:spTree>
     <p:extLst>

</xml_diff>